<commit_message>
presentation for the lab meeting
</commit_message>
<xml_diff>
--- a/Documents/(article) Random Loop Model to Explain the TAD in CC Experiments/polymerModelWithOneAndTwoFixedLoopsAndInternalConnections.pptx
+++ b/Documents/(article) Random Loop Model to Explain the TAD in CC Experiments/polymerModelWithOneAndTwoFixedLoopsAndInternalConnections.pptx
@@ -7,6 +7,7 @@
   <p:sldIdLst>
     <p:sldId id="256" r:id="rId2"/>
     <p:sldId id="257" r:id="rId3"/>
+    <p:sldId id="258" r:id="rId4"/>
   </p:sldIdLst>
   <p:sldSz cx="12192000" cy="6858000"/>
   <p:notesSz cx="6858000" cy="9144000"/>
@@ -105,6 +106,11 @@
       </a:defRPr>
     </a:lvl9pPr>
   </p:defaultTextStyle>
+  <p:extLst>
+    <p:ext uri="{EFAFB233-063F-42B5-8137-9DF3F51BA10A}">
+      <p15:sldGuideLst xmlns:p15="http://schemas.microsoft.com/office/powerpoint/2012/main"/>
+    </p:ext>
+  </p:extLst>
 </p:presentation>
 </file>
 
@@ -239,7 +245,7 @@
           <a:p>
             <a:fld id="{11E755D3-E711-4D0A-850C-1C48A3BA9F8A}" type="datetimeFigureOut">
               <a:rPr lang="en-US" smtClean="0"/>
-              <a:t>9/30/2014</a:t>
+              <a:t>11/20/2014</a:t>
             </a:fld>
             <a:endParaRPr lang="en-US"/>
           </a:p>
@@ -409,7 +415,7 @@
           <a:p>
             <a:fld id="{11E755D3-E711-4D0A-850C-1C48A3BA9F8A}" type="datetimeFigureOut">
               <a:rPr lang="en-US" smtClean="0"/>
-              <a:t>9/30/2014</a:t>
+              <a:t>11/20/2014</a:t>
             </a:fld>
             <a:endParaRPr lang="en-US"/>
           </a:p>
@@ -589,7 +595,7 @@
           <a:p>
             <a:fld id="{11E755D3-E711-4D0A-850C-1C48A3BA9F8A}" type="datetimeFigureOut">
               <a:rPr lang="en-US" smtClean="0"/>
-              <a:t>9/30/2014</a:t>
+              <a:t>11/20/2014</a:t>
             </a:fld>
             <a:endParaRPr lang="en-US"/>
           </a:p>
@@ -759,7 +765,7 @@
           <a:p>
             <a:fld id="{11E755D3-E711-4D0A-850C-1C48A3BA9F8A}" type="datetimeFigureOut">
               <a:rPr lang="en-US" smtClean="0"/>
-              <a:t>9/30/2014</a:t>
+              <a:t>11/20/2014</a:t>
             </a:fld>
             <a:endParaRPr lang="en-US"/>
           </a:p>
@@ -1005,7 +1011,7 @@
           <a:p>
             <a:fld id="{11E755D3-E711-4D0A-850C-1C48A3BA9F8A}" type="datetimeFigureOut">
               <a:rPr lang="en-US" smtClean="0"/>
-              <a:t>9/30/2014</a:t>
+              <a:t>11/20/2014</a:t>
             </a:fld>
             <a:endParaRPr lang="en-US"/>
           </a:p>
@@ -1237,7 +1243,7 @@
           <a:p>
             <a:fld id="{11E755D3-E711-4D0A-850C-1C48A3BA9F8A}" type="datetimeFigureOut">
               <a:rPr lang="en-US" smtClean="0"/>
-              <a:t>9/30/2014</a:t>
+              <a:t>11/20/2014</a:t>
             </a:fld>
             <a:endParaRPr lang="en-US"/>
           </a:p>
@@ -1604,7 +1610,7 @@
           <a:p>
             <a:fld id="{11E755D3-E711-4D0A-850C-1C48A3BA9F8A}" type="datetimeFigureOut">
               <a:rPr lang="en-US" smtClean="0"/>
-              <a:t>9/30/2014</a:t>
+              <a:t>11/20/2014</a:t>
             </a:fld>
             <a:endParaRPr lang="en-US"/>
           </a:p>
@@ -1722,7 +1728,7 @@
           <a:p>
             <a:fld id="{11E755D3-E711-4D0A-850C-1C48A3BA9F8A}" type="datetimeFigureOut">
               <a:rPr lang="en-US" smtClean="0"/>
-              <a:t>9/30/2014</a:t>
+              <a:t>11/20/2014</a:t>
             </a:fld>
             <a:endParaRPr lang="en-US"/>
           </a:p>
@@ -1817,7 +1823,7 @@
           <a:p>
             <a:fld id="{11E755D3-E711-4D0A-850C-1C48A3BA9F8A}" type="datetimeFigureOut">
               <a:rPr lang="en-US" smtClean="0"/>
-              <a:t>9/30/2014</a:t>
+              <a:t>11/20/2014</a:t>
             </a:fld>
             <a:endParaRPr lang="en-US"/>
           </a:p>
@@ -2094,7 +2100,7 @@
           <a:p>
             <a:fld id="{11E755D3-E711-4D0A-850C-1C48A3BA9F8A}" type="datetimeFigureOut">
               <a:rPr lang="en-US" smtClean="0"/>
-              <a:t>9/30/2014</a:t>
+              <a:t>11/20/2014</a:t>
             </a:fld>
             <a:endParaRPr lang="en-US"/>
           </a:p>
@@ -2347,7 +2353,7 @@
           <a:p>
             <a:fld id="{11E755D3-E711-4D0A-850C-1C48A3BA9F8A}" type="datetimeFigureOut">
               <a:rPr lang="en-US" smtClean="0"/>
-              <a:t>9/30/2014</a:t>
+              <a:t>11/20/2014</a:t>
             </a:fld>
             <a:endParaRPr lang="en-US"/>
           </a:p>
@@ -2560,7 +2566,7 @@
           <a:p>
             <a:fld id="{11E755D3-E711-4D0A-850C-1C48A3BA9F8A}" type="datetimeFigureOut">
               <a:rPr lang="en-US" smtClean="0"/>
-              <a:t>9/30/2014</a:t>
+              <a:t>11/20/2014</a:t>
             </a:fld>
             <a:endParaRPr lang="en-US"/>
           </a:p>
@@ -10038,6 +10044,941 @@
 </p:sld>
 </file>
 
+<file path=ppt/slides/slide3.xml><?xml version="1.0" encoding="utf-8"?>
+<p:sld xmlns:a="http://schemas.openxmlformats.org/drawingml/2006/main" xmlns:r="http://schemas.openxmlformats.org/officeDocument/2006/relationships" xmlns:p="http://schemas.openxmlformats.org/presentationml/2006/main">
+  <p:cSld>
+    <p:spTree>
+      <p:nvGrpSpPr>
+        <p:cNvPr id="1" name=""/>
+        <p:cNvGrpSpPr/>
+        <p:nvPr/>
+      </p:nvGrpSpPr>
+      <p:grpSpPr>
+        <a:xfrm>
+          <a:off x="0" y="0"/>
+          <a:ext cx="0" cy="0"/>
+          <a:chOff x="0" y="0"/>
+          <a:chExt cx="0" cy="0"/>
+        </a:xfrm>
+      </p:grpSpPr>
+      <p:pic>
+        <p:nvPicPr>
+          <p:cNvPr id="36" name="Picture 35"/>
+          <p:cNvPicPr>
+            <a:picLocks noChangeAspect="1"/>
+          </p:cNvPicPr>
+          <p:nvPr/>
+        </p:nvPicPr>
+        <p:blipFill>
+          <a:blip r:embed="rId2" cstate="print">
+            <a:extLst>
+              <a:ext uri="{28A0092B-C50C-407E-A947-70E740481C1C}">
+                <a14:useLocalDpi xmlns:a14="http://schemas.microsoft.com/office/drawing/2010/main" val="0"/>
+              </a:ext>
+            </a:extLst>
+          </a:blip>
+          <a:stretch>
+            <a:fillRect/>
+          </a:stretch>
+        </p:blipFill>
+        <p:spPr>
+          <a:xfrm rot="19702509">
+            <a:off x="2318691" y="1722667"/>
+            <a:ext cx="1133931" cy="1212434"/>
+          </a:xfrm>
+          <a:prstGeom prst="rect">
+            <a:avLst/>
+          </a:prstGeom>
+        </p:spPr>
+      </p:pic>
+      <p:pic>
+        <p:nvPicPr>
+          <p:cNvPr id="37" name="Picture 36"/>
+          <p:cNvPicPr>
+            <a:picLocks noChangeAspect="1"/>
+          </p:cNvPicPr>
+          <p:nvPr/>
+        </p:nvPicPr>
+        <p:blipFill>
+          <a:blip r:embed="rId2" cstate="print">
+            <a:extLst>
+              <a:ext uri="{28A0092B-C50C-407E-A947-70E740481C1C}">
+                <a14:useLocalDpi xmlns:a14="http://schemas.microsoft.com/office/drawing/2010/main" val="0"/>
+              </a:ext>
+            </a:extLst>
+          </a:blip>
+          <a:stretch>
+            <a:fillRect/>
+          </a:stretch>
+        </p:blipFill>
+        <p:spPr>
+          <a:xfrm rot="5925403">
+            <a:off x="3973416" y="4298770"/>
+            <a:ext cx="1133931" cy="1212434"/>
+          </a:xfrm>
+          <a:prstGeom prst="rect">
+            <a:avLst/>
+          </a:prstGeom>
+        </p:spPr>
+      </p:pic>
+      <p:pic>
+        <p:nvPicPr>
+          <p:cNvPr id="38" name="Picture 37"/>
+          <p:cNvPicPr>
+            <a:picLocks noChangeAspect="1"/>
+          </p:cNvPicPr>
+          <p:nvPr/>
+        </p:nvPicPr>
+        <p:blipFill>
+          <a:blip r:embed="rId2" cstate="print">
+            <a:extLst>
+              <a:ext uri="{28A0092B-C50C-407E-A947-70E740481C1C}">
+                <a14:useLocalDpi xmlns:a14="http://schemas.microsoft.com/office/drawing/2010/main" val="0"/>
+              </a:ext>
+            </a:extLst>
+          </a:blip>
+          <a:stretch>
+            <a:fillRect/>
+          </a:stretch>
+        </p:blipFill>
+        <p:spPr>
+          <a:xfrm rot="3658259">
+            <a:off x="5326280" y="4542327"/>
+            <a:ext cx="1133931" cy="1212434"/>
+          </a:xfrm>
+          <a:prstGeom prst="rect">
+            <a:avLst/>
+          </a:prstGeom>
+        </p:spPr>
+      </p:pic>
+      <p:pic>
+        <p:nvPicPr>
+          <p:cNvPr id="35" name="Picture 34"/>
+          <p:cNvPicPr>
+            <a:picLocks noChangeAspect="1"/>
+          </p:cNvPicPr>
+          <p:nvPr/>
+        </p:nvPicPr>
+        <p:blipFill>
+          <a:blip r:embed="rId2" cstate="print">
+            <a:extLst>
+              <a:ext uri="{28A0092B-C50C-407E-A947-70E740481C1C}">
+                <a14:useLocalDpi xmlns:a14="http://schemas.microsoft.com/office/drawing/2010/main" val="0"/>
+              </a:ext>
+            </a:extLst>
+          </a:blip>
+          <a:stretch>
+            <a:fillRect/>
+          </a:stretch>
+        </p:blipFill>
+        <p:spPr>
+          <a:xfrm rot="5400000">
+            <a:off x="6847028" y="4524063"/>
+            <a:ext cx="1133931" cy="1212434"/>
+          </a:xfrm>
+          <a:prstGeom prst="rect">
+            <a:avLst/>
+          </a:prstGeom>
+        </p:spPr>
+      </p:pic>
+      <p:pic>
+        <p:nvPicPr>
+          <p:cNvPr id="34" name="Picture 33"/>
+          <p:cNvPicPr>
+            <a:picLocks noChangeAspect="1"/>
+          </p:cNvPicPr>
+          <p:nvPr/>
+        </p:nvPicPr>
+        <p:blipFill>
+          <a:blip r:embed="rId2" cstate="print">
+            <a:extLst>
+              <a:ext uri="{28A0092B-C50C-407E-A947-70E740481C1C}">
+                <a14:useLocalDpi xmlns:a14="http://schemas.microsoft.com/office/drawing/2010/main" val="0"/>
+              </a:ext>
+            </a:extLst>
+          </a:blip>
+          <a:stretch>
+            <a:fillRect/>
+          </a:stretch>
+        </p:blipFill>
+        <p:spPr>
+          <a:xfrm rot="13747068">
+            <a:off x="8267351" y="4753922"/>
+            <a:ext cx="1133931" cy="1212434"/>
+          </a:xfrm>
+          <a:prstGeom prst="rect">
+            <a:avLst/>
+          </a:prstGeom>
+        </p:spPr>
+      </p:pic>
+      <p:pic>
+        <p:nvPicPr>
+          <p:cNvPr id="30" name="Picture 29"/>
+          <p:cNvPicPr>
+            <a:picLocks noChangeAspect="1"/>
+          </p:cNvPicPr>
+          <p:nvPr/>
+        </p:nvPicPr>
+        <p:blipFill>
+          <a:blip r:embed="rId2" cstate="print">
+            <a:extLst>
+              <a:ext uri="{28A0092B-C50C-407E-A947-70E740481C1C}">
+                <a14:useLocalDpi xmlns:a14="http://schemas.microsoft.com/office/drawing/2010/main" val="0"/>
+              </a:ext>
+            </a:extLst>
+          </a:blip>
+          <a:stretch>
+            <a:fillRect/>
+          </a:stretch>
+        </p:blipFill>
+        <p:spPr>
+          <a:xfrm rot="9252549">
+            <a:off x="8878721" y="3499846"/>
+            <a:ext cx="1133931" cy="1212434"/>
+          </a:xfrm>
+          <a:prstGeom prst="rect">
+            <a:avLst/>
+          </a:prstGeom>
+        </p:spPr>
+      </p:pic>
+      <p:pic>
+        <p:nvPicPr>
+          <p:cNvPr id="29" name="Picture 28"/>
+          <p:cNvPicPr>
+            <a:picLocks noChangeAspect="1"/>
+          </p:cNvPicPr>
+          <p:nvPr/>
+        </p:nvPicPr>
+        <p:blipFill>
+          <a:blip r:embed="rId2" cstate="print">
+            <a:extLst>
+              <a:ext uri="{28A0092B-C50C-407E-A947-70E740481C1C}">
+                <a14:useLocalDpi xmlns:a14="http://schemas.microsoft.com/office/drawing/2010/main" val="0"/>
+              </a:ext>
+            </a:extLst>
+          </a:blip>
+          <a:stretch>
+            <a:fillRect/>
+          </a:stretch>
+        </p:blipFill>
+        <p:spPr>
+          <a:xfrm rot="17271773">
+            <a:off x="7740639" y="2546123"/>
+            <a:ext cx="1133931" cy="1212434"/>
+          </a:xfrm>
+          <a:prstGeom prst="rect">
+            <a:avLst/>
+          </a:prstGeom>
+        </p:spPr>
+      </p:pic>
+      <p:pic>
+        <p:nvPicPr>
+          <p:cNvPr id="33" name="Picture 32"/>
+          <p:cNvPicPr>
+            <a:picLocks noChangeAspect="1"/>
+          </p:cNvPicPr>
+          <p:nvPr/>
+        </p:nvPicPr>
+        <p:blipFill>
+          <a:blip r:embed="rId2" cstate="print">
+            <a:extLst>
+              <a:ext uri="{28A0092B-C50C-407E-A947-70E740481C1C}">
+                <a14:useLocalDpi xmlns:a14="http://schemas.microsoft.com/office/drawing/2010/main" val="0"/>
+              </a:ext>
+            </a:extLst>
+          </a:blip>
+          <a:stretch>
+            <a:fillRect/>
+          </a:stretch>
+        </p:blipFill>
+        <p:spPr>
+          <a:xfrm rot="5914170">
+            <a:off x="6399002" y="1505459"/>
+            <a:ext cx="1133931" cy="1212434"/>
+          </a:xfrm>
+          <a:prstGeom prst="rect">
+            <a:avLst/>
+          </a:prstGeom>
+        </p:spPr>
+      </p:pic>
+      <p:pic>
+        <p:nvPicPr>
+          <p:cNvPr id="31" name="Picture 30"/>
+          <p:cNvPicPr>
+            <a:picLocks noChangeAspect="1"/>
+          </p:cNvPicPr>
+          <p:nvPr/>
+        </p:nvPicPr>
+        <p:blipFill>
+          <a:blip r:embed="rId2" cstate="print">
+            <a:extLst>
+              <a:ext uri="{28A0092B-C50C-407E-A947-70E740481C1C}">
+                <a14:useLocalDpi xmlns:a14="http://schemas.microsoft.com/office/drawing/2010/main" val="0"/>
+              </a:ext>
+            </a:extLst>
+          </a:blip>
+          <a:stretch>
+            <a:fillRect/>
+          </a:stretch>
+        </p:blipFill>
+        <p:spPr>
+          <a:xfrm rot="13835836">
+            <a:off x="4938176" y="1641967"/>
+            <a:ext cx="1133931" cy="1212434"/>
+          </a:xfrm>
+          <a:prstGeom prst="rect">
+            <a:avLst/>
+          </a:prstGeom>
+        </p:spPr>
+      </p:pic>
+      <p:pic>
+        <p:nvPicPr>
+          <p:cNvPr id="5" name="Picture 4"/>
+          <p:cNvPicPr>
+            <a:picLocks noChangeAspect="1"/>
+          </p:cNvPicPr>
+          <p:nvPr/>
+        </p:nvPicPr>
+        <p:blipFill>
+          <a:blip r:embed="rId2" cstate="print">
+            <a:extLst>
+              <a:ext uri="{28A0092B-C50C-407E-A947-70E740481C1C}">
+                <a14:useLocalDpi xmlns:a14="http://schemas.microsoft.com/office/drawing/2010/main" val="0"/>
+              </a:ext>
+            </a:extLst>
+          </a:blip>
+          <a:stretch>
+            <a:fillRect/>
+          </a:stretch>
+        </p:blipFill>
+        <p:spPr>
+          <a:xfrm rot="13835836">
+            <a:off x="3379774" y="2373373"/>
+            <a:ext cx="1133931" cy="1212434"/>
+          </a:xfrm>
+          <a:prstGeom prst="rect">
+            <a:avLst/>
+          </a:prstGeom>
+        </p:spPr>
+      </p:pic>
+      <p:sp>
+        <p:nvSpPr>
+          <p:cNvPr id="4" name="Oval 3"/>
+          <p:cNvSpPr/>
+          <p:nvPr/>
+        </p:nvSpPr>
+        <p:spPr>
+          <a:xfrm>
+            <a:off x="2844800" y="2656115"/>
+            <a:ext cx="674105" cy="670518"/>
+          </a:xfrm>
+          <a:prstGeom prst="ellipse">
+            <a:avLst/>
+          </a:prstGeom>
+          <a:solidFill>
+            <a:schemeClr val="accent6"/>
+          </a:solidFill>
+          <a:scene3d>
+            <a:camera prst="orthographicFront"/>
+            <a:lightRig rig="threePt" dir="t"/>
+          </a:scene3d>
+          <a:sp3d extrusionH="107950" contourW="12700" prstMaterial="dkEdge">
+            <a:bevelT w="107950" h="107950"/>
+            <a:bevelB w="107950" h="107950"/>
+          </a:sp3d>
+        </p:spPr>
+        <p:style>
+          <a:lnRef idx="2">
+            <a:schemeClr val="accent1">
+              <a:shade val="50000"/>
+            </a:schemeClr>
+          </a:lnRef>
+          <a:fillRef idx="1">
+            <a:schemeClr val="accent1"/>
+          </a:fillRef>
+          <a:effectRef idx="0">
+            <a:schemeClr val="accent1"/>
+          </a:effectRef>
+          <a:fontRef idx="minor">
+            <a:schemeClr val="lt1"/>
+          </a:fontRef>
+        </p:style>
+        <p:txBody>
+          <a:bodyPr rot="0" spcFirstLastPara="0" vert="horz" wrap="square" lIns="91440" tIns="45720" rIns="91440" bIns="45720" numCol="1" spcCol="0" rtlCol="1" fromWordArt="0" anchor="ctr" anchorCtr="0" forceAA="0" compatLnSpc="1">
+            <a:prstTxWarp prst="textNoShape">
+              <a:avLst/>
+            </a:prstTxWarp>
+            <a:noAutofit/>
+          </a:bodyPr>
+          <a:lstStyle/>
+          <a:p>
+            <a:endParaRPr lang="en-US"/>
+          </a:p>
+        </p:txBody>
+      </p:sp>
+      <p:sp>
+        <p:nvSpPr>
+          <p:cNvPr id="15" name="Oval 14"/>
+          <p:cNvSpPr/>
+          <p:nvPr/>
+        </p:nvSpPr>
+        <p:spPr>
+          <a:xfrm>
+            <a:off x="4326066" y="2219257"/>
+            <a:ext cx="674105" cy="670518"/>
+          </a:xfrm>
+          <a:prstGeom prst="ellipse">
+            <a:avLst/>
+          </a:prstGeom>
+          <a:solidFill>
+            <a:schemeClr val="accent6"/>
+          </a:solidFill>
+          <a:scene3d>
+            <a:camera prst="orthographicFront"/>
+            <a:lightRig rig="threePt" dir="t"/>
+          </a:scene3d>
+          <a:sp3d extrusionH="107950" contourW="12700" prstMaterial="dkEdge">
+            <a:bevelT w="107950" h="107950"/>
+            <a:bevelB w="107950" h="107950"/>
+          </a:sp3d>
+        </p:spPr>
+        <p:style>
+          <a:lnRef idx="2">
+            <a:schemeClr val="accent1">
+              <a:shade val="50000"/>
+            </a:schemeClr>
+          </a:lnRef>
+          <a:fillRef idx="1">
+            <a:schemeClr val="accent1"/>
+          </a:fillRef>
+          <a:effectRef idx="0">
+            <a:schemeClr val="accent1"/>
+          </a:effectRef>
+          <a:fontRef idx="minor">
+            <a:schemeClr val="lt1"/>
+          </a:fontRef>
+        </p:style>
+        <p:txBody>
+          <a:bodyPr rot="0" spcFirstLastPara="0" vert="horz" wrap="square" lIns="91440" tIns="45720" rIns="91440" bIns="45720" numCol="1" spcCol="0" rtlCol="1" fromWordArt="0" anchor="ctr" anchorCtr="0" forceAA="0" compatLnSpc="1">
+            <a:prstTxWarp prst="textNoShape">
+              <a:avLst/>
+            </a:prstTxWarp>
+            <a:noAutofit/>
+          </a:bodyPr>
+          <a:lstStyle/>
+          <a:p>
+            <a:endParaRPr lang="en-US"/>
+          </a:p>
+        </p:txBody>
+      </p:sp>
+      <p:sp>
+        <p:nvSpPr>
+          <p:cNvPr id="17" name="Oval 16"/>
+          <p:cNvSpPr/>
+          <p:nvPr/>
+        </p:nvSpPr>
+        <p:spPr>
+          <a:xfrm>
+            <a:off x="6361375" y="4689621"/>
+            <a:ext cx="674105" cy="670518"/>
+          </a:xfrm>
+          <a:prstGeom prst="ellipse">
+            <a:avLst/>
+          </a:prstGeom>
+          <a:solidFill>
+            <a:schemeClr val="accent6"/>
+          </a:solidFill>
+          <a:scene3d>
+            <a:camera prst="orthographicFront"/>
+            <a:lightRig rig="threePt" dir="t"/>
+          </a:scene3d>
+          <a:sp3d extrusionH="107950" contourW="12700" prstMaterial="dkEdge">
+            <a:bevelT w="107950" h="107950"/>
+            <a:bevelB w="107950" h="107950"/>
+          </a:sp3d>
+        </p:spPr>
+        <p:style>
+          <a:lnRef idx="2">
+            <a:schemeClr val="accent1">
+              <a:shade val="50000"/>
+            </a:schemeClr>
+          </a:lnRef>
+          <a:fillRef idx="1">
+            <a:schemeClr val="accent1"/>
+          </a:fillRef>
+          <a:effectRef idx="0">
+            <a:schemeClr val="accent1"/>
+          </a:effectRef>
+          <a:fontRef idx="minor">
+            <a:schemeClr val="lt1"/>
+          </a:fontRef>
+        </p:style>
+        <p:txBody>
+          <a:bodyPr rot="0" spcFirstLastPara="0" vert="horz" wrap="square" lIns="91440" tIns="45720" rIns="91440" bIns="45720" numCol="1" spcCol="0" rtlCol="1" fromWordArt="0" anchor="ctr" anchorCtr="0" forceAA="0" compatLnSpc="1">
+            <a:prstTxWarp prst="textNoShape">
+              <a:avLst/>
+            </a:prstTxWarp>
+            <a:noAutofit/>
+          </a:bodyPr>
+          <a:lstStyle/>
+          <a:p>
+            <a:endParaRPr lang="en-US"/>
+          </a:p>
+        </p:txBody>
+      </p:sp>
+      <p:sp>
+        <p:nvSpPr>
+          <p:cNvPr id="18" name="Oval 17"/>
+          <p:cNvSpPr/>
+          <p:nvPr/>
+        </p:nvSpPr>
+        <p:spPr>
+          <a:xfrm>
+            <a:off x="7792507" y="5205226"/>
+            <a:ext cx="674105" cy="670518"/>
+          </a:xfrm>
+          <a:prstGeom prst="ellipse">
+            <a:avLst/>
+          </a:prstGeom>
+          <a:solidFill>
+            <a:schemeClr val="accent6"/>
+          </a:solidFill>
+          <a:scene3d>
+            <a:camera prst="orthographicFront"/>
+            <a:lightRig rig="threePt" dir="t"/>
+          </a:scene3d>
+          <a:sp3d extrusionH="107950" contourW="12700" prstMaterial="dkEdge">
+            <a:bevelT w="107950" h="107950"/>
+            <a:bevelB w="107950" h="107950"/>
+          </a:sp3d>
+        </p:spPr>
+        <p:style>
+          <a:lnRef idx="2">
+            <a:schemeClr val="accent1">
+              <a:shade val="50000"/>
+            </a:schemeClr>
+          </a:lnRef>
+          <a:fillRef idx="1">
+            <a:schemeClr val="accent1"/>
+          </a:fillRef>
+          <a:effectRef idx="0">
+            <a:schemeClr val="accent1"/>
+          </a:effectRef>
+          <a:fontRef idx="minor">
+            <a:schemeClr val="lt1"/>
+          </a:fontRef>
+        </p:style>
+        <p:txBody>
+          <a:bodyPr rot="0" spcFirstLastPara="0" vert="horz" wrap="square" lIns="91440" tIns="45720" rIns="91440" bIns="45720" numCol="1" spcCol="0" rtlCol="1" fromWordArt="0" anchor="ctr" anchorCtr="0" forceAA="0" compatLnSpc="1">
+            <a:prstTxWarp prst="textNoShape">
+              <a:avLst/>
+            </a:prstTxWarp>
+            <a:noAutofit/>
+          </a:bodyPr>
+          <a:lstStyle/>
+          <a:p>
+            <a:endParaRPr lang="en-US"/>
+          </a:p>
+        </p:txBody>
+      </p:sp>
+      <p:sp>
+        <p:nvSpPr>
+          <p:cNvPr id="19" name="Oval 18"/>
+          <p:cNvSpPr/>
+          <p:nvPr/>
+        </p:nvSpPr>
+        <p:spPr>
+          <a:xfrm>
+            <a:off x="4845266" y="5027809"/>
+            <a:ext cx="674105" cy="670518"/>
+          </a:xfrm>
+          <a:prstGeom prst="ellipse">
+            <a:avLst/>
+          </a:prstGeom>
+          <a:solidFill>
+            <a:schemeClr val="accent6"/>
+          </a:solidFill>
+          <a:scene3d>
+            <a:camera prst="orthographicFront"/>
+            <a:lightRig rig="threePt" dir="t"/>
+          </a:scene3d>
+          <a:sp3d extrusionH="107950" contourW="12700" prstMaterial="dkEdge">
+            <a:bevelT w="107950" h="107950"/>
+            <a:bevelB w="107950" h="107950"/>
+          </a:sp3d>
+        </p:spPr>
+        <p:style>
+          <a:lnRef idx="2">
+            <a:schemeClr val="accent1">
+              <a:shade val="50000"/>
+            </a:schemeClr>
+          </a:lnRef>
+          <a:fillRef idx="1">
+            <a:schemeClr val="accent1"/>
+          </a:fillRef>
+          <a:effectRef idx="0">
+            <a:schemeClr val="accent1"/>
+          </a:effectRef>
+          <a:fontRef idx="minor">
+            <a:schemeClr val="lt1"/>
+          </a:fontRef>
+        </p:style>
+        <p:txBody>
+          <a:bodyPr rot="0" spcFirstLastPara="0" vert="horz" wrap="square" lIns="91440" tIns="45720" rIns="91440" bIns="45720" numCol="1" spcCol="0" rtlCol="1" fromWordArt="0" anchor="ctr" anchorCtr="0" forceAA="0" compatLnSpc="1">
+            <a:prstTxWarp prst="textNoShape">
+              <a:avLst/>
+            </a:prstTxWarp>
+            <a:noAutofit/>
+          </a:bodyPr>
+          <a:lstStyle/>
+          <a:p>
+            <a:endParaRPr lang="en-US"/>
+          </a:p>
+        </p:txBody>
+      </p:sp>
+      <p:sp>
+        <p:nvSpPr>
+          <p:cNvPr id="20" name="Oval 19"/>
+          <p:cNvSpPr/>
+          <p:nvPr/>
+        </p:nvSpPr>
+        <p:spPr>
+          <a:xfrm>
+            <a:off x="3444539" y="4385800"/>
+            <a:ext cx="674105" cy="670518"/>
+          </a:xfrm>
+          <a:prstGeom prst="ellipse">
+            <a:avLst/>
+          </a:prstGeom>
+          <a:solidFill>
+            <a:schemeClr val="accent6"/>
+          </a:solidFill>
+          <a:scene3d>
+            <a:camera prst="orthographicFront"/>
+            <a:lightRig rig="threePt" dir="t"/>
+          </a:scene3d>
+          <a:sp3d extrusionH="107950" contourW="12700" prstMaterial="dkEdge">
+            <a:bevelT w="107950" h="107950"/>
+            <a:bevelB w="107950" h="107950"/>
+          </a:sp3d>
+        </p:spPr>
+        <p:style>
+          <a:lnRef idx="2">
+            <a:schemeClr val="accent1">
+              <a:shade val="50000"/>
+            </a:schemeClr>
+          </a:lnRef>
+          <a:fillRef idx="1">
+            <a:schemeClr val="accent1"/>
+          </a:fillRef>
+          <a:effectRef idx="0">
+            <a:schemeClr val="accent1"/>
+          </a:effectRef>
+          <a:fontRef idx="minor">
+            <a:schemeClr val="lt1"/>
+          </a:fontRef>
+        </p:style>
+        <p:txBody>
+          <a:bodyPr rot="0" spcFirstLastPara="0" vert="horz" wrap="square" lIns="91440" tIns="45720" rIns="91440" bIns="45720" numCol="1" spcCol="0" rtlCol="1" fromWordArt="0" anchor="ctr" anchorCtr="0" forceAA="0" compatLnSpc="1">
+            <a:prstTxWarp prst="textNoShape">
+              <a:avLst/>
+            </a:prstTxWarp>
+            <a:noAutofit/>
+          </a:bodyPr>
+          <a:lstStyle/>
+          <a:p>
+            <a:endParaRPr lang="en-US"/>
+          </a:p>
+        </p:txBody>
+      </p:sp>
+      <p:sp>
+        <p:nvSpPr>
+          <p:cNvPr id="22" name="Oval 21"/>
+          <p:cNvSpPr/>
+          <p:nvPr/>
+        </p:nvSpPr>
+        <p:spPr>
+          <a:xfrm>
+            <a:off x="7366545" y="2242757"/>
+            <a:ext cx="674105" cy="670518"/>
+          </a:xfrm>
+          <a:prstGeom prst="ellipse">
+            <a:avLst/>
+          </a:prstGeom>
+          <a:solidFill>
+            <a:schemeClr val="accent6"/>
+          </a:solidFill>
+          <a:scene3d>
+            <a:camera prst="orthographicFront"/>
+            <a:lightRig rig="threePt" dir="t"/>
+          </a:scene3d>
+          <a:sp3d extrusionH="107950" contourW="12700" prstMaterial="dkEdge">
+            <a:bevelT w="107950" h="107950"/>
+            <a:bevelB w="107950" h="107950"/>
+          </a:sp3d>
+        </p:spPr>
+        <p:style>
+          <a:lnRef idx="2">
+            <a:schemeClr val="accent1">
+              <a:shade val="50000"/>
+            </a:schemeClr>
+          </a:lnRef>
+          <a:fillRef idx="1">
+            <a:schemeClr val="accent1"/>
+          </a:fillRef>
+          <a:effectRef idx="0">
+            <a:schemeClr val="accent1"/>
+          </a:effectRef>
+          <a:fontRef idx="minor">
+            <a:schemeClr val="lt1"/>
+          </a:fontRef>
+        </p:style>
+        <p:txBody>
+          <a:bodyPr rot="0" spcFirstLastPara="0" vert="horz" wrap="square" lIns="91440" tIns="45720" rIns="91440" bIns="45720" numCol="1" spcCol="0" rtlCol="1" fromWordArt="0" anchor="ctr" anchorCtr="0" forceAA="0" compatLnSpc="1">
+            <a:prstTxWarp prst="textNoShape">
+              <a:avLst/>
+            </a:prstTxWarp>
+            <a:noAutofit/>
+          </a:bodyPr>
+          <a:lstStyle/>
+          <a:p>
+            <a:endParaRPr lang="en-US"/>
+          </a:p>
+        </p:txBody>
+      </p:sp>
+      <p:sp>
+        <p:nvSpPr>
+          <p:cNvPr id="23" name="Oval 22"/>
+          <p:cNvSpPr/>
+          <p:nvPr/>
+        </p:nvSpPr>
+        <p:spPr>
+          <a:xfrm>
+            <a:off x="9058508" y="4534708"/>
+            <a:ext cx="674105" cy="670518"/>
+          </a:xfrm>
+          <a:prstGeom prst="ellipse">
+            <a:avLst/>
+          </a:prstGeom>
+          <a:solidFill>
+            <a:schemeClr val="accent6"/>
+          </a:solidFill>
+          <a:scene3d>
+            <a:camera prst="orthographicFront"/>
+            <a:lightRig rig="threePt" dir="t"/>
+          </a:scene3d>
+          <a:sp3d extrusionH="107950" contourW="12700" prstMaterial="dkEdge">
+            <a:bevelT w="107950" h="107950"/>
+            <a:bevelB w="107950" h="107950"/>
+          </a:sp3d>
+        </p:spPr>
+        <p:style>
+          <a:lnRef idx="2">
+            <a:schemeClr val="accent1">
+              <a:shade val="50000"/>
+            </a:schemeClr>
+          </a:lnRef>
+          <a:fillRef idx="1">
+            <a:schemeClr val="accent1"/>
+          </a:fillRef>
+          <a:effectRef idx="0">
+            <a:schemeClr val="accent1"/>
+          </a:effectRef>
+          <a:fontRef idx="minor">
+            <a:schemeClr val="lt1"/>
+          </a:fontRef>
+        </p:style>
+        <p:txBody>
+          <a:bodyPr rot="0" spcFirstLastPara="0" vert="horz" wrap="square" lIns="91440" tIns="45720" rIns="91440" bIns="45720" numCol="1" spcCol="0" rtlCol="1" fromWordArt="0" anchor="ctr" anchorCtr="0" forceAA="0" compatLnSpc="1">
+            <a:prstTxWarp prst="textNoShape">
+              <a:avLst/>
+            </a:prstTxWarp>
+            <a:noAutofit/>
+          </a:bodyPr>
+          <a:lstStyle/>
+          <a:p>
+            <a:endParaRPr lang="en-US"/>
+          </a:p>
+        </p:txBody>
+      </p:sp>
+      <p:sp>
+        <p:nvSpPr>
+          <p:cNvPr id="24" name="Oval 23"/>
+          <p:cNvSpPr/>
+          <p:nvPr/>
+        </p:nvSpPr>
+        <p:spPr>
+          <a:xfrm>
+            <a:off x="8721456" y="3065268"/>
+            <a:ext cx="674105" cy="670518"/>
+          </a:xfrm>
+          <a:prstGeom prst="ellipse">
+            <a:avLst/>
+          </a:prstGeom>
+          <a:solidFill>
+            <a:schemeClr val="accent6"/>
+          </a:solidFill>
+          <a:scene3d>
+            <a:camera prst="orthographicFront"/>
+            <a:lightRig rig="threePt" dir="t"/>
+          </a:scene3d>
+          <a:sp3d extrusionH="107950" contourW="12700" prstMaterial="dkEdge">
+            <a:bevelT w="107950" h="107950"/>
+            <a:bevelB w="107950" h="107950"/>
+          </a:sp3d>
+        </p:spPr>
+        <p:style>
+          <a:lnRef idx="2">
+            <a:schemeClr val="accent1">
+              <a:shade val="50000"/>
+            </a:schemeClr>
+          </a:lnRef>
+          <a:fillRef idx="1">
+            <a:schemeClr val="accent1"/>
+          </a:fillRef>
+          <a:effectRef idx="0">
+            <a:schemeClr val="accent1"/>
+          </a:effectRef>
+          <a:fontRef idx="minor">
+            <a:schemeClr val="lt1"/>
+          </a:fontRef>
+        </p:style>
+        <p:txBody>
+          <a:bodyPr rot="0" spcFirstLastPara="0" vert="horz" wrap="square" lIns="91440" tIns="45720" rIns="91440" bIns="45720" numCol="1" spcCol="0" rtlCol="1" fromWordArt="0" anchor="ctr" anchorCtr="0" forceAA="0" compatLnSpc="1">
+            <a:prstTxWarp prst="textNoShape">
+              <a:avLst/>
+            </a:prstTxWarp>
+            <a:noAutofit/>
+          </a:bodyPr>
+          <a:lstStyle/>
+          <a:p>
+            <a:endParaRPr lang="en-US"/>
+          </a:p>
+        </p:txBody>
+      </p:sp>
+      <p:sp>
+        <p:nvSpPr>
+          <p:cNvPr id="21" name="Oval 20"/>
+          <p:cNvSpPr/>
+          <p:nvPr/>
+        </p:nvSpPr>
+        <p:spPr>
+          <a:xfrm>
+            <a:off x="5902275" y="1577666"/>
+            <a:ext cx="674105" cy="670518"/>
+          </a:xfrm>
+          <a:prstGeom prst="ellipse">
+            <a:avLst/>
+          </a:prstGeom>
+          <a:solidFill>
+            <a:schemeClr val="accent6"/>
+          </a:solidFill>
+          <a:scene3d>
+            <a:camera prst="orthographicFront"/>
+            <a:lightRig rig="threePt" dir="t"/>
+          </a:scene3d>
+          <a:sp3d extrusionH="107950" contourW="12700" prstMaterial="dkEdge">
+            <a:bevelT w="107950" h="107950"/>
+            <a:bevelB w="107950" h="107950"/>
+          </a:sp3d>
+        </p:spPr>
+        <p:style>
+          <a:lnRef idx="2">
+            <a:schemeClr val="accent1">
+              <a:shade val="50000"/>
+            </a:schemeClr>
+          </a:lnRef>
+          <a:fillRef idx="1">
+            <a:schemeClr val="accent1"/>
+          </a:fillRef>
+          <a:effectRef idx="0">
+            <a:schemeClr val="accent1"/>
+          </a:effectRef>
+          <a:fontRef idx="minor">
+            <a:schemeClr val="lt1"/>
+          </a:fontRef>
+        </p:style>
+        <p:txBody>
+          <a:bodyPr rot="0" spcFirstLastPara="0" vert="horz" wrap="square" lIns="91440" tIns="45720" rIns="91440" bIns="45720" numCol="1" spcCol="0" rtlCol="1" fromWordArt="0" anchor="ctr" anchorCtr="0" forceAA="0" compatLnSpc="1">
+            <a:prstTxWarp prst="textNoShape">
+              <a:avLst/>
+            </a:prstTxWarp>
+            <a:noAutofit/>
+          </a:bodyPr>
+          <a:lstStyle/>
+          <a:p>
+            <a:endParaRPr lang="en-US"/>
+          </a:p>
+        </p:txBody>
+      </p:sp>
+      <p:sp>
+        <p:nvSpPr>
+          <p:cNvPr id="39" name="Oval 38"/>
+          <p:cNvSpPr/>
+          <p:nvPr/>
+        </p:nvSpPr>
+        <p:spPr>
+          <a:xfrm>
+            <a:off x="2507747" y="1230774"/>
+            <a:ext cx="674105" cy="670518"/>
+          </a:xfrm>
+          <a:prstGeom prst="ellipse">
+            <a:avLst/>
+          </a:prstGeom>
+          <a:solidFill>
+            <a:schemeClr val="accent6"/>
+          </a:solidFill>
+          <a:scene3d>
+            <a:camera prst="orthographicFront"/>
+            <a:lightRig rig="threePt" dir="t"/>
+          </a:scene3d>
+          <a:sp3d extrusionH="107950" contourW="12700" prstMaterial="dkEdge">
+            <a:bevelT w="107950" h="107950"/>
+            <a:bevelB w="107950" h="107950"/>
+          </a:sp3d>
+        </p:spPr>
+        <p:style>
+          <a:lnRef idx="2">
+            <a:schemeClr val="accent1">
+              <a:shade val="50000"/>
+            </a:schemeClr>
+          </a:lnRef>
+          <a:fillRef idx="1">
+            <a:schemeClr val="accent1"/>
+          </a:fillRef>
+          <a:effectRef idx="0">
+            <a:schemeClr val="accent1"/>
+          </a:effectRef>
+          <a:fontRef idx="minor">
+            <a:schemeClr val="lt1"/>
+          </a:fontRef>
+        </p:style>
+        <p:txBody>
+          <a:bodyPr rot="0" spcFirstLastPara="0" vert="horz" wrap="square" lIns="91440" tIns="45720" rIns="91440" bIns="45720" numCol="1" spcCol="0" rtlCol="1" fromWordArt="0" anchor="ctr" anchorCtr="0" forceAA="0" compatLnSpc="1">
+            <a:prstTxWarp prst="textNoShape">
+              <a:avLst/>
+            </a:prstTxWarp>
+            <a:noAutofit/>
+          </a:bodyPr>
+          <a:lstStyle/>
+          <a:p>
+            <a:endParaRPr lang="en-US"/>
+          </a:p>
+        </p:txBody>
+      </p:sp>
+    </p:spTree>
+    <p:extLst>
+      <p:ext uri="{BB962C8B-B14F-4D97-AF65-F5344CB8AC3E}">
+        <p14:creationId xmlns:p14="http://schemas.microsoft.com/office/powerpoint/2010/main" val="3842165264"/>
+      </p:ext>
+    </p:extLst>
+  </p:cSld>
+  <p:clrMapOvr>
+    <a:masterClrMapping/>
+  </p:clrMapOvr>
+</p:sld>
+</file>
+
 <file path=ppt/theme/theme1.xml><?xml version="1.0" encoding="utf-8"?>
 <a:theme xmlns:a="http://schemas.openxmlformats.org/drawingml/2006/main" name="Office Theme">
   <a:themeElements>

</xml_diff>

<commit_message>
jpgs added for the presentation
</commit_message>
<xml_diff>
--- a/Documents/(article) Random Loop Model to Explain the TAD in CC Experiments/polymerModelWithOneAndTwoFixedLoopsAndInternalConnections.pptx
+++ b/Documents/(article) Random Loop Model to Explain the TAD in CC Experiments/polymerModelWithOneAndTwoFixedLoopsAndInternalConnections.pptx
@@ -10,6 +10,7 @@
     <p:sldId id="258" r:id="rId4"/>
     <p:sldId id="259" r:id="rId5"/>
     <p:sldId id="260" r:id="rId6"/>
+    <p:sldId id="261" r:id="rId7"/>
   </p:sldIdLst>
   <p:sldSz cx="12192000" cy="6858000"/>
   <p:notesSz cx="6858000" cy="9144000"/>
@@ -247,7 +248,7 @@
           <a:p>
             <a:fld id="{11E755D3-E711-4D0A-850C-1C48A3BA9F8A}" type="datetimeFigureOut">
               <a:rPr lang="en-US" smtClean="0"/>
-              <a:t>11/27/2014</a:t>
+              <a:t>12/8/2014</a:t>
             </a:fld>
             <a:endParaRPr lang="en-US"/>
           </a:p>
@@ -417,7 +418,7 @@
           <a:p>
             <a:fld id="{11E755D3-E711-4D0A-850C-1C48A3BA9F8A}" type="datetimeFigureOut">
               <a:rPr lang="en-US" smtClean="0"/>
-              <a:t>11/27/2014</a:t>
+              <a:t>12/8/2014</a:t>
             </a:fld>
             <a:endParaRPr lang="en-US"/>
           </a:p>
@@ -597,7 +598,7 @@
           <a:p>
             <a:fld id="{11E755D3-E711-4D0A-850C-1C48A3BA9F8A}" type="datetimeFigureOut">
               <a:rPr lang="en-US" smtClean="0"/>
-              <a:t>11/27/2014</a:t>
+              <a:t>12/8/2014</a:t>
             </a:fld>
             <a:endParaRPr lang="en-US"/>
           </a:p>
@@ -767,7 +768,7 @@
           <a:p>
             <a:fld id="{11E755D3-E711-4D0A-850C-1C48A3BA9F8A}" type="datetimeFigureOut">
               <a:rPr lang="en-US" smtClean="0"/>
-              <a:t>11/27/2014</a:t>
+              <a:t>12/8/2014</a:t>
             </a:fld>
             <a:endParaRPr lang="en-US"/>
           </a:p>
@@ -1013,7 +1014,7 @@
           <a:p>
             <a:fld id="{11E755D3-E711-4D0A-850C-1C48A3BA9F8A}" type="datetimeFigureOut">
               <a:rPr lang="en-US" smtClean="0"/>
-              <a:t>11/27/2014</a:t>
+              <a:t>12/8/2014</a:t>
             </a:fld>
             <a:endParaRPr lang="en-US"/>
           </a:p>
@@ -1245,7 +1246,7 @@
           <a:p>
             <a:fld id="{11E755D3-E711-4D0A-850C-1C48A3BA9F8A}" type="datetimeFigureOut">
               <a:rPr lang="en-US" smtClean="0"/>
-              <a:t>11/27/2014</a:t>
+              <a:t>12/8/2014</a:t>
             </a:fld>
             <a:endParaRPr lang="en-US"/>
           </a:p>
@@ -1612,7 +1613,7 @@
           <a:p>
             <a:fld id="{11E755D3-E711-4D0A-850C-1C48A3BA9F8A}" type="datetimeFigureOut">
               <a:rPr lang="en-US" smtClean="0"/>
-              <a:t>11/27/2014</a:t>
+              <a:t>12/8/2014</a:t>
             </a:fld>
             <a:endParaRPr lang="en-US"/>
           </a:p>
@@ -1730,7 +1731,7 @@
           <a:p>
             <a:fld id="{11E755D3-E711-4D0A-850C-1C48A3BA9F8A}" type="datetimeFigureOut">
               <a:rPr lang="en-US" smtClean="0"/>
-              <a:t>11/27/2014</a:t>
+              <a:t>12/8/2014</a:t>
             </a:fld>
             <a:endParaRPr lang="en-US"/>
           </a:p>
@@ -1825,7 +1826,7 @@
           <a:p>
             <a:fld id="{11E755D3-E711-4D0A-850C-1C48A3BA9F8A}" type="datetimeFigureOut">
               <a:rPr lang="en-US" smtClean="0"/>
-              <a:t>11/27/2014</a:t>
+              <a:t>12/8/2014</a:t>
             </a:fld>
             <a:endParaRPr lang="en-US"/>
           </a:p>
@@ -2102,7 +2103,7 @@
           <a:p>
             <a:fld id="{11E755D3-E711-4D0A-850C-1C48A3BA9F8A}" type="datetimeFigureOut">
               <a:rPr lang="en-US" smtClean="0"/>
-              <a:t>11/27/2014</a:t>
+              <a:t>12/8/2014</a:t>
             </a:fld>
             <a:endParaRPr lang="en-US"/>
           </a:p>
@@ -2355,7 +2356,7 @@
           <a:p>
             <a:fld id="{11E755D3-E711-4D0A-850C-1C48A3BA9F8A}" type="datetimeFigureOut">
               <a:rPr lang="en-US" smtClean="0"/>
-              <a:t>11/27/2014</a:t>
+              <a:t>12/8/2014</a:t>
             </a:fld>
             <a:endParaRPr lang="en-US"/>
           </a:p>
@@ -2568,7 +2569,7 @@
           <a:p>
             <a:fld id="{11E755D3-E711-4D0A-850C-1C48A3BA9F8A}" type="datetimeFigureOut">
               <a:rPr lang="en-US" smtClean="0"/>
-              <a:t>11/27/2014</a:t>
+              <a:t>12/8/2014</a:t>
             </a:fld>
             <a:endParaRPr lang="en-US"/>
           </a:p>
@@ -19791,7 +19792,7 @@
         </p:nvSpPr>
         <p:spPr>
           <a:xfrm>
-            <a:off x="2910226" y="824747"/>
+            <a:off x="3560373" y="907312"/>
             <a:ext cx="327378" cy="369332"/>
           </a:xfrm>
           <a:prstGeom prst="rect">
@@ -19870,6 +19871,1063 @@
     <p:extLst>
       <p:ext uri="{BB962C8B-B14F-4D97-AF65-F5344CB8AC3E}">
         <p14:creationId xmlns:p14="http://schemas.microsoft.com/office/powerpoint/2010/main" val="3670442340"/>
+      </p:ext>
+    </p:extLst>
+  </p:cSld>
+  <p:clrMapOvr>
+    <a:masterClrMapping/>
+  </p:clrMapOvr>
+</p:sld>
+</file>
+
+<file path=ppt/slides/slide6.xml><?xml version="1.0" encoding="utf-8"?>
+<p:sld xmlns:a="http://schemas.openxmlformats.org/drawingml/2006/main" xmlns:r="http://schemas.openxmlformats.org/officeDocument/2006/relationships" xmlns:p="http://schemas.openxmlformats.org/presentationml/2006/main">
+  <p:cSld>
+    <p:spTree>
+      <p:nvGrpSpPr>
+        <p:cNvPr id="1" name=""/>
+        <p:cNvGrpSpPr/>
+        <p:nvPr/>
+      </p:nvGrpSpPr>
+      <p:grpSpPr>
+        <a:xfrm>
+          <a:off x="0" y="0"/>
+          <a:ext cx="0" cy="0"/>
+          <a:chOff x="0" y="0"/>
+          <a:chExt cx="0" cy="0"/>
+        </a:xfrm>
+      </p:grpSpPr>
+      <p:pic>
+        <p:nvPicPr>
+          <p:cNvPr id="27" name="Picture 26"/>
+          <p:cNvPicPr>
+            <a:picLocks noChangeAspect="1"/>
+          </p:cNvPicPr>
+          <p:nvPr/>
+        </p:nvPicPr>
+        <p:blipFill>
+          <a:blip r:embed="rId2" cstate="print">
+            <a:extLst>
+              <a:ext uri="{28A0092B-C50C-407E-A947-70E740481C1C}">
+                <a14:useLocalDpi xmlns:a14="http://schemas.microsoft.com/office/drawing/2010/main" val="0"/>
+              </a:ext>
+            </a:extLst>
+          </a:blip>
+          <a:stretch>
+            <a:fillRect/>
+          </a:stretch>
+        </p:blipFill>
+        <p:spPr>
+          <a:xfrm rot="9217269">
+            <a:off x="5872310" y="2904270"/>
+            <a:ext cx="1133931" cy="1212434"/>
+          </a:xfrm>
+          <a:prstGeom prst="rect">
+            <a:avLst/>
+          </a:prstGeom>
+        </p:spPr>
+      </p:pic>
+      <p:pic>
+        <p:nvPicPr>
+          <p:cNvPr id="36" name="Picture 35"/>
+          <p:cNvPicPr>
+            <a:picLocks noChangeAspect="1"/>
+          </p:cNvPicPr>
+          <p:nvPr/>
+        </p:nvPicPr>
+        <p:blipFill>
+          <a:blip r:embed="rId2" cstate="print">
+            <a:extLst>
+              <a:ext uri="{28A0092B-C50C-407E-A947-70E740481C1C}">
+                <a14:useLocalDpi xmlns:a14="http://schemas.microsoft.com/office/drawing/2010/main" val="0"/>
+              </a:ext>
+            </a:extLst>
+          </a:blip>
+          <a:stretch>
+            <a:fillRect/>
+          </a:stretch>
+        </p:blipFill>
+        <p:spPr>
+          <a:xfrm rot="19702509">
+            <a:off x="2318691" y="1722667"/>
+            <a:ext cx="1133931" cy="1212434"/>
+          </a:xfrm>
+          <a:prstGeom prst="rect">
+            <a:avLst/>
+          </a:prstGeom>
+        </p:spPr>
+      </p:pic>
+      <p:pic>
+        <p:nvPicPr>
+          <p:cNvPr id="37" name="Picture 36"/>
+          <p:cNvPicPr>
+            <a:picLocks noChangeAspect="1"/>
+          </p:cNvPicPr>
+          <p:nvPr/>
+        </p:nvPicPr>
+        <p:blipFill>
+          <a:blip r:embed="rId2" cstate="print">
+            <a:extLst>
+              <a:ext uri="{28A0092B-C50C-407E-A947-70E740481C1C}">
+                <a14:useLocalDpi xmlns:a14="http://schemas.microsoft.com/office/drawing/2010/main" val="0"/>
+              </a:ext>
+            </a:extLst>
+          </a:blip>
+          <a:stretch>
+            <a:fillRect/>
+          </a:stretch>
+        </p:blipFill>
+        <p:spPr>
+          <a:xfrm rot="5925403">
+            <a:off x="3973416" y="4298770"/>
+            <a:ext cx="1133931" cy="1212434"/>
+          </a:xfrm>
+          <a:prstGeom prst="rect">
+            <a:avLst/>
+          </a:prstGeom>
+        </p:spPr>
+      </p:pic>
+      <p:pic>
+        <p:nvPicPr>
+          <p:cNvPr id="38" name="Picture 37"/>
+          <p:cNvPicPr>
+            <a:picLocks noChangeAspect="1"/>
+          </p:cNvPicPr>
+          <p:nvPr/>
+        </p:nvPicPr>
+        <p:blipFill>
+          <a:blip r:embed="rId2" cstate="print">
+            <a:extLst>
+              <a:ext uri="{28A0092B-C50C-407E-A947-70E740481C1C}">
+                <a14:useLocalDpi xmlns:a14="http://schemas.microsoft.com/office/drawing/2010/main" val="0"/>
+              </a:ext>
+            </a:extLst>
+          </a:blip>
+          <a:stretch>
+            <a:fillRect/>
+          </a:stretch>
+        </p:blipFill>
+        <p:spPr>
+          <a:xfrm rot="3658259">
+            <a:off x="5326280" y="4542327"/>
+            <a:ext cx="1133931" cy="1212434"/>
+          </a:xfrm>
+          <a:prstGeom prst="rect">
+            <a:avLst/>
+          </a:prstGeom>
+        </p:spPr>
+      </p:pic>
+      <p:pic>
+        <p:nvPicPr>
+          <p:cNvPr id="35" name="Picture 34"/>
+          <p:cNvPicPr>
+            <a:picLocks noChangeAspect="1"/>
+          </p:cNvPicPr>
+          <p:nvPr/>
+        </p:nvPicPr>
+        <p:blipFill>
+          <a:blip r:embed="rId2" cstate="print">
+            <a:extLst>
+              <a:ext uri="{28A0092B-C50C-407E-A947-70E740481C1C}">
+                <a14:useLocalDpi xmlns:a14="http://schemas.microsoft.com/office/drawing/2010/main" val="0"/>
+              </a:ext>
+            </a:extLst>
+          </a:blip>
+          <a:stretch>
+            <a:fillRect/>
+          </a:stretch>
+        </p:blipFill>
+        <p:spPr>
+          <a:xfrm rot="5400000">
+            <a:off x="6847028" y="4524063"/>
+            <a:ext cx="1133931" cy="1212434"/>
+          </a:xfrm>
+          <a:prstGeom prst="rect">
+            <a:avLst/>
+          </a:prstGeom>
+        </p:spPr>
+      </p:pic>
+      <p:pic>
+        <p:nvPicPr>
+          <p:cNvPr id="34" name="Picture 33"/>
+          <p:cNvPicPr>
+            <a:picLocks noChangeAspect="1"/>
+          </p:cNvPicPr>
+          <p:nvPr/>
+        </p:nvPicPr>
+        <p:blipFill>
+          <a:blip r:embed="rId2" cstate="print">
+            <a:extLst>
+              <a:ext uri="{28A0092B-C50C-407E-A947-70E740481C1C}">
+                <a14:useLocalDpi xmlns:a14="http://schemas.microsoft.com/office/drawing/2010/main" val="0"/>
+              </a:ext>
+            </a:extLst>
+          </a:blip>
+          <a:stretch>
+            <a:fillRect/>
+          </a:stretch>
+        </p:blipFill>
+        <p:spPr>
+          <a:xfrm rot="13747068">
+            <a:off x="8267351" y="4753922"/>
+            <a:ext cx="1133931" cy="1212434"/>
+          </a:xfrm>
+          <a:prstGeom prst="rect">
+            <a:avLst/>
+          </a:prstGeom>
+        </p:spPr>
+      </p:pic>
+      <p:pic>
+        <p:nvPicPr>
+          <p:cNvPr id="30" name="Picture 29"/>
+          <p:cNvPicPr>
+            <a:picLocks noChangeAspect="1"/>
+          </p:cNvPicPr>
+          <p:nvPr/>
+        </p:nvPicPr>
+        <p:blipFill>
+          <a:blip r:embed="rId2" cstate="print">
+            <a:extLst>
+              <a:ext uri="{28A0092B-C50C-407E-A947-70E740481C1C}">
+                <a14:useLocalDpi xmlns:a14="http://schemas.microsoft.com/office/drawing/2010/main" val="0"/>
+              </a:ext>
+            </a:extLst>
+          </a:blip>
+          <a:stretch>
+            <a:fillRect/>
+          </a:stretch>
+        </p:blipFill>
+        <p:spPr>
+          <a:xfrm rot="9252549">
+            <a:off x="8878721" y="3499846"/>
+            <a:ext cx="1133931" cy="1212434"/>
+          </a:xfrm>
+          <a:prstGeom prst="rect">
+            <a:avLst/>
+          </a:prstGeom>
+        </p:spPr>
+      </p:pic>
+      <p:pic>
+        <p:nvPicPr>
+          <p:cNvPr id="29" name="Picture 28"/>
+          <p:cNvPicPr>
+            <a:picLocks noChangeAspect="1"/>
+          </p:cNvPicPr>
+          <p:nvPr/>
+        </p:nvPicPr>
+        <p:blipFill>
+          <a:blip r:embed="rId2" cstate="print">
+            <a:extLst>
+              <a:ext uri="{28A0092B-C50C-407E-A947-70E740481C1C}">
+                <a14:useLocalDpi xmlns:a14="http://schemas.microsoft.com/office/drawing/2010/main" val="0"/>
+              </a:ext>
+            </a:extLst>
+          </a:blip>
+          <a:stretch>
+            <a:fillRect/>
+          </a:stretch>
+        </p:blipFill>
+        <p:spPr>
+          <a:xfrm rot="17271773">
+            <a:off x="7740639" y="2546123"/>
+            <a:ext cx="1133931" cy="1212434"/>
+          </a:xfrm>
+          <a:prstGeom prst="rect">
+            <a:avLst/>
+          </a:prstGeom>
+        </p:spPr>
+      </p:pic>
+      <p:pic>
+        <p:nvPicPr>
+          <p:cNvPr id="33" name="Picture 32"/>
+          <p:cNvPicPr>
+            <a:picLocks noChangeAspect="1"/>
+          </p:cNvPicPr>
+          <p:nvPr/>
+        </p:nvPicPr>
+        <p:blipFill>
+          <a:blip r:embed="rId2" cstate="print">
+            <a:extLst>
+              <a:ext uri="{28A0092B-C50C-407E-A947-70E740481C1C}">
+                <a14:useLocalDpi xmlns:a14="http://schemas.microsoft.com/office/drawing/2010/main" val="0"/>
+              </a:ext>
+            </a:extLst>
+          </a:blip>
+          <a:stretch>
+            <a:fillRect/>
+          </a:stretch>
+        </p:blipFill>
+        <p:spPr>
+          <a:xfrm rot="5914170">
+            <a:off x="6399002" y="1505459"/>
+            <a:ext cx="1133931" cy="1212434"/>
+          </a:xfrm>
+          <a:prstGeom prst="rect">
+            <a:avLst/>
+          </a:prstGeom>
+        </p:spPr>
+      </p:pic>
+      <p:pic>
+        <p:nvPicPr>
+          <p:cNvPr id="31" name="Picture 30"/>
+          <p:cNvPicPr>
+            <a:picLocks noChangeAspect="1"/>
+          </p:cNvPicPr>
+          <p:nvPr/>
+        </p:nvPicPr>
+        <p:blipFill>
+          <a:blip r:embed="rId2" cstate="print">
+            <a:extLst>
+              <a:ext uri="{28A0092B-C50C-407E-A947-70E740481C1C}">
+                <a14:useLocalDpi xmlns:a14="http://schemas.microsoft.com/office/drawing/2010/main" val="0"/>
+              </a:ext>
+            </a:extLst>
+          </a:blip>
+          <a:stretch>
+            <a:fillRect/>
+          </a:stretch>
+        </p:blipFill>
+        <p:spPr>
+          <a:xfrm rot="13835836">
+            <a:off x="4938176" y="1641967"/>
+            <a:ext cx="1133931" cy="1212434"/>
+          </a:xfrm>
+          <a:prstGeom prst="rect">
+            <a:avLst/>
+          </a:prstGeom>
+        </p:spPr>
+      </p:pic>
+      <p:pic>
+        <p:nvPicPr>
+          <p:cNvPr id="5" name="Picture 4"/>
+          <p:cNvPicPr>
+            <a:picLocks noChangeAspect="1"/>
+          </p:cNvPicPr>
+          <p:nvPr/>
+        </p:nvPicPr>
+        <p:blipFill>
+          <a:blip r:embed="rId2" cstate="print">
+            <a:extLst>
+              <a:ext uri="{28A0092B-C50C-407E-A947-70E740481C1C}">
+                <a14:useLocalDpi xmlns:a14="http://schemas.microsoft.com/office/drawing/2010/main" val="0"/>
+              </a:ext>
+            </a:extLst>
+          </a:blip>
+          <a:stretch>
+            <a:fillRect/>
+          </a:stretch>
+        </p:blipFill>
+        <p:spPr>
+          <a:xfrm rot="13835836">
+            <a:off x="3379774" y="2373373"/>
+            <a:ext cx="1133931" cy="1212434"/>
+          </a:xfrm>
+          <a:prstGeom prst="rect">
+            <a:avLst/>
+          </a:prstGeom>
+        </p:spPr>
+      </p:pic>
+      <p:sp>
+        <p:nvSpPr>
+          <p:cNvPr id="4" name="Oval 3"/>
+          <p:cNvSpPr/>
+          <p:nvPr/>
+        </p:nvSpPr>
+        <p:spPr>
+          <a:xfrm>
+            <a:off x="2844800" y="2656115"/>
+            <a:ext cx="674105" cy="670518"/>
+          </a:xfrm>
+          <a:prstGeom prst="ellipse">
+            <a:avLst/>
+          </a:prstGeom>
+          <a:solidFill>
+            <a:schemeClr val="accent6"/>
+          </a:solidFill>
+          <a:scene3d>
+            <a:camera prst="orthographicFront"/>
+            <a:lightRig rig="threePt" dir="t"/>
+          </a:scene3d>
+          <a:sp3d extrusionH="107950" contourW="12700" prstMaterial="dkEdge">
+            <a:bevelT w="107950" h="107950"/>
+            <a:bevelB w="107950" h="107950"/>
+          </a:sp3d>
+        </p:spPr>
+        <p:style>
+          <a:lnRef idx="2">
+            <a:schemeClr val="accent1">
+              <a:shade val="50000"/>
+            </a:schemeClr>
+          </a:lnRef>
+          <a:fillRef idx="1">
+            <a:schemeClr val="accent1"/>
+          </a:fillRef>
+          <a:effectRef idx="0">
+            <a:schemeClr val="accent1"/>
+          </a:effectRef>
+          <a:fontRef idx="minor">
+            <a:schemeClr val="lt1"/>
+          </a:fontRef>
+        </p:style>
+        <p:txBody>
+          <a:bodyPr rot="0" spcFirstLastPara="0" vert="horz" wrap="square" lIns="91440" tIns="45720" rIns="91440" bIns="45720" numCol="1" spcCol="0" rtlCol="1" fromWordArt="0" anchor="ctr" anchorCtr="0" forceAA="0" compatLnSpc="1">
+            <a:prstTxWarp prst="textNoShape">
+              <a:avLst/>
+            </a:prstTxWarp>
+            <a:noAutofit/>
+          </a:bodyPr>
+          <a:lstStyle/>
+          <a:p>
+            <a:endParaRPr lang="en-US"/>
+          </a:p>
+        </p:txBody>
+      </p:sp>
+      <p:sp>
+        <p:nvSpPr>
+          <p:cNvPr id="15" name="Oval 14"/>
+          <p:cNvSpPr/>
+          <p:nvPr/>
+        </p:nvSpPr>
+        <p:spPr>
+          <a:xfrm>
+            <a:off x="4326066" y="2219257"/>
+            <a:ext cx="674105" cy="670518"/>
+          </a:xfrm>
+          <a:prstGeom prst="ellipse">
+            <a:avLst/>
+          </a:prstGeom>
+          <a:solidFill>
+            <a:schemeClr val="accent6"/>
+          </a:solidFill>
+          <a:scene3d>
+            <a:camera prst="orthographicFront"/>
+            <a:lightRig rig="threePt" dir="t"/>
+          </a:scene3d>
+          <a:sp3d extrusionH="107950" contourW="12700" prstMaterial="dkEdge">
+            <a:bevelT w="107950" h="107950"/>
+            <a:bevelB w="107950" h="107950"/>
+          </a:sp3d>
+        </p:spPr>
+        <p:style>
+          <a:lnRef idx="2">
+            <a:schemeClr val="accent1">
+              <a:shade val="50000"/>
+            </a:schemeClr>
+          </a:lnRef>
+          <a:fillRef idx="1">
+            <a:schemeClr val="accent1"/>
+          </a:fillRef>
+          <a:effectRef idx="0">
+            <a:schemeClr val="accent1"/>
+          </a:effectRef>
+          <a:fontRef idx="minor">
+            <a:schemeClr val="lt1"/>
+          </a:fontRef>
+        </p:style>
+        <p:txBody>
+          <a:bodyPr rot="0" spcFirstLastPara="0" vert="horz" wrap="square" lIns="91440" tIns="45720" rIns="91440" bIns="45720" numCol="1" spcCol="0" rtlCol="1" fromWordArt="0" anchor="ctr" anchorCtr="0" forceAA="0" compatLnSpc="1">
+            <a:prstTxWarp prst="textNoShape">
+              <a:avLst/>
+            </a:prstTxWarp>
+            <a:noAutofit/>
+          </a:bodyPr>
+          <a:lstStyle/>
+          <a:p>
+            <a:endParaRPr lang="en-US"/>
+          </a:p>
+        </p:txBody>
+      </p:sp>
+      <p:sp>
+        <p:nvSpPr>
+          <p:cNvPr id="17" name="Oval 16"/>
+          <p:cNvSpPr/>
+          <p:nvPr/>
+        </p:nvSpPr>
+        <p:spPr>
+          <a:xfrm>
+            <a:off x="6361375" y="4689621"/>
+            <a:ext cx="674105" cy="670518"/>
+          </a:xfrm>
+          <a:prstGeom prst="ellipse">
+            <a:avLst/>
+          </a:prstGeom>
+          <a:solidFill>
+            <a:schemeClr val="accent6"/>
+          </a:solidFill>
+          <a:scene3d>
+            <a:camera prst="orthographicFront"/>
+            <a:lightRig rig="threePt" dir="t"/>
+          </a:scene3d>
+          <a:sp3d extrusionH="107950" contourW="12700" prstMaterial="dkEdge">
+            <a:bevelT w="107950" h="107950"/>
+            <a:bevelB w="107950" h="107950"/>
+          </a:sp3d>
+        </p:spPr>
+        <p:style>
+          <a:lnRef idx="2">
+            <a:schemeClr val="accent1">
+              <a:shade val="50000"/>
+            </a:schemeClr>
+          </a:lnRef>
+          <a:fillRef idx="1">
+            <a:schemeClr val="accent1"/>
+          </a:fillRef>
+          <a:effectRef idx="0">
+            <a:schemeClr val="accent1"/>
+          </a:effectRef>
+          <a:fontRef idx="minor">
+            <a:schemeClr val="lt1"/>
+          </a:fontRef>
+        </p:style>
+        <p:txBody>
+          <a:bodyPr rot="0" spcFirstLastPara="0" vert="horz" wrap="square" lIns="91440" tIns="45720" rIns="91440" bIns="45720" numCol="1" spcCol="0" rtlCol="1" fromWordArt="0" anchor="ctr" anchorCtr="0" forceAA="0" compatLnSpc="1">
+            <a:prstTxWarp prst="textNoShape">
+              <a:avLst/>
+            </a:prstTxWarp>
+            <a:noAutofit/>
+          </a:bodyPr>
+          <a:lstStyle/>
+          <a:p>
+            <a:endParaRPr lang="en-US"/>
+          </a:p>
+        </p:txBody>
+      </p:sp>
+      <p:sp>
+        <p:nvSpPr>
+          <p:cNvPr id="18" name="Oval 17"/>
+          <p:cNvSpPr/>
+          <p:nvPr/>
+        </p:nvSpPr>
+        <p:spPr>
+          <a:xfrm>
+            <a:off x="7792507" y="5205226"/>
+            <a:ext cx="674105" cy="670518"/>
+          </a:xfrm>
+          <a:prstGeom prst="ellipse">
+            <a:avLst/>
+          </a:prstGeom>
+          <a:solidFill>
+            <a:schemeClr val="accent6"/>
+          </a:solidFill>
+          <a:scene3d>
+            <a:camera prst="orthographicFront"/>
+            <a:lightRig rig="threePt" dir="t"/>
+          </a:scene3d>
+          <a:sp3d extrusionH="107950" contourW="12700" prstMaterial="dkEdge">
+            <a:bevelT w="107950" h="107950"/>
+            <a:bevelB w="107950" h="107950"/>
+          </a:sp3d>
+        </p:spPr>
+        <p:style>
+          <a:lnRef idx="2">
+            <a:schemeClr val="accent1">
+              <a:shade val="50000"/>
+            </a:schemeClr>
+          </a:lnRef>
+          <a:fillRef idx="1">
+            <a:schemeClr val="accent1"/>
+          </a:fillRef>
+          <a:effectRef idx="0">
+            <a:schemeClr val="accent1"/>
+          </a:effectRef>
+          <a:fontRef idx="minor">
+            <a:schemeClr val="lt1"/>
+          </a:fontRef>
+        </p:style>
+        <p:txBody>
+          <a:bodyPr rot="0" spcFirstLastPara="0" vert="horz" wrap="square" lIns="91440" tIns="45720" rIns="91440" bIns="45720" numCol="1" spcCol="0" rtlCol="1" fromWordArt="0" anchor="ctr" anchorCtr="0" forceAA="0" compatLnSpc="1">
+            <a:prstTxWarp prst="textNoShape">
+              <a:avLst/>
+            </a:prstTxWarp>
+            <a:noAutofit/>
+          </a:bodyPr>
+          <a:lstStyle/>
+          <a:p>
+            <a:endParaRPr lang="en-US"/>
+          </a:p>
+        </p:txBody>
+      </p:sp>
+      <p:sp>
+        <p:nvSpPr>
+          <p:cNvPr id="19" name="Oval 18"/>
+          <p:cNvSpPr/>
+          <p:nvPr/>
+        </p:nvSpPr>
+        <p:spPr>
+          <a:xfrm>
+            <a:off x="4845266" y="5027809"/>
+            <a:ext cx="674105" cy="670518"/>
+          </a:xfrm>
+          <a:prstGeom prst="ellipse">
+            <a:avLst/>
+          </a:prstGeom>
+          <a:solidFill>
+            <a:schemeClr val="accent6"/>
+          </a:solidFill>
+          <a:scene3d>
+            <a:camera prst="orthographicFront"/>
+            <a:lightRig rig="threePt" dir="t"/>
+          </a:scene3d>
+          <a:sp3d extrusionH="107950" contourW="12700" prstMaterial="dkEdge">
+            <a:bevelT w="107950" h="107950"/>
+            <a:bevelB w="107950" h="107950"/>
+          </a:sp3d>
+        </p:spPr>
+        <p:style>
+          <a:lnRef idx="2">
+            <a:schemeClr val="accent1">
+              <a:shade val="50000"/>
+            </a:schemeClr>
+          </a:lnRef>
+          <a:fillRef idx="1">
+            <a:schemeClr val="accent1"/>
+          </a:fillRef>
+          <a:effectRef idx="0">
+            <a:schemeClr val="accent1"/>
+          </a:effectRef>
+          <a:fontRef idx="minor">
+            <a:schemeClr val="lt1"/>
+          </a:fontRef>
+        </p:style>
+        <p:txBody>
+          <a:bodyPr rot="0" spcFirstLastPara="0" vert="horz" wrap="square" lIns="91440" tIns="45720" rIns="91440" bIns="45720" numCol="1" spcCol="0" rtlCol="1" fromWordArt="0" anchor="ctr" anchorCtr="0" forceAA="0" compatLnSpc="1">
+            <a:prstTxWarp prst="textNoShape">
+              <a:avLst/>
+            </a:prstTxWarp>
+            <a:noAutofit/>
+          </a:bodyPr>
+          <a:lstStyle/>
+          <a:p>
+            <a:endParaRPr lang="en-US"/>
+          </a:p>
+        </p:txBody>
+      </p:sp>
+      <p:sp>
+        <p:nvSpPr>
+          <p:cNvPr id="20" name="Oval 19"/>
+          <p:cNvSpPr/>
+          <p:nvPr/>
+        </p:nvSpPr>
+        <p:spPr>
+          <a:xfrm>
+            <a:off x="3444539" y="4385800"/>
+            <a:ext cx="674105" cy="670518"/>
+          </a:xfrm>
+          <a:prstGeom prst="ellipse">
+            <a:avLst/>
+          </a:prstGeom>
+          <a:solidFill>
+            <a:schemeClr val="accent6"/>
+          </a:solidFill>
+          <a:scene3d>
+            <a:camera prst="orthographicFront"/>
+            <a:lightRig rig="threePt" dir="t"/>
+          </a:scene3d>
+          <a:sp3d extrusionH="107950" contourW="12700" prstMaterial="dkEdge">
+            <a:bevelT w="107950" h="107950"/>
+            <a:bevelB w="107950" h="107950"/>
+          </a:sp3d>
+        </p:spPr>
+        <p:style>
+          <a:lnRef idx="2">
+            <a:schemeClr val="accent1">
+              <a:shade val="50000"/>
+            </a:schemeClr>
+          </a:lnRef>
+          <a:fillRef idx="1">
+            <a:schemeClr val="accent1"/>
+          </a:fillRef>
+          <a:effectRef idx="0">
+            <a:schemeClr val="accent1"/>
+          </a:effectRef>
+          <a:fontRef idx="minor">
+            <a:schemeClr val="lt1"/>
+          </a:fontRef>
+        </p:style>
+        <p:txBody>
+          <a:bodyPr rot="0" spcFirstLastPara="0" vert="horz" wrap="square" lIns="91440" tIns="45720" rIns="91440" bIns="45720" numCol="1" spcCol="0" rtlCol="1" fromWordArt="0" anchor="ctr" anchorCtr="0" forceAA="0" compatLnSpc="1">
+            <a:prstTxWarp prst="textNoShape">
+              <a:avLst/>
+            </a:prstTxWarp>
+            <a:noAutofit/>
+          </a:bodyPr>
+          <a:lstStyle/>
+          <a:p>
+            <a:endParaRPr lang="en-US"/>
+          </a:p>
+        </p:txBody>
+      </p:sp>
+      <p:sp>
+        <p:nvSpPr>
+          <p:cNvPr id="22" name="Oval 21"/>
+          <p:cNvSpPr/>
+          <p:nvPr/>
+        </p:nvSpPr>
+        <p:spPr>
+          <a:xfrm>
+            <a:off x="7366545" y="2242757"/>
+            <a:ext cx="674105" cy="670518"/>
+          </a:xfrm>
+          <a:prstGeom prst="ellipse">
+            <a:avLst/>
+          </a:prstGeom>
+          <a:solidFill>
+            <a:schemeClr val="accent6"/>
+          </a:solidFill>
+          <a:scene3d>
+            <a:camera prst="orthographicFront"/>
+            <a:lightRig rig="threePt" dir="t"/>
+          </a:scene3d>
+          <a:sp3d extrusionH="107950" contourW="12700" prstMaterial="dkEdge">
+            <a:bevelT w="107950" h="107950"/>
+            <a:bevelB w="107950" h="107950"/>
+          </a:sp3d>
+        </p:spPr>
+        <p:style>
+          <a:lnRef idx="2">
+            <a:schemeClr val="accent1">
+              <a:shade val="50000"/>
+            </a:schemeClr>
+          </a:lnRef>
+          <a:fillRef idx="1">
+            <a:schemeClr val="accent1"/>
+          </a:fillRef>
+          <a:effectRef idx="0">
+            <a:schemeClr val="accent1"/>
+          </a:effectRef>
+          <a:fontRef idx="minor">
+            <a:schemeClr val="lt1"/>
+          </a:fontRef>
+        </p:style>
+        <p:txBody>
+          <a:bodyPr rot="0" spcFirstLastPara="0" vert="horz" wrap="square" lIns="91440" tIns="45720" rIns="91440" bIns="45720" numCol="1" spcCol="0" rtlCol="1" fromWordArt="0" anchor="ctr" anchorCtr="0" forceAA="0" compatLnSpc="1">
+            <a:prstTxWarp prst="textNoShape">
+              <a:avLst/>
+            </a:prstTxWarp>
+            <a:noAutofit/>
+          </a:bodyPr>
+          <a:lstStyle/>
+          <a:p>
+            <a:endParaRPr lang="en-US"/>
+          </a:p>
+        </p:txBody>
+      </p:sp>
+      <p:sp>
+        <p:nvSpPr>
+          <p:cNvPr id="23" name="Oval 22"/>
+          <p:cNvSpPr/>
+          <p:nvPr/>
+        </p:nvSpPr>
+        <p:spPr>
+          <a:xfrm>
+            <a:off x="9058508" y="4534708"/>
+            <a:ext cx="674105" cy="670518"/>
+          </a:xfrm>
+          <a:prstGeom prst="ellipse">
+            <a:avLst/>
+          </a:prstGeom>
+          <a:solidFill>
+            <a:schemeClr val="accent6"/>
+          </a:solidFill>
+          <a:scene3d>
+            <a:camera prst="orthographicFront"/>
+            <a:lightRig rig="threePt" dir="t"/>
+          </a:scene3d>
+          <a:sp3d extrusionH="107950" contourW="12700" prstMaterial="dkEdge">
+            <a:bevelT w="107950" h="107950"/>
+            <a:bevelB w="107950" h="107950"/>
+          </a:sp3d>
+        </p:spPr>
+        <p:style>
+          <a:lnRef idx="2">
+            <a:schemeClr val="accent1">
+              <a:shade val="50000"/>
+            </a:schemeClr>
+          </a:lnRef>
+          <a:fillRef idx="1">
+            <a:schemeClr val="accent1"/>
+          </a:fillRef>
+          <a:effectRef idx="0">
+            <a:schemeClr val="accent1"/>
+          </a:effectRef>
+          <a:fontRef idx="minor">
+            <a:schemeClr val="lt1"/>
+          </a:fontRef>
+        </p:style>
+        <p:txBody>
+          <a:bodyPr rot="0" spcFirstLastPara="0" vert="horz" wrap="square" lIns="91440" tIns="45720" rIns="91440" bIns="45720" numCol="1" spcCol="0" rtlCol="1" fromWordArt="0" anchor="ctr" anchorCtr="0" forceAA="0" compatLnSpc="1">
+            <a:prstTxWarp prst="textNoShape">
+              <a:avLst/>
+            </a:prstTxWarp>
+            <a:noAutofit/>
+          </a:bodyPr>
+          <a:lstStyle/>
+          <a:p>
+            <a:endParaRPr lang="en-US"/>
+          </a:p>
+        </p:txBody>
+      </p:sp>
+      <p:sp>
+        <p:nvSpPr>
+          <p:cNvPr id="24" name="Oval 23"/>
+          <p:cNvSpPr/>
+          <p:nvPr/>
+        </p:nvSpPr>
+        <p:spPr>
+          <a:xfrm>
+            <a:off x="8721456" y="3065268"/>
+            <a:ext cx="674105" cy="670518"/>
+          </a:xfrm>
+          <a:prstGeom prst="ellipse">
+            <a:avLst/>
+          </a:prstGeom>
+          <a:solidFill>
+            <a:schemeClr val="accent6"/>
+          </a:solidFill>
+          <a:scene3d>
+            <a:camera prst="orthographicFront"/>
+            <a:lightRig rig="threePt" dir="t"/>
+          </a:scene3d>
+          <a:sp3d extrusionH="107950" contourW="12700" prstMaterial="dkEdge">
+            <a:bevelT w="107950" h="107950"/>
+            <a:bevelB w="107950" h="107950"/>
+          </a:sp3d>
+        </p:spPr>
+        <p:style>
+          <a:lnRef idx="2">
+            <a:schemeClr val="accent1">
+              <a:shade val="50000"/>
+            </a:schemeClr>
+          </a:lnRef>
+          <a:fillRef idx="1">
+            <a:schemeClr val="accent1"/>
+          </a:fillRef>
+          <a:effectRef idx="0">
+            <a:schemeClr val="accent1"/>
+          </a:effectRef>
+          <a:fontRef idx="minor">
+            <a:schemeClr val="lt1"/>
+          </a:fontRef>
+        </p:style>
+        <p:txBody>
+          <a:bodyPr rot="0" spcFirstLastPara="0" vert="horz" wrap="square" lIns="91440" tIns="45720" rIns="91440" bIns="45720" numCol="1" spcCol="0" rtlCol="1" fromWordArt="0" anchor="ctr" anchorCtr="0" forceAA="0" compatLnSpc="1">
+            <a:prstTxWarp prst="textNoShape">
+              <a:avLst/>
+            </a:prstTxWarp>
+            <a:noAutofit/>
+          </a:bodyPr>
+          <a:lstStyle/>
+          <a:p>
+            <a:endParaRPr lang="en-US"/>
+          </a:p>
+        </p:txBody>
+      </p:sp>
+      <p:sp>
+        <p:nvSpPr>
+          <p:cNvPr id="21" name="Oval 20"/>
+          <p:cNvSpPr/>
+          <p:nvPr/>
+        </p:nvSpPr>
+        <p:spPr>
+          <a:xfrm>
+            <a:off x="5902275" y="1577666"/>
+            <a:ext cx="674105" cy="670518"/>
+          </a:xfrm>
+          <a:prstGeom prst="ellipse">
+            <a:avLst/>
+          </a:prstGeom>
+          <a:solidFill>
+            <a:schemeClr val="accent6"/>
+          </a:solidFill>
+          <a:scene3d>
+            <a:camera prst="orthographicFront"/>
+            <a:lightRig rig="threePt" dir="t"/>
+          </a:scene3d>
+          <a:sp3d extrusionH="107950" contourW="12700" prstMaterial="dkEdge">
+            <a:bevelT w="107950" h="107950"/>
+            <a:bevelB w="107950" h="107950"/>
+          </a:sp3d>
+        </p:spPr>
+        <p:style>
+          <a:lnRef idx="2">
+            <a:schemeClr val="accent1">
+              <a:shade val="50000"/>
+            </a:schemeClr>
+          </a:lnRef>
+          <a:fillRef idx="1">
+            <a:schemeClr val="accent1"/>
+          </a:fillRef>
+          <a:effectRef idx="0">
+            <a:schemeClr val="accent1"/>
+          </a:effectRef>
+          <a:fontRef idx="minor">
+            <a:schemeClr val="lt1"/>
+          </a:fontRef>
+        </p:style>
+        <p:txBody>
+          <a:bodyPr rot="0" spcFirstLastPara="0" vert="horz" wrap="square" lIns="91440" tIns="45720" rIns="91440" bIns="45720" numCol="1" spcCol="0" rtlCol="1" fromWordArt="0" anchor="ctr" anchorCtr="0" forceAA="0" compatLnSpc="1">
+            <a:prstTxWarp prst="textNoShape">
+              <a:avLst/>
+            </a:prstTxWarp>
+            <a:noAutofit/>
+          </a:bodyPr>
+          <a:lstStyle/>
+          <a:p>
+            <a:endParaRPr lang="en-US"/>
+          </a:p>
+        </p:txBody>
+      </p:sp>
+      <p:sp>
+        <p:nvSpPr>
+          <p:cNvPr id="39" name="Oval 38"/>
+          <p:cNvSpPr/>
+          <p:nvPr/>
+        </p:nvSpPr>
+        <p:spPr>
+          <a:xfrm>
+            <a:off x="2507747" y="1230774"/>
+            <a:ext cx="674105" cy="670518"/>
+          </a:xfrm>
+          <a:prstGeom prst="ellipse">
+            <a:avLst/>
+          </a:prstGeom>
+          <a:solidFill>
+            <a:schemeClr val="accent6"/>
+          </a:solidFill>
+          <a:scene3d>
+            <a:camera prst="orthographicFront"/>
+            <a:lightRig rig="threePt" dir="t"/>
+          </a:scene3d>
+          <a:sp3d extrusionH="107950" contourW="12700" prstMaterial="dkEdge">
+            <a:bevelT w="107950" h="107950"/>
+            <a:bevelB w="107950" h="107950"/>
+          </a:sp3d>
+        </p:spPr>
+        <p:style>
+          <a:lnRef idx="2">
+            <a:schemeClr val="accent1">
+              <a:shade val="50000"/>
+            </a:schemeClr>
+          </a:lnRef>
+          <a:fillRef idx="1">
+            <a:schemeClr val="accent1"/>
+          </a:fillRef>
+          <a:effectRef idx="0">
+            <a:schemeClr val="accent1"/>
+          </a:effectRef>
+          <a:fontRef idx="minor">
+            <a:schemeClr val="lt1"/>
+          </a:fontRef>
+        </p:style>
+        <p:txBody>
+          <a:bodyPr rot="0" spcFirstLastPara="0" vert="horz" wrap="square" lIns="91440" tIns="45720" rIns="91440" bIns="45720" numCol="1" spcCol="0" rtlCol="1" fromWordArt="0" anchor="ctr" anchorCtr="0" forceAA="0" compatLnSpc="1">
+            <a:prstTxWarp prst="textNoShape">
+              <a:avLst/>
+            </a:prstTxWarp>
+            <a:noAutofit/>
+          </a:bodyPr>
+          <a:lstStyle/>
+          <a:p>
+            <a:endParaRPr lang="en-US"/>
+          </a:p>
+        </p:txBody>
+      </p:sp>
+      <p:cxnSp>
+        <p:nvCxnSpPr>
+          <p:cNvPr id="3" name="Straight Arrow Connector 2"/>
+          <p:cNvCxnSpPr/>
+          <p:nvPr/>
+        </p:nvCxnSpPr>
+        <p:spPr>
+          <a:xfrm>
+            <a:off x="6292105" y="2385366"/>
+            <a:ext cx="294345" cy="2179435"/>
+          </a:xfrm>
+          <a:prstGeom prst="straightConnector1">
+            <a:avLst/>
+          </a:prstGeom>
+          <a:ln w="50800">
+            <a:tailEnd type="triangle"/>
+          </a:ln>
+        </p:spPr>
+        <p:style>
+          <a:lnRef idx="1">
+            <a:schemeClr val="accent1"/>
+          </a:lnRef>
+          <a:fillRef idx="0">
+            <a:schemeClr val="accent1"/>
+          </a:fillRef>
+          <a:effectRef idx="0">
+            <a:schemeClr val="accent1"/>
+          </a:effectRef>
+          <a:fontRef idx="minor">
+            <a:schemeClr val="tx1"/>
+          </a:fontRef>
+        </p:style>
+      </p:cxnSp>
+      <p:sp>
+        <p:nvSpPr>
+          <p:cNvPr id="6" name="TextBox 5"/>
+          <p:cNvSpPr txBox="1"/>
+          <p:nvPr/>
+        </p:nvSpPr>
+        <p:spPr>
+          <a:xfrm>
+            <a:off x="6095893" y="1738122"/>
+            <a:ext cx="237566" cy="369332"/>
+          </a:xfrm>
+          <a:prstGeom prst="rect">
+            <a:avLst/>
+          </a:prstGeom>
+          <a:noFill/>
+        </p:spPr>
+        <p:txBody>
+          <a:bodyPr wrap="none" rtlCol="0">
+            <a:spAutoFit/>
+          </a:bodyPr>
+          <a:lstStyle/>
+          <a:p>
+            <a:r>
+              <a:rPr lang="en-US" dirty="0" err="1" smtClean="0"/>
+              <a:t>i</a:t>
+            </a:r>
+            <a:endParaRPr lang="en-US" dirty="0"/>
+          </a:p>
+        </p:txBody>
+      </p:sp>
+      <p:sp>
+        <p:nvSpPr>
+          <p:cNvPr id="7" name="TextBox 6"/>
+          <p:cNvSpPr txBox="1"/>
+          <p:nvPr/>
+        </p:nvSpPr>
+        <p:spPr>
+          <a:xfrm>
+            <a:off x="6565279" y="4850764"/>
+            <a:ext cx="237566" cy="369332"/>
+          </a:xfrm>
+          <a:prstGeom prst="rect">
+            <a:avLst/>
+          </a:prstGeom>
+          <a:noFill/>
+        </p:spPr>
+        <p:txBody>
+          <a:bodyPr wrap="none" rtlCol="0">
+            <a:spAutoFit/>
+          </a:bodyPr>
+          <a:lstStyle/>
+          <a:p>
+            <a:r>
+              <a:rPr lang="en-US" dirty="0"/>
+              <a:t>l</a:t>
+            </a:r>
+          </a:p>
+        </p:txBody>
+      </p:sp>
+    </p:spTree>
+    <p:extLst>
+      <p:ext uri="{BB962C8B-B14F-4D97-AF65-F5344CB8AC3E}">
+        <p14:creationId xmlns:p14="http://schemas.microsoft.com/office/powerpoint/2010/main" val="2442680453"/>
       </p:ext>
     </p:extLst>
   </p:cSld>

</xml_diff>

<commit_message>
added model of ring an a chain
</commit_message>
<xml_diff>
--- a/Documents/(article) Random Loop Model to Explain the TAD in CC Experiments/polymerModelWithOneAndTwoFixedLoopsAndInternalConnections.pptx
+++ b/Documents/(article) Random Loop Model to Explain the TAD in CC Experiments/polymerModelWithOneAndTwoFixedLoopsAndInternalConnections.pptx
@@ -11,6 +11,7 @@
     <p:sldId id="259" r:id="rId5"/>
     <p:sldId id="260" r:id="rId6"/>
     <p:sldId id="261" r:id="rId7"/>
+    <p:sldId id="262" r:id="rId8"/>
   </p:sldIdLst>
   <p:sldSz cx="12192000" cy="6858000"/>
   <p:notesSz cx="6858000" cy="9144000"/>
@@ -248,7 +249,7 @@
           <a:p>
             <a:fld id="{11E755D3-E711-4D0A-850C-1C48A3BA9F8A}" type="datetimeFigureOut">
               <a:rPr lang="en-US" smtClean="0"/>
-              <a:t>12/8/2014</a:t>
+              <a:t>12/29/2014</a:t>
             </a:fld>
             <a:endParaRPr lang="en-US"/>
           </a:p>
@@ -418,7 +419,7 @@
           <a:p>
             <a:fld id="{11E755D3-E711-4D0A-850C-1C48A3BA9F8A}" type="datetimeFigureOut">
               <a:rPr lang="en-US" smtClean="0"/>
-              <a:t>12/8/2014</a:t>
+              <a:t>12/29/2014</a:t>
             </a:fld>
             <a:endParaRPr lang="en-US"/>
           </a:p>
@@ -598,7 +599,7 @@
           <a:p>
             <a:fld id="{11E755D3-E711-4D0A-850C-1C48A3BA9F8A}" type="datetimeFigureOut">
               <a:rPr lang="en-US" smtClean="0"/>
-              <a:t>12/8/2014</a:t>
+              <a:t>12/29/2014</a:t>
             </a:fld>
             <a:endParaRPr lang="en-US"/>
           </a:p>
@@ -768,7 +769,7 @@
           <a:p>
             <a:fld id="{11E755D3-E711-4D0A-850C-1C48A3BA9F8A}" type="datetimeFigureOut">
               <a:rPr lang="en-US" smtClean="0"/>
-              <a:t>12/8/2014</a:t>
+              <a:t>12/29/2014</a:t>
             </a:fld>
             <a:endParaRPr lang="en-US"/>
           </a:p>
@@ -1014,7 +1015,7 @@
           <a:p>
             <a:fld id="{11E755D3-E711-4D0A-850C-1C48A3BA9F8A}" type="datetimeFigureOut">
               <a:rPr lang="en-US" smtClean="0"/>
-              <a:t>12/8/2014</a:t>
+              <a:t>12/29/2014</a:t>
             </a:fld>
             <a:endParaRPr lang="en-US"/>
           </a:p>
@@ -1246,7 +1247,7 @@
           <a:p>
             <a:fld id="{11E755D3-E711-4D0A-850C-1C48A3BA9F8A}" type="datetimeFigureOut">
               <a:rPr lang="en-US" smtClean="0"/>
-              <a:t>12/8/2014</a:t>
+              <a:t>12/29/2014</a:t>
             </a:fld>
             <a:endParaRPr lang="en-US"/>
           </a:p>
@@ -1613,7 +1614,7 @@
           <a:p>
             <a:fld id="{11E755D3-E711-4D0A-850C-1C48A3BA9F8A}" type="datetimeFigureOut">
               <a:rPr lang="en-US" smtClean="0"/>
-              <a:t>12/8/2014</a:t>
+              <a:t>12/29/2014</a:t>
             </a:fld>
             <a:endParaRPr lang="en-US"/>
           </a:p>
@@ -1731,7 +1732,7 @@
           <a:p>
             <a:fld id="{11E755D3-E711-4D0A-850C-1C48A3BA9F8A}" type="datetimeFigureOut">
               <a:rPr lang="en-US" smtClean="0"/>
-              <a:t>12/8/2014</a:t>
+              <a:t>12/29/2014</a:t>
             </a:fld>
             <a:endParaRPr lang="en-US"/>
           </a:p>
@@ -1826,7 +1827,7 @@
           <a:p>
             <a:fld id="{11E755D3-E711-4D0A-850C-1C48A3BA9F8A}" type="datetimeFigureOut">
               <a:rPr lang="en-US" smtClean="0"/>
-              <a:t>12/8/2014</a:t>
+              <a:t>12/29/2014</a:t>
             </a:fld>
             <a:endParaRPr lang="en-US"/>
           </a:p>
@@ -2103,7 +2104,7 @@
           <a:p>
             <a:fld id="{11E755D3-E711-4D0A-850C-1C48A3BA9F8A}" type="datetimeFigureOut">
               <a:rPr lang="en-US" smtClean="0"/>
-              <a:t>12/8/2014</a:t>
+              <a:t>12/29/2014</a:t>
             </a:fld>
             <a:endParaRPr lang="en-US"/>
           </a:p>
@@ -2356,7 +2357,7 @@
           <a:p>
             <a:fld id="{11E755D3-E711-4D0A-850C-1C48A3BA9F8A}" type="datetimeFigureOut">
               <a:rPr lang="en-US" smtClean="0"/>
-              <a:t>12/8/2014</a:t>
+              <a:t>12/29/2014</a:t>
             </a:fld>
             <a:endParaRPr lang="en-US"/>
           </a:p>
@@ -2569,7 +2570,7 @@
           <a:p>
             <a:fld id="{11E755D3-E711-4D0A-850C-1C48A3BA9F8A}" type="datetimeFigureOut">
               <a:rPr lang="en-US" smtClean="0"/>
-              <a:t>12/8/2014</a:t>
+              <a:t>12/29/2014</a:t>
             </a:fld>
             <a:endParaRPr lang="en-US"/>
           </a:p>
@@ -20937,6 +20938,2038 @@
 </p:sld>
 </file>
 
+<file path=ppt/slides/slide7.xml><?xml version="1.0" encoding="utf-8"?>
+<p:sld xmlns:a="http://schemas.openxmlformats.org/drawingml/2006/main" xmlns:r="http://schemas.openxmlformats.org/officeDocument/2006/relationships" xmlns:p="http://schemas.openxmlformats.org/presentationml/2006/main">
+  <p:cSld>
+    <p:spTree>
+      <p:nvGrpSpPr>
+        <p:cNvPr id="1" name=""/>
+        <p:cNvGrpSpPr/>
+        <p:nvPr/>
+      </p:nvGrpSpPr>
+      <p:grpSpPr>
+        <a:xfrm>
+          <a:off x="0" y="0"/>
+          <a:ext cx="0" cy="0"/>
+          <a:chOff x="0" y="0"/>
+          <a:chExt cx="0" cy="0"/>
+        </a:xfrm>
+      </p:grpSpPr>
+      <p:sp>
+        <p:nvSpPr>
+          <p:cNvPr id="53" name="Freeform 52"/>
+          <p:cNvSpPr/>
+          <p:nvPr/>
+        </p:nvSpPr>
+        <p:spPr>
+          <a:xfrm>
+            <a:off x="1682046" y="576616"/>
+            <a:ext cx="7391450" cy="4947783"/>
+          </a:xfrm>
+          <a:custGeom>
+            <a:avLst/>
+            <a:gdLst>
+              <a:gd name="connsiteX0" fmla="*/ 0 w 7476541"/>
+              <a:gd name="connsiteY0" fmla="*/ 4489182 h 5016986"/>
+              <a:gd name="connsiteX1" fmla="*/ 3943927 w 7476541"/>
+              <a:gd name="connsiteY1" fmla="*/ 4766273 h 5016986"/>
+              <a:gd name="connsiteX2" fmla="*/ 7472218 w 7476541"/>
+              <a:gd name="connsiteY2" fmla="*/ 1339582 h 5016986"/>
+              <a:gd name="connsiteX3" fmla="*/ 4608946 w 7476541"/>
+              <a:gd name="connsiteY3" fmla="*/ 309 h 5016986"/>
+              <a:gd name="connsiteX4" fmla="*/ 1921164 w 7476541"/>
+              <a:gd name="connsiteY4" fmla="*/ 1431945 h 5016986"/>
+              <a:gd name="connsiteX5" fmla="*/ 3971636 w 7476541"/>
+              <a:gd name="connsiteY5" fmla="*/ 4803218 h 5016986"/>
+            </a:gdLst>
+            <a:ahLst/>
+            <a:cxnLst>
+              <a:cxn ang="0">
+                <a:pos x="connsiteX0" y="connsiteY0"/>
+              </a:cxn>
+              <a:cxn ang="0">
+                <a:pos x="connsiteX1" y="connsiteY1"/>
+              </a:cxn>
+              <a:cxn ang="0">
+                <a:pos x="connsiteX2" y="connsiteY2"/>
+              </a:cxn>
+              <a:cxn ang="0">
+                <a:pos x="connsiteX3" y="connsiteY3"/>
+              </a:cxn>
+              <a:cxn ang="0">
+                <a:pos x="connsiteX4" y="connsiteY4"/>
+              </a:cxn>
+              <a:cxn ang="0">
+                <a:pos x="connsiteX5" y="connsiteY5"/>
+              </a:cxn>
+            </a:cxnLst>
+            <a:rect l="l" t="t" r="r" b="b"/>
+            <a:pathLst>
+              <a:path w="7476541" h="5016986">
+                <a:moveTo>
+                  <a:pt x="0" y="4489182"/>
+                </a:moveTo>
+                <a:cubicBezTo>
+                  <a:pt x="1349278" y="4890194"/>
+                  <a:pt x="2698557" y="5291206"/>
+                  <a:pt x="3943927" y="4766273"/>
+                </a:cubicBezTo>
+                <a:cubicBezTo>
+                  <a:pt x="5189297" y="4241340"/>
+                  <a:pt x="7361382" y="2133909"/>
+                  <a:pt x="7472218" y="1339582"/>
+                </a:cubicBezTo>
+                <a:cubicBezTo>
+                  <a:pt x="7583054" y="545255"/>
+                  <a:pt x="5534122" y="-15085"/>
+                  <a:pt x="4608946" y="309"/>
+                </a:cubicBezTo>
+                <a:cubicBezTo>
+                  <a:pt x="3683770" y="15703"/>
+                  <a:pt x="2027382" y="631460"/>
+                  <a:pt x="1921164" y="1431945"/>
+                </a:cubicBezTo>
+                <a:cubicBezTo>
+                  <a:pt x="1814946" y="2232430"/>
+                  <a:pt x="2893291" y="3517824"/>
+                  <a:pt x="3971636" y="4803218"/>
+                </a:cubicBezTo>
+              </a:path>
+            </a:pathLst>
+          </a:custGeom>
+          <a:noFill/>
+          <a:ln w="57150"/>
+          <a:scene3d>
+            <a:camera prst="orthographicFront"/>
+            <a:lightRig rig="threePt" dir="t"/>
+          </a:scene3d>
+          <a:sp3d>
+            <a:bevelT w="69850" h="165100"/>
+            <a:bevelB w="82550" h="190500"/>
+          </a:sp3d>
+        </p:spPr>
+        <p:style>
+          <a:lnRef idx="2">
+            <a:schemeClr val="accent1">
+              <a:shade val="50000"/>
+            </a:schemeClr>
+          </a:lnRef>
+          <a:fillRef idx="1">
+            <a:schemeClr val="accent1"/>
+          </a:fillRef>
+          <a:effectRef idx="0">
+            <a:schemeClr val="accent1"/>
+          </a:effectRef>
+          <a:fontRef idx="minor">
+            <a:schemeClr val="lt1"/>
+          </a:fontRef>
+        </p:style>
+        <p:txBody>
+          <a:bodyPr rtlCol="0" anchor="ctr"/>
+          <a:lstStyle/>
+          <a:p>
+            <a:pPr algn="ctr"/>
+            <a:endParaRPr lang="en-US"/>
+          </a:p>
+        </p:txBody>
+      </p:sp>
+      <p:grpSp>
+        <p:nvGrpSpPr>
+          <p:cNvPr id="4" name="Group 3"/>
+          <p:cNvGrpSpPr/>
+          <p:nvPr/>
+        </p:nvGrpSpPr>
+        <p:grpSpPr>
+          <a:xfrm>
+            <a:off x="1625185" y="327402"/>
+            <a:ext cx="7603133" cy="5377595"/>
+            <a:chOff x="1744637" y="1165225"/>
+            <a:chExt cx="4178643" cy="2877439"/>
+          </a:xfrm>
+        </p:grpSpPr>
+        <p:sp>
+          <p:nvSpPr>
+            <p:cNvPr id="6" name="Oval 5"/>
+            <p:cNvSpPr/>
+            <p:nvPr/>
+          </p:nvSpPr>
+          <p:spPr>
+            <a:xfrm>
+              <a:off x="3197225" y="1468755"/>
+              <a:ext cx="153035" cy="168910"/>
+            </a:xfrm>
+            <a:prstGeom prst="ellipse">
+              <a:avLst/>
+            </a:prstGeom>
+            <a:solidFill>
+              <a:schemeClr val="accent6"/>
+            </a:solidFill>
+            <a:scene3d>
+              <a:camera prst="orthographicFront"/>
+              <a:lightRig rig="threePt" dir="t"/>
+            </a:scene3d>
+            <a:sp3d extrusionH="107950" contourW="12700" prstMaterial="dkEdge">
+              <a:bevelT w="107950" h="107950"/>
+              <a:bevelB w="107950" h="107950"/>
+            </a:sp3d>
+          </p:spPr>
+          <p:style>
+            <a:lnRef idx="2">
+              <a:schemeClr val="accent1">
+                <a:shade val="50000"/>
+              </a:schemeClr>
+            </a:lnRef>
+            <a:fillRef idx="1">
+              <a:schemeClr val="accent1"/>
+            </a:fillRef>
+            <a:effectRef idx="0">
+              <a:schemeClr val="accent1"/>
+            </a:effectRef>
+            <a:fontRef idx="minor">
+              <a:schemeClr val="lt1"/>
+            </a:fontRef>
+          </p:style>
+          <p:txBody>
+            <a:bodyPr rot="0" spcFirstLastPara="0" vert="horz" wrap="square" lIns="91440" tIns="45720" rIns="91440" bIns="45720" numCol="1" spcCol="0" rtlCol="1" fromWordArt="0" anchor="ctr" anchorCtr="0" forceAA="0" compatLnSpc="1">
+              <a:prstTxWarp prst="textNoShape">
+                <a:avLst/>
+              </a:prstTxWarp>
+              <a:noAutofit/>
+            </a:bodyPr>
+            <a:lstStyle/>
+            <a:p>
+              <a:endParaRPr lang="en-US"/>
+            </a:p>
+          </p:txBody>
+        </p:sp>
+        <p:sp>
+          <p:nvSpPr>
+            <p:cNvPr id="7" name="Oval 6"/>
+            <p:cNvSpPr/>
+            <p:nvPr/>
+          </p:nvSpPr>
+          <p:spPr>
+            <a:xfrm>
+              <a:off x="1744637" y="3587115"/>
+              <a:ext cx="153035" cy="168910"/>
+            </a:xfrm>
+            <a:prstGeom prst="ellipse">
+              <a:avLst/>
+            </a:prstGeom>
+            <a:solidFill>
+              <a:schemeClr val="accent6"/>
+            </a:solidFill>
+            <a:scene3d>
+              <a:camera prst="orthographicFront"/>
+              <a:lightRig rig="threePt" dir="t"/>
+            </a:scene3d>
+            <a:sp3d extrusionH="107950" contourW="12700" prstMaterial="dkEdge">
+              <a:bevelT w="107950" h="107950"/>
+              <a:bevelB w="107950" h="107950"/>
+            </a:sp3d>
+          </p:spPr>
+          <p:style>
+            <a:lnRef idx="2">
+              <a:schemeClr val="accent1">
+                <a:shade val="50000"/>
+              </a:schemeClr>
+            </a:lnRef>
+            <a:fillRef idx="1">
+              <a:schemeClr val="accent1"/>
+            </a:fillRef>
+            <a:effectRef idx="0">
+              <a:schemeClr val="accent1"/>
+            </a:effectRef>
+            <a:fontRef idx="minor">
+              <a:schemeClr val="lt1"/>
+            </a:fontRef>
+          </p:style>
+          <p:txBody>
+            <a:bodyPr rot="0" spcFirstLastPara="0" vert="horz" wrap="square" lIns="91440" tIns="45720" rIns="91440" bIns="45720" numCol="1" spcCol="0" rtlCol="1" fromWordArt="0" anchor="ctr" anchorCtr="0" forceAA="0" compatLnSpc="1">
+              <a:prstTxWarp prst="textNoShape">
+                <a:avLst/>
+              </a:prstTxWarp>
+              <a:noAutofit/>
+            </a:bodyPr>
+            <a:lstStyle/>
+            <a:p>
+              <a:endParaRPr lang="en-US"/>
+            </a:p>
+          </p:txBody>
+        </p:sp>
+        <p:sp>
+          <p:nvSpPr>
+            <p:cNvPr id="8" name="Oval 7"/>
+            <p:cNvSpPr/>
+            <p:nvPr/>
+          </p:nvSpPr>
+          <p:spPr>
+            <a:xfrm>
+              <a:off x="2068019" y="3701373"/>
+              <a:ext cx="153035" cy="168910"/>
+            </a:xfrm>
+            <a:prstGeom prst="ellipse">
+              <a:avLst/>
+            </a:prstGeom>
+            <a:solidFill>
+              <a:schemeClr val="accent6"/>
+            </a:solidFill>
+            <a:scene3d>
+              <a:camera prst="orthographicFront"/>
+              <a:lightRig rig="threePt" dir="t"/>
+            </a:scene3d>
+            <a:sp3d extrusionH="107950" contourW="12700" prstMaterial="dkEdge">
+              <a:bevelT w="107950" h="107950"/>
+              <a:bevelB w="107950" h="107950"/>
+            </a:sp3d>
+          </p:spPr>
+          <p:style>
+            <a:lnRef idx="2">
+              <a:schemeClr val="accent1">
+                <a:shade val="50000"/>
+              </a:schemeClr>
+            </a:lnRef>
+            <a:fillRef idx="1">
+              <a:schemeClr val="accent1"/>
+            </a:fillRef>
+            <a:effectRef idx="0">
+              <a:schemeClr val="accent1"/>
+            </a:effectRef>
+            <a:fontRef idx="minor">
+              <a:schemeClr val="lt1"/>
+            </a:fontRef>
+          </p:style>
+          <p:txBody>
+            <a:bodyPr rot="0" spcFirstLastPara="0" vert="horz" wrap="square" lIns="91440" tIns="45720" rIns="91440" bIns="45720" numCol="1" spcCol="0" rtlCol="1" fromWordArt="0" anchor="ctr" anchorCtr="0" forceAA="0" compatLnSpc="1">
+              <a:prstTxWarp prst="textNoShape">
+                <a:avLst/>
+              </a:prstTxWarp>
+              <a:noAutofit/>
+            </a:bodyPr>
+            <a:lstStyle/>
+            <a:p>
+              <a:endParaRPr lang="en-US"/>
+            </a:p>
+          </p:txBody>
+        </p:sp>
+        <p:sp>
+          <p:nvSpPr>
+            <p:cNvPr id="9" name="Oval 8"/>
+            <p:cNvSpPr/>
+            <p:nvPr/>
+          </p:nvSpPr>
+          <p:spPr>
+            <a:xfrm>
+              <a:off x="2385013" y="3785828"/>
+              <a:ext cx="153035" cy="168910"/>
+            </a:xfrm>
+            <a:prstGeom prst="ellipse">
+              <a:avLst/>
+            </a:prstGeom>
+            <a:solidFill>
+              <a:schemeClr val="accent6"/>
+            </a:solidFill>
+            <a:scene3d>
+              <a:camera prst="orthographicFront"/>
+              <a:lightRig rig="threePt" dir="t"/>
+            </a:scene3d>
+            <a:sp3d extrusionH="107950" contourW="12700" prstMaterial="dkEdge">
+              <a:bevelT w="107950" h="107950"/>
+              <a:bevelB w="107950" h="107950"/>
+            </a:sp3d>
+          </p:spPr>
+          <p:style>
+            <a:lnRef idx="2">
+              <a:schemeClr val="accent1">
+                <a:shade val="50000"/>
+              </a:schemeClr>
+            </a:lnRef>
+            <a:fillRef idx="1">
+              <a:schemeClr val="accent1"/>
+            </a:fillRef>
+            <a:effectRef idx="0">
+              <a:schemeClr val="accent1"/>
+            </a:effectRef>
+            <a:fontRef idx="minor">
+              <a:schemeClr val="lt1"/>
+            </a:fontRef>
+          </p:style>
+          <p:txBody>
+            <a:bodyPr rot="0" spcFirstLastPara="0" vert="horz" wrap="square" lIns="91440" tIns="45720" rIns="91440" bIns="45720" numCol="1" spcCol="0" rtlCol="1" fromWordArt="0" anchor="ctr" anchorCtr="0" forceAA="0" compatLnSpc="1">
+              <a:prstTxWarp prst="textNoShape">
+                <a:avLst/>
+              </a:prstTxWarp>
+              <a:noAutofit/>
+            </a:bodyPr>
+            <a:lstStyle/>
+            <a:p>
+              <a:endParaRPr lang="en-US"/>
+            </a:p>
+          </p:txBody>
+        </p:sp>
+        <p:sp>
+          <p:nvSpPr>
+            <p:cNvPr id="10" name="Oval 9"/>
+            <p:cNvSpPr/>
+            <p:nvPr/>
+          </p:nvSpPr>
+          <p:spPr>
+            <a:xfrm>
+              <a:off x="2726181" y="3850104"/>
+              <a:ext cx="153035" cy="168910"/>
+            </a:xfrm>
+            <a:prstGeom prst="ellipse">
+              <a:avLst/>
+            </a:prstGeom>
+            <a:solidFill>
+              <a:schemeClr val="accent6"/>
+            </a:solidFill>
+            <a:scene3d>
+              <a:camera prst="orthographicFront"/>
+              <a:lightRig rig="threePt" dir="t"/>
+            </a:scene3d>
+            <a:sp3d extrusionH="107950" contourW="12700" prstMaterial="dkEdge">
+              <a:bevelT w="107950" h="107950"/>
+              <a:bevelB w="107950" h="107950"/>
+            </a:sp3d>
+          </p:spPr>
+          <p:style>
+            <a:lnRef idx="2">
+              <a:schemeClr val="accent1">
+                <a:shade val="50000"/>
+              </a:schemeClr>
+            </a:lnRef>
+            <a:fillRef idx="1">
+              <a:schemeClr val="accent1"/>
+            </a:fillRef>
+            <a:effectRef idx="0">
+              <a:schemeClr val="accent1"/>
+            </a:effectRef>
+            <a:fontRef idx="minor">
+              <a:schemeClr val="lt1"/>
+            </a:fontRef>
+          </p:style>
+          <p:txBody>
+            <a:bodyPr rot="0" spcFirstLastPara="0" vert="horz" wrap="square" lIns="91440" tIns="45720" rIns="91440" bIns="45720" numCol="1" spcCol="0" rtlCol="1" fromWordArt="0" anchor="ctr" anchorCtr="0" forceAA="0" compatLnSpc="1">
+              <a:prstTxWarp prst="textNoShape">
+                <a:avLst/>
+              </a:prstTxWarp>
+              <a:noAutofit/>
+            </a:bodyPr>
+            <a:lstStyle/>
+            <a:p>
+              <a:endParaRPr lang="en-US"/>
+            </a:p>
+          </p:txBody>
+        </p:sp>
+        <p:sp>
+          <p:nvSpPr>
+            <p:cNvPr id="11" name="Oval 10"/>
+            <p:cNvSpPr/>
+            <p:nvPr/>
+          </p:nvSpPr>
+          <p:spPr>
+            <a:xfrm>
+              <a:off x="3025491" y="3873754"/>
+              <a:ext cx="153035" cy="168910"/>
+            </a:xfrm>
+            <a:prstGeom prst="ellipse">
+              <a:avLst/>
+            </a:prstGeom>
+            <a:solidFill>
+              <a:schemeClr val="accent6"/>
+            </a:solidFill>
+            <a:scene3d>
+              <a:camera prst="orthographicFront"/>
+              <a:lightRig rig="threePt" dir="t"/>
+            </a:scene3d>
+            <a:sp3d extrusionH="107950" contourW="12700" prstMaterial="dkEdge">
+              <a:bevelT w="107950" h="107950"/>
+              <a:bevelB w="107950" h="107950"/>
+            </a:sp3d>
+          </p:spPr>
+          <p:style>
+            <a:lnRef idx="2">
+              <a:schemeClr val="accent1">
+                <a:shade val="50000"/>
+              </a:schemeClr>
+            </a:lnRef>
+            <a:fillRef idx="1">
+              <a:schemeClr val="accent1"/>
+            </a:fillRef>
+            <a:effectRef idx="0">
+              <a:schemeClr val="accent1"/>
+            </a:effectRef>
+            <a:fontRef idx="minor">
+              <a:schemeClr val="lt1"/>
+            </a:fontRef>
+          </p:style>
+          <p:txBody>
+            <a:bodyPr rot="0" spcFirstLastPara="0" vert="horz" wrap="square" lIns="91440" tIns="45720" rIns="91440" bIns="45720" numCol="1" spcCol="0" rtlCol="1" fromWordArt="0" anchor="ctr" anchorCtr="0" forceAA="0" compatLnSpc="1">
+              <a:prstTxWarp prst="textNoShape">
+                <a:avLst/>
+              </a:prstTxWarp>
+              <a:noAutofit/>
+            </a:bodyPr>
+            <a:lstStyle/>
+            <a:p>
+              <a:endParaRPr lang="en-US"/>
+            </a:p>
+          </p:txBody>
+        </p:sp>
+        <p:sp>
+          <p:nvSpPr>
+            <p:cNvPr id="12" name="Oval 11"/>
+            <p:cNvSpPr/>
+            <p:nvPr/>
+          </p:nvSpPr>
+          <p:spPr>
+            <a:xfrm>
+              <a:off x="3344024" y="3868875"/>
+              <a:ext cx="153035" cy="168910"/>
+            </a:xfrm>
+            <a:prstGeom prst="ellipse">
+              <a:avLst/>
+            </a:prstGeom>
+            <a:solidFill>
+              <a:schemeClr val="accent6"/>
+            </a:solidFill>
+            <a:scene3d>
+              <a:camera prst="orthographicFront"/>
+              <a:lightRig rig="threePt" dir="t"/>
+            </a:scene3d>
+            <a:sp3d extrusionH="107950" contourW="12700" prstMaterial="dkEdge">
+              <a:bevelT w="107950" h="107950"/>
+              <a:bevelB w="107950" h="107950"/>
+            </a:sp3d>
+          </p:spPr>
+          <p:style>
+            <a:lnRef idx="2">
+              <a:schemeClr val="accent1">
+                <a:shade val="50000"/>
+              </a:schemeClr>
+            </a:lnRef>
+            <a:fillRef idx="1">
+              <a:schemeClr val="accent1"/>
+            </a:fillRef>
+            <a:effectRef idx="0">
+              <a:schemeClr val="accent1"/>
+            </a:effectRef>
+            <a:fontRef idx="minor">
+              <a:schemeClr val="lt1"/>
+            </a:fontRef>
+          </p:style>
+          <p:txBody>
+            <a:bodyPr rot="0" spcFirstLastPara="0" vert="horz" wrap="square" lIns="91440" tIns="45720" rIns="91440" bIns="45720" numCol="1" spcCol="0" rtlCol="1" fromWordArt="0" anchor="ctr" anchorCtr="0" forceAA="0" compatLnSpc="1">
+              <a:prstTxWarp prst="textNoShape">
+                <a:avLst/>
+              </a:prstTxWarp>
+              <a:noAutofit/>
+            </a:bodyPr>
+            <a:lstStyle/>
+            <a:p>
+              <a:endParaRPr lang="en-US"/>
+            </a:p>
+          </p:txBody>
+        </p:sp>
+        <p:sp>
+          <p:nvSpPr>
+            <p:cNvPr id="13" name="Oval 12"/>
+            <p:cNvSpPr/>
+            <p:nvPr/>
+          </p:nvSpPr>
+          <p:spPr>
+            <a:xfrm>
+              <a:off x="3631247" y="3819253"/>
+              <a:ext cx="153035" cy="168910"/>
+            </a:xfrm>
+            <a:prstGeom prst="ellipse">
+              <a:avLst/>
+            </a:prstGeom>
+            <a:solidFill>
+              <a:schemeClr val="accent6"/>
+            </a:solidFill>
+            <a:scene3d>
+              <a:camera prst="orthographicFront"/>
+              <a:lightRig rig="threePt" dir="t"/>
+            </a:scene3d>
+            <a:sp3d extrusionH="107950" contourW="12700" prstMaterial="dkEdge">
+              <a:bevelT w="107950" h="107950"/>
+              <a:bevelB w="107950" h="107950"/>
+            </a:sp3d>
+          </p:spPr>
+          <p:style>
+            <a:lnRef idx="2">
+              <a:schemeClr val="accent1">
+                <a:shade val="50000"/>
+              </a:schemeClr>
+            </a:lnRef>
+            <a:fillRef idx="1">
+              <a:schemeClr val="accent1"/>
+            </a:fillRef>
+            <a:effectRef idx="0">
+              <a:schemeClr val="accent1"/>
+            </a:effectRef>
+            <a:fontRef idx="minor">
+              <a:schemeClr val="lt1"/>
+            </a:fontRef>
+          </p:style>
+          <p:txBody>
+            <a:bodyPr rot="0" spcFirstLastPara="0" vert="horz" wrap="square" lIns="91440" tIns="45720" rIns="91440" bIns="45720" numCol="1" spcCol="0" rtlCol="1" fromWordArt="0" anchor="ctr" anchorCtr="0" forceAA="0" compatLnSpc="1">
+              <a:prstTxWarp prst="textNoShape">
+                <a:avLst/>
+              </a:prstTxWarp>
+              <a:noAutofit/>
+            </a:bodyPr>
+            <a:lstStyle/>
+            <a:p>
+              <a:endParaRPr lang="en-US"/>
+            </a:p>
+          </p:txBody>
+        </p:sp>
+        <p:sp>
+          <p:nvSpPr>
+            <p:cNvPr id="14" name="Oval 13"/>
+            <p:cNvSpPr/>
+            <p:nvPr/>
+          </p:nvSpPr>
+          <p:spPr>
+            <a:xfrm>
+              <a:off x="3602187" y="3478245"/>
+              <a:ext cx="153035" cy="168910"/>
+            </a:xfrm>
+            <a:prstGeom prst="ellipse">
+              <a:avLst/>
+            </a:prstGeom>
+            <a:solidFill>
+              <a:schemeClr val="accent6">
+                <a:lumMod val="50000"/>
+              </a:schemeClr>
+            </a:solidFill>
+            <a:ln>
+              <a:solidFill>
+                <a:schemeClr val="accent6">
+                  <a:lumMod val="50000"/>
+                </a:schemeClr>
+              </a:solidFill>
+            </a:ln>
+            <a:scene3d>
+              <a:camera prst="orthographicFront"/>
+              <a:lightRig rig="threePt" dir="t"/>
+            </a:scene3d>
+            <a:sp3d extrusionH="107950" contourW="12700" prstMaterial="dkEdge">
+              <a:bevelT w="107950" h="107950"/>
+              <a:bevelB w="107950" h="107950"/>
+            </a:sp3d>
+          </p:spPr>
+          <p:style>
+            <a:lnRef idx="2">
+              <a:schemeClr val="accent1">
+                <a:shade val="50000"/>
+              </a:schemeClr>
+            </a:lnRef>
+            <a:fillRef idx="1">
+              <a:schemeClr val="accent1"/>
+            </a:fillRef>
+            <a:effectRef idx="0">
+              <a:schemeClr val="accent1"/>
+            </a:effectRef>
+            <a:fontRef idx="minor">
+              <a:schemeClr val="lt1"/>
+            </a:fontRef>
+          </p:style>
+          <p:txBody>
+            <a:bodyPr rot="0" spcFirstLastPara="0" vert="horz" wrap="square" lIns="91440" tIns="45720" rIns="91440" bIns="45720" numCol="1" spcCol="0" rtlCol="1" fromWordArt="0" anchor="ctr" anchorCtr="0" forceAA="0" compatLnSpc="1">
+              <a:prstTxWarp prst="textNoShape">
+                <a:avLst/>
+              </a:prstTxWarp>
+              <a:noAutofit/>
+            </a:bodyPr>
+            <a:lstStyle/>
+            <a:p>
+              <a:endParaRPr lang="en-US"/>
+            </a:p>
+          </p:txBody>
+        </p:sp>
+        <p:sp>
+          <p:nvSpPr>
+            <p:cNvPr id="15" name="Oval 14"/>
+            <p:cNvSpPr/>
+            <p:nvPr/>
+          </p:nvSpPr>
+          <p:spPr>
+            <a:xfrm>
+              <a:off x="3344024" y="3164205"/>
+              <a:ext cx="153035" cy="168910"/>
+            </a:xfrm>
+            <a:prstGeom prst="ellipse">
+              <a:avLst/>
+            </a:prstGeom>
+            <a:solidFill>
+              <a:schemeClr val="accent6"/>
+            </a:solidFill>
+            <a:scene3d>
+              <a:camera prst="orthographicFront"/>
+              <a:lightRig rig="threePt" dir="t"/>
+            </a:scene3d>
+            <a:sp3d extrusionH="107950" contourW="12700" prstMaterial="dkEdge">
+              <a:bevelT w="107950" h="107950"/>
+              <a:bevelB w="107950" h="107950"/>
+            </a:sp3d>
+          </p:spPr>
+          <p:style>
+            <a:lnRef idx="2">
+              <a:schemeClr val="accent1">
+                <a:shade val="50000"/>
+              </a:schemeClr>
+            </a:lnRef>
+            <a:fillRef idx="1">
+              <a:schemeClr val="accent1"/>
+            </a:fillRef>
+            <a:effectRef idx="0">
+              <a:schemeClr val="accent1"/>
+            </a:effectRef>
+            <a:fontRef idx="minor">
+              <a:schemeClr val="lt1"/>
+            </a:fontRef>
+          </p:style>
+          <p:txBody>
+            <a:bodyPr rot="0" spcFirstLastPara="0" vert="horz" wrap="square" lIns="91440" tIns="45720" rIns="91440" bIns="45720" numCol="1" spcCol="0" rtlCol="1" fromWordArt="0" anchor="ctr" anchorCtr="0" forceAA="0" compatLnSpc="1">
+              <a:prstTxWarp prst="textNoShape">
+                <a:avLst/>
+              </a:prstTxWarp>
+              <a:noAutofit/>
+            </a:bodyPr>
+            <a:lstStyle/>
+            <a:p>
+              <a:endParaRPr lang="en-US"/>
+            </a:p>
+          </p:txBody>
+        </p:sp>
+        <p:sp>
+          <p:nvSpPr>
+            <p:cNvPr id="16" name="Oval 15"/>
+            <p:cNvSpPr/>
+            <p:nvPr/>
+          </p:nvSpPr>
+          <p:spPr>
+            <a:xfrm>
+              <a:off x="3079115" y="2862580"/>
+              <a:ext cx="153035" cy="168910"/>
+            </a:xfrm>
+            <a:prstGeom prst="ellipse">
+              <a:avLst/>
+            </a:prstGeom>
+            <a:solidFill>
+              <a:schemeClr val="accent6"/>
+            </a:solidFill>
+            <a:scene3d>
+              <a:camera prst="orthographicFront"/>
+              <a:lightRig rig="threePt" dir="t"/>
+            </a:scene3d>
+            <a:sp3d extrusionH="107950" contourW="12700" prstMaterial="dkEdge">
+              <a:bevelT w="107950" h="107950"/>
+              <a:bevelB w="107950" h="107950"/>
+            </a:sp3d>
+          </p:spPr>
+          <p:style>
+            <a:lnRef idx="2">
+              <a:schemeClr val="accent1">
+                <a:shade val="50000"/>
+              </a:schemeClr>
+            </a:lnRef>
+            <a:fillRef idx="1">
+              <a:schemeClr val="accent1"/>
+            </a:fillRef>
+            <a:effectRef idx="0">
+              <a:schemeClr val="accent1"/>
+            </a:effectRef>
+            <a:fontRef idx="minor">
+              <a:schemeClr val="lt1"/>
+            </a:fontRef>
+          </p:style>
+          <p:txBody>
+            <a:bodyPr rot="0" spcFirstLastPara="0" vert="horz" wrap="square" lIns="91440" tIns="45720" rIns="91440" bIns="45720" numCol="1" spcCol="0" rtlCol="1" fromWordArt="0" anchor="ctr" anchorCtr="0" forceAA="0" compatLnSpc="1">
+              <a:prstTxWarp prst="textNoShape">
+                <a:avLst/>
+              </a:prstTxWarp>
+              <a:noAutofit/>
+            </a:bodyPr>
+            <a:lstStyle/>
+            <a:p>
+              <a:endParaRPr lang="en-US"/>
+            </a:p>
+          </p:txBody>
+        </p:sp>
+        <p:sp>
+          <p:nvSpPr>
+            <p:cNvPr id="17" name="Oval 16"/>
+            <p:cNvSpPr/>
+            <p:nvPr/>
+          </p:nvSpPr>
+          <p:spPr>
+            <a:xfrm>
+              <a:off x="2917825" y="2561590"/>
+              <a:ext cx="153035" cy="168910"/>
+            </a:xfrm>
+            <a:prstGeom prst="ellipse">
+              <a:avLst/>
+            </a:prstGeom>
+            <a:solidFill>
+              <a:schemeClr val="accent6"/>
+            </a:solidFill>
+            <a:scene3d>
+              <a:camera prst="orthographicFront"/>
+              <a:lightRig rig="threePt" dir="t"/>
+            </a:scene3d>
+            <a:sp3d extrusionH="107950" contourW="12700" prstMaterial="dkEdge">
+              <a:bevelT w="107950" h="107950"/>
+              <a:bevelB w="107950" h="107950"/>
+            </a:sp3d>
+          </p:spPr>
+          <p:style>
+            <a:lnRef idx="2">
+              <a:schemeClr val="accent1">
+                <a:shade val="50000"/>
+              </a:schemeClr>
+            </a:lnRef>
+            <a:fillRef idx="1">
+              <a:schemeClr val="accent1"/>
+            </a:fillRef>
+            <a:effectRef idx="0">
+              <a:schemeClr val="accent1"/>
+            </a:effectRef>
+            <a:fontRef idx="minor">
+              <a:schemeClr val="lt1"/>
+            </a:fontRef>
+          </p:style>
+          <p:txBody>
+            <a:bodyPr rot="0" spcFirstLastPara="0" vert="horz" wrap="square" lIns="91440" tIns="45720" rIns="91440" bIns="45720" numCol="1" spcCol="0" rtlCol="1" fromWordArt="0" anchor="ctr" anchorCtr="0" forceAA="0" compatLnSpc="1">
+              <a:prstTxWarp prst="textNoShape">
+                <a:avLst/>
+              </a:prstTxWarp>
+              <a:noAutofit/>
+            </a:bodyPr>
+            <a:lstStyle/>
+            <a:p>
+              <a:endParaRPr lang="en-US"/>
+            </a:p>
+          </p:txBody>
+        </p:sp>
+        <p:sp>
+          <p:nvSpPr>
+            <p:cNvPr id="18" name="Oval 17"/>
+            <p:cNvSpPr/>
+            <p:nvPr/>
+          </p:nvSpPr>
+          <p:spPr>
+            <a:xfrm>
+              <a:off x="2804795" y="2292350"/>
+              <a:ext cx="153035" cy="168910"/>
+            </a:xfrm>
+            <a:prstGeom prst="ellipse">
+              <a:avLst/>
+            </a:prstGeom>
+            <a:solidFill>
+              <a:schemeClr val="accent6"/>
+            </a:solidFill>
+            <a:scene3d>
+              <a:camera prst="orthographicFront"/>
+              <a:lightRig rig="threePt" dir="t"/>
+            </a:scene3d>
+            <a:sp3d extrusionH="107950" contourW="12700" prstMaterial="dkEdge">
+              <a:bevelT w="107950" h="107950"/>
+              <a:bevelB w="107950" h="107950"/>
+            </a:sp3d>
+          </p:spPr>
+          <p:style>
+            <a:lnRef idx="2">
+              <a:schemeClr val="accent1">
+                <a:shade val="50000"/>
+              </a:schemeClr>
+            </a:lnRef>
+            <a:fillRef idx="1">
+              <a:schemeClr val="accent1"/>
+            </a:fillRef>
+            <a:effectRef idx="0">
+              <a:schemeClr val="accent1"/>
+            </a:effectRef>
+            <a:fontRef idx="minor">
+              <a:schemeClr val="lt1"/>
+            </a:fontRef>
+          </p:style>
+          <p:txBody>
+            <a:bodyPr rot="0" spcFirstLastPara="0" vert="horz" wrap="square" lIns="91440" tIns="45720" rIns="91440" bIns="45720" numCol="1" spcCol="0" rtlCol="1" fromWordArt="0" anchor="ctr" anchorCtr="0" forceAA="0" compatLnSpc="1">
+              <a:prstTxWarp prst="textNoShape">
+                <a:avLst/>
+              </a:prstTxWarp>
+              <a:noAutofit/>
+            </a:bodyPr>
+            <a:lstStyle/>
+            <a:p>
+              <a:endParaRPr lang="en-US"/>
+            </a:p>
+          </p:txBody>
+        </p:sp>
+        <p:sp>
+          <p:nvSpPr>
+            <p:cNvPr id="19" name="Oval 18"/>
+            <p:cNvSpPr/>
+            <p:nvPr/>
+          </p:nvSpPr>
+          <p:spPr>
+            <a:xfrm>
+              <a:off x="2762885" y="1943100"/>
+              <a:ext cx="153035" cy="168910"/>
+            </a:xfrm>
+            <a:prstGeom prst="ellipse">
+              <a:avLst/>
+            </a:prstGeom>
+            <a:solidFill>
+              <a:schemeClr val="accent6"/>
+            </a:solidFill>
+            <a:scene3d>
+              <a:camera prst="orthographicFront"/>
+              <a:lightRig rig="threePt" dir="t"/>
+            </a:scene3d>
+            <a:sp3d extrusionH="107950" contourW="12700" prstMaterial="dkEdge">
+              <a:bevelT w="107950" h="107950"/>
+              <a:bevelB w="107950" h="107950"/>
+            </a:sp3d>
+          </p:spPr>
+          <p:style>
+            <a:lnRef idx="2">
+              <a:schemeClr val="accent1">
+                <a:shade val="50000"/>
+              </a:schemeClr>
+            </a:lnRef>
+            <a:fillRef idx="1">
+              <a:schemeClr val="accent1"/>
+            </a:fillRef>
+            <a:effectRef idx="0">
+              <a:schemeClr val="accent1"/>
+            </a:effectRef>
+            <a:fontRef idx="minor">
+              <a:schemeClr val="lt1"/>
+            </a:fontRef>
+          </p:style>
+          <p:txBody>
+            <a:bodyPr rot="0" spcFirstLastPara="0" vert="horz" wrap="square" lIns="91440" tIns="45720" rIns="91440" bIns="45720" numCol="1" spcCol="0" rtlCol="1" fromWordArt="0" anchor="ctr" anchorCtr="0" forceAA="0" compatLnSpc="1">
+              <a:prstTxWarp prst="textNoShape">
+                <a:avLst/>
+              </a:prstTxWarp>
+              <a:noAutofit/>
+            </a:bodyPr>
+            <a:lstStyle/>
+            <a:p>
+              <a:endParaRPr lang="en-US"/>
+            </a:p>
+          </p:txBody>
+        </p:sp>
+        <p:sp>
+          <p:nvSpPr>
+            <p:cNvPr id="20" name="Oval 19"/>
+            <p:cNvSpPr/>
+            <p:nvPr/>
+          </p:nvSpPr>
+          <p:spPr>
+            <a:xfrm>
+              <a:off x="2900045" y="1684655"/>
+              <a:ext cx="153035" cy="168910"/>
+            </a:xfrm>
+            <a:prstGeom prst="ellipse">
+              <a:avLst/>
+            </a:prstGeom>
+            <a:solidFill>
+              <a:schemeClr val="accent6"/>
+            </a:solidFill>
+            <a:scene3d>
+              <a:camera prst="orthographicFront"/>
+              <a:lightRig rig="threePt" dir="t"/>
+            </a:scene3d>
+            <a:sp3d extrusionH="107950" contourW="12700" prstMaterial="dkEdge">
+              <a:bevelT w="107950" h="107950"/>
+              <a:bevelB w="107950" h="107950"/>
+            </a:sp3d>
+          </p:spPr>
+          <p:style>
+            <a:lnRef idx="2">
+              <a:schemeClr val="accent1">
+                <a:shade val="50000"/>
+              </a:schemeClr>
+            </a:lnRef>
+            <a:fillRef idx="1">
+              <a:schemeClr val="accent1"/>
+            </a:fillRef>
+            <a:effectRef idx="0">
+              <a:schemeClr val="accent1"/>
+            </a:effectRef>
+            <a:fontRef idx="minor">
+              <a:schemeClr val="lt1"/>
+            </a:fontRef>
+          </p:style>
+          <p:txBody>
+            <a:bodyPr rot="0" spcFirstLastPara="0" vert="horz" wrap="square" lIns="91440" tIns="45720" rIns="91440" bIns="45720" numCol="1" spcCol="0" rtlCol="1" fromWordArt="0" anchor="ctr" anchorCtr="0" forceAA="0" compatLnSpc="1">
+              <a:prstTxWarp prst="textNoShape">
+                <a:avLst/>
+              </a:prstTxWarp>
+              <a:noAutofit/>
+            </a:bodyPr>
+            <a:lstStyle/>
+            <a:p>
+              <a:endParaRPr lang="en-US"/>
+            </a:p>
+          </p:txBody>
+        </p:sp>
+        <p:sp>
+          <p:nvSpPr>
+            <p:cNvPr id="21" name="Oval 20"/>
+            <p:cNvSpPr/>
+            <p:nvPr/>
+          </p:nvSpPr>
+          <p:spPr>
+            <a:xfrm>
+              <a:off x="4231005" y="1165225"/>
+              <a:ext cx="153035" cy="168910"/>
+            </a:xfrm>
+            <a:prstGeom prst="ellipse">
+              <a:avLst/>
+            </a:prstGeom>
+            <a:solidFill>
+              <a:schemeClr val="accent6"/>
+            </a:solidFill>
+            <a:scene3d>
+              <a:camera prst="orthographicFront"/>
+              <a:lightRig rig="threePt" dir="t"/>
+            </a:scene3d>
+            <a:sp3d extrusionH="107950" contourW="12700" prstMaterial="dkEdge">
+              <a:bevelT w="107950" h="107950"/>
+              <a:bevelB w="107950" h="107950"/>
+            </a:sp3d>
+          </p:spPr>
+          <p:style>
+            <a:lnRef idx="2">
+              <a:schemeClr val="accent1">
+                <a:shade val="50000"/>
+              </a:schemeClr>
+            </a:lnRef>
+            <a:fillRef idx="1">
+              <a:schemeClr val="accent1"/>
+            </a:fillRef>
+            <a:effectRef idx="0">
+              <a:schemeClr val="accent1"/>
+            </a:effectRef>
+            <a:fontRef idx="minor">
+              <a:schemeClr val="lt1"/>
+            </a:fontRef>
+          </p:style>
+          <p:txBody>
+            <a:bodyPr rot="0" spcFirstLastPara="0" vert="horz" wrap="square" lIns="91440" tIns="45720" rIns="91440" bIns="45720" numCol="1" spcCol="0" rtlCol="1" fromWordArt="0" anchor="ctr" anchorCtr="0" forceAA="0" compatLnSpc="1">
+              <a:prstTxWarp prst="textNoShape">
+                <a:avLst/>
+              </a:prstTxWarp>
+              <a:noAutofit/>
+            </a:bodyPr>
+            <a:lstStyle/>
+            <a:p>
+              <a:endParaRPr lang="en-US"/>
+            </a:p>
+          </p:txBody>
+        </p:sp>
+        <p:sp>
+          <p:nvSpPr>
+            <p:cNvPr id="22" name="Oval 21"/>
+            <p:cNvSpPr/>
+            <p:nvPr/>
+          </p:nvSpPr>
+          <p:spPr>
+            <a:xfrm>
+              <a:off x="3871594" y="1213686"/>
+              <a:ext cx="153035" cy="168910"/>
+            </a:xfrm>
+            <a:prstGeom prst="ellipse">
+              <a:avLst/>
+            </a:prstGeom>
+            <a:solidFill>
+              <a:schemeClr val="accent6"/>
+            </a:solidFill>
+            <a:scene3d>
+              <a:camera prst="orthographicFront"/>
+              <a:lightRig rig="threePt" dir="t"/>
+            </a:scene3d>
+            <a:sp3d extrusionH="107950" contourW="12700" prstMaterial="dkEdge">
+              <a:bevelT w="107950" h="107950"/>
+              <a:bevelB w="107950" h="107950"/>
+            </a:sp3d>
+          </p:spPr>
+          <p:style>
+            <a:lnRef idx="2">
+              <a:schemeClr val="accent1">
+                <a:shade val="50000"/>
+              </a:schemeClr>
+            </a:lnRef>
+            <a:fillRef idx="1">
+              <a:schemeClr val="accent1"/>
+            </a:fillRef>
+            <a:effectRef idx="0">
+              <a:schemeClr val="accent1"/>
+            </a:effectRef>
+            <a:fontRef idx="minor">
+              <a:schemeClr val="lt1"/>
+            </a:fontRef>
+          </p:style>
+          <p:txBody>
+            <a:bodyPr rot="0" spcFirstLastPara="0" vert="horz" wrap="square" lIns="91440" tIns="45720" rIns="91440" bIns="45720" numCol="1" spcCol="0" rtlCol="1" fromWordArt="0" anchor="ctr" anchorCtr="0" forceAA="0" compatLnSpc="1">
+              <a:prstTxWarp prst="textNoShape">
+                <a:avLst/>
+              </a:prstTxWarp>
+              <a:noAutofit/>
+            </a:bodyPr>
+            <a:lstStyle/>
+            <a:p>
+              <a:endParaRPr lang="en-US"/>
+            </a:p>
+          </p:txBody>
+        </p:sp>
+        <p:sp>
+          <p:nvSpPr>
+            <p:cNvPr id="23" name="Oval 22"/>
+            <p:cNvSpPr/>
+            <p:nvPr/>
+          </p:nvSpPr>
+          <p:spPr>
+            <a:xfrm>
+              <a:off x="3497580" y="1298575"/>
+              <a:ext cx="153035" cy="168910"/>
+            </a:xfrm>
+            <a:prstGeom prst="ellipse">
+              <a:avLst/>
+            </a:prstGeom>
+            <a:solidFill>
+              <a:schemeClr val="accent6"/>
+            </a:solidFill>
+            <a:scene3d>
+              <a:camera prst="orthographicFront"/>
+              <a:lightRig rig="threePt" dir="t"/>
+            </a:scene3d>
+            <a:sp3d extrusionH="107950" contourW="12700" prstMaterial="dkEdge">
+              <a:bevelT w="107950" h="107950"/>
+              <a:bevelB w="107950" h="107950"/>
+            </a:sp3d>
+          </p:spPr>
+          <p:style>
+            <a:lnRef idx="2">
+              <a:schemeClr val="accent1">
+                <a:shade val="50000"/>
+              </a:schemeClr>
+            </a:lnRef>
+            <a:fillRef idx="1">
+              <a:schemeClr val="accent1"/>
+            </a:fillRef>
+            <a:effectRef idx="0">
+              <a:schemeClr val="accent1"/>
+            </a:effectRef>
+            <a:fontRef idx="minor">
+              <a:schemeClr val="lt1"/>
+            </a:fontRef>
+          </p:style>
+          <p:txBody>
+            <a:bodyPr rot="0" spcFirstLastPara="0" vert="horz" wrap="square" lIns="91440" tIns="45720" rIns="91440" bIns="45720" numCol="1" spcCol="0" rtlCol="1" fromWordArt="0" anchor="ctr" anchorCtr="0" forceAA="0" compatLnSpc="1">
+              <a:prstTxWarp prst="textNoShape">
+                <a:avLst/>
+              </a:prstTxWarp>
+              <a:noAutofit/>
+            </a:bodyPr>
+            <a:lstStyle/>
+            <a:p>
+              <a:endParaRPr lang="en-US"/>
+            </a:p>
+          </p:txBody>
+        </p:sp>
+        <p:sp>
+          <p:nvSpPr>
+            <p:cNvPr id="24" name="Oval 23"/>
+            <p:cNvSpPr/>
+            <p:nvPr/>
+          </p:nvSpPr>
+          <p:spPr>
+            <a:xfrm>
+              <a:off x="4078605" y="3618865"/>
+              <a:ext cx="153035" cy="168910"/>
+            </a:xfrm>
+            <a:prstGeom prst="ellipse">
+              <a:avLst/>
+            </a:prstGeom>
+            <a:solidFill>
+              <a:schemeClr val="accent6"/>
+            </a:solidFill>
+            <a:scene3d>
+              <a:camera prst="orthographicFront"/>
+              <a:lightRig rig="threePt" dir="t"/>
+            </a:scene3d>
+            <a:sp3d extrusionH="107950" contourW="12700" prstMaterial="dkEdge">
+              <a:bevelT w="107950" h="107950"/>
+              <a:bevelB w="107950" h="107950"/>
+            </a:sp3d>
+          </p:spPr>
+          <p:style>
+            <a:lnRef idx="2">
+              <a:schemeClr val="accent1">
+                <a:shade val="50000"/>
+              </a:schemeClr>
+            </a:lnRef>
+            <a:fillRef idx="1">
+              <a:schemeClr val="accent1"/>
+            </a:fillRef>
+            <a:effectRef idx="0">
+              <a:schemeClr val="accent1"/>
+            </a:effectRef>
+            <a:fontRef idx="minor">
+              <a:schemeClr val="lt1"/>
+            </a:fontRef>
+          </p:style>
+          <p:txBody>
+            <a:bodyPr rot="0" spcFirstLastPara="0" vert="horz" wrap="square" lIns="91440" tIns="45720" rIns="91440" bIns="45720" numCol="1" spcCol="0" rtlCol="1" fromWordArt="0" anchor="ctr" anchorCtr="0" forceAA="0" compatLnSpc="1">
+              <a:prstTxWarp prst="textNoShape">
+                <a:avLst/>
+              </a:prstTxWarp>
+              <a:noAutofit/>
+            </a:bodyPr>
+            <a:lstStyle/>
+            <a:p>
+              <a:endParaRPr lang="en-US"/>
+            </a:p>
+          </p:txBody>
+        </p:sp>
+        <p:sp>
+          <p:nvSpPr>
+            <p:cNvPr id="25" name="Oval 24"/>
+            <p:cNvSpPr/>
+            <p:nvPr/>
+          </p:nvSpPr>
+          <p:spPr>
+            <a:xfrm>
+              <a:off x="4321810" y="3465830"/>
+              <a:ext cx="153035" cy="168910"/>
+            </a:xfrm>
+            <a:prstGeom prst="ellipse">
+              <a:avLst/>
+            </a:prstGeom>
+            <a:solidFill>
+              <a:schemeClr val="accent6"/>
+            </a:solidFill>
+            <a:scene3d>
+              <a:camera prst="orthographicFront"/>
+              <a:lightRig rig="threePt" dir="t"/>
+            </a:scene3d>
+            <a:sp3d extrusionH="107950" contourW="12700" prstMaterial="dkEdge">
+              <a:bevelT w="107950" h="107950"/>
+              <a:bevelB w="107950" h="107950"/>
+            </a:sp3d>
+          </p:spPr>
+          <p:style>
+            <a:lnRef idx="2">
+              <a:schemeClr val="accent1">
+                <a:shade val="50000"/>
+              </a:schemeClr>
+            </a:lnRef>
+            <a:fillRef idx="1">
+              <a:schemeClr val="accent1"/>
+            </a:fillRef>
+            <a:effectRef idx="0">
+              <a:schemeClr val="accent1"/>
+            </a:effectRef>
+            <a:fontRef idx="minor">
+              <a:schemeClr val="lt1"/>
+            </a:fontRef>
+          </p:style>
+          <p:txBody>
+            <a:bodyPr rot="0" spcFirstLastPara="0" vert="horz" wrap="square" lIns="91440" tIns="45720" rIns="91440" bIns="45720" numCol="1" spcCol="0" rtlCol="1" fromWordArt="0" anchor="ctr" anchorCtr="0" forceAA="0" compatLnSpc="1">
+              <a:prstTxWarp prst="textNoShape">
+                <a:avLst/>
+              </a:prstTxWarp>
+              <a:noAutofit/>
+            </a:bodyPr>
+            <a:lstStyle/>
+            <a:p>
+              <a:endParaRPr lang="en-US"/>
+            </a:p>
+          </p:txBody>
+        </p:sp>
+        <p:sp>
+          <p:nvSpPr>
+            <p:cNvPr id="26" name="Oval 25"/>
+            <p:cNvSpPr/>
+            <p:nvPr/>
+          </p:nvSpPr>
+          <p:spPr>
+            <a:xfrm>
+              <a:off x="4585970" y="3285490"/>
+              <a:ext cx="153035" cy="168910"/>
+            </a:xfrm>
+            <a:prstGeom prst="ellipse">
+              <a:avLst/>
+            </a:prstGeom>
+            <a:solidFill>
+              <a:schemeClr val="accent6"/>
+            </a:solidFill>
+            <a:scene3d>
+              <a:camera prst="orthographicFront"/>
+              <a:lightRig rig="threePt" dir="t"/>
+            </a:scene3d>
+            <a:sp3d extrusionH="107950" contourW="12700" prstMaterial="dkEdge">
+              <a:bevelT w="107950" h="107950"/>
+              <a:bevelB w="107950" h="107950"/>
+            </a:sp3d>
+          </p:spPr>
+          <p:style>
+            <a:lnRef idx="2">
+              <a:schemeClr val="accent1">
+                <a:shade val="50000"/>
+              </a:schemeClr>
+            </a:lnRef>
+            <a:fillRef idx="1">
+              <a:schemeClr val="accent1"/>
+            </a:fillRef>
+            <a:effectRef idx="0">
+              <a:schemeClr val="accent1"/>
+            </a:effectRef>
+            <a:fontRef idx="minor">
+              <a:schemeClr val="lt1"/>
+            </a:fontRef>
+          </p:style>
+          <p:txBody>
+            <a:bodyPr rot="0" spcFirstLastPara="0" vert="horz" wrap="square" lIns="91440" tIns="45720" rIns="91440" bIns="45720" numCol="1" spcCol="0" rtlCol="1" fromWordArt="0" anchor="ctr" anchorCtr="0" forceAA="0" compatLnSpc="1">
+              <a:prstTxWarp prst="textNoShape">
+                <a:avLst/>
+              </a:prstTxWarp>
+              <a:noAutofit/>
+            </a:bodyPr>
+            <a:lstStyle/>
+            <a:p>
+              <a:endParaRPr lang="en-US"/>
+            </a:p>
+          </p:txBody>
+        </p:sp>
+        <p:sp>
+          <p:nvSpPr>
+            <p:cNvPr id="27" name="Oval 26"/>
+            <p:cNvSpPr/>
+            <p:nvPr/>
+          </p:nvSpPr>
+          <p:spPr>
+            <a:xfrm>
+              <a:off x="4863465" y="3079750"/>
+              <a:ext cx="153035" cy="168910"/>
+            </a:xfrm>
+            <a:prstGeom prst="ellipse">
+              <a:avLst/>
+            </a:prstGeom>
+            <a:solidFill>
+              <a:schemeClr val="accent6"/>
+            </a:solidFill>
+            <a:scene3d>
+              <a:camera prst="orthographicFront"/>
+              <a:lightRig rig="threePt" dir="t"/>
+            </a:scene3d>
+            <a:sp3d extrusionH="107950" contourW="12700" prstMaterial="dkEdge">
+              <a:bevelT w="107950" h="107950"/>
+              <a:bevelB w="107950" h="107950"/>
+            </a:sp3d>
+          </p:spPr>
+          <p:style>
+            <a:lnRef idx="2">
+              <a:schemeClr val="accent1">
+                <a:shade val="50000"/>
+              </a:schemeClr>
+            </a:lnRef>
+            <a:fillRef idx="1">
+              <a:schemeClr val="accent1"/>
+            </a:fillRef>
+            <a:effectRef idx="0">
+              <a:schemeClr val="accent1"/>
+            </a:effectRef>
+            <a:fontRef idx="minor">
+              <a:schemeClr val="lt1"/>
+            </a:fontRef>
+          </p:style>
+          <p:txBody>
+            <a:bodyPr rot="0" spcFirstLastPara="0" vert="horz" wrap="square" lIns="91440" tIns="45720" rIns="91440" bIns="45720" numCol="1" spcCol="0" rtlCol="1" fromWordArt="0" anchor="ctr" anchorCtr="0" forceAA="0" compatLnSpc="1">
+              <a:prstTxWarp prst="textNoShape">
+                <a:avLst/>
+              </a:prstTxWarp>
+              <a:noAutofit/>
+            </a:bodyPr>
+            <a:lstStyle/>
+            <a:p>
+              <a:endParaRPr lang="en-US"/>
+            </a:p>
+          </p:txBody>
+        </p:sp>
+        <p:sp>
+          <p:nvSpPr>
+            <p:cNvPr id="28" name="Oval 27"/>
+            <p:cNvSpPr/>
+            <p:nvPr/>
+          </p:nvSpPr>
+          <p:spPr>
+            <a:xfrm>
+              <a:off x="5088255" y="2889250"/>
+              <a:ext cx="153035" cy="168910"/>
+            </a:xfrm>
+            <a:prstGeom prst="ellipse">
+              <a:avLst/>
+            </a:prstGeom>
+            <a:solidFill>
+              <a:schemeClr val="accent6"/>
+            </a:solidFill>
+            <a:scene3d>
+              <a:camera prst="orthographicFront"/>
+              <a:lightRig rig="threePt" dir="t"/>
+            </a:scene3d>
+            <a:sp3d extrusionH="107950" contourW="12700" prstMaterial="dkEdge">
+              <a:bevelT w="107950" h="107950"/>
+              <a:bevelB w="107950" h="107950"/>
+            </a:sp3d>
+          </p:spPr>
+          <p:style>
+            <a:lnRef idx="2">
+              <a:schemeClr val="accent1">
+                <a:shade val="50000"/>
+              </a:schemeClr>
+            </a:lnRef>
+            <a:fillRef idx="1">
+              <a:schemeClr val="accent1"/>
+            </a:fillRef>
+            <a:effectRef idx="0">
+              <a:schemeClr val="accent1"/>
+            </a:effectRef>
+            <a:fontRef idx="minor">
+              <a:schemeClr val="lt1"/>
+            </a:fontRef>
+          </p:style>
+          <p:txBody>
+            <a:bodyPr rot="0" spcFirstLastPara="0" vert="horz" wrap="square" lIns="91440" tIns="45720" rIns="91440" bIns="45720" numCol="1" spcCol="0" rtlCol="1" fromWordArt="0" anchor="ctr" anchorCtr="0" forceAA="0" compatLnSpc="1">
+              <a:prstTxWarp prst="textNoShape">
+                <a:avLst/>
+              </a:prstTxWarp>
+              <a:noAutofit/>
+            </a:bodyPr>
+            <a:lstStyle/>
+            <a:p>
+              <a:endParaRPr lang="en-US"/>
+            </a:p>
+          </p:txBody>
+        </p:sp>
+        <p:sp>
+          <p:nvSpPr>
+            <p:cNvPr id="29" name="Oval 28"/>
+            <p:cNvSpPr/>
+            <p:nvPr/>
+          </p:nvSpPr>
+          <p:spPr>
+            <a:xfrm>
+              <a:off x="5315585" y="2640965"/>
+              <a:ext cx="153035" cy="168910"/>
+            </a:xfrm>
+            <a:prstGeom prst="ellipse">
+              <a:avLst/>
+            </a:prstGeom>
+            <a:solidFill>
+              <a:schemeClr val="accent6"/>
+            </a:solidFill>
+            <a:scene3d>
+              <a:camera prst="orthographicFront"/>
+              <a:lightRig rig="threePt" dir="t"/>
+            </a:scene3d>
+            <a:sp3d extrusionH="107950" contourW="12700" prstMaterial="dkEdge">
+              <a:bevelT w="107950" h="107950"/>
+              <a:bevelB w="107950" h="107950"/>
+            </a:sp3d>
+          </p:spPr>
+          <p:style>
+            <a:lnRef idx="2">
+              <a:schemeClr val="accent1">
+                <a:shade val="50000"/>
+              </a:schemeClr>
+            </a:lnRef>
+            <a:fillRef idx="1">
+              <a:schemeClr val="accent1"/>
+            </a:fillRef>
+            <a:effectRef idx="0">
+              <a:schemeClr val="accent1"/>
+            </a:effectRef>
+            <a:fontRef idx="minor">
+              <a:schemeClr val="lt1"/>
+            </a:fontRef>
+          </p:style>
+          <p:txBody>
+            <a:bodyPr rot="0" spcFirstLastPara="0" vert="horz" wrap="square" lIns="91440" tIns="45720" rIns="91440" bIns="45720" numCol="1" spcCol="0" rtlCol="1" fromWordArt="0" anchor="ctr" anchorCtr="0" forceAA="0" compatLnSpc="1">
+              <a:prstTxWarp prst="textNoShape">
+                <a:avLst/>
+              </a:prstTxWarp>
+              <a:noAutofit/>
+            </a:bodyPr>
+            <a:lstStyle/>
+            <a:p>
+              <a:endParaRPr lang="en-US"/>
+            </a:p>
+          </p:txBody>
+        </p:sp>
+        <p:sp>
+          <p:nvSpPr>
+            <p:cNvPr id="30" name="Oval 29"/>
+            <p:cNvSpPr/>
+            <p:nvPr/>
+          </p:nvSpPr>
+          <p:spPr>
+            <a:xfrm>
+              <a:off x="5511165" y="2408555"/>
+              <a:ext cx="153035" cy="168910"/>
+            </a:xfrm>
+            <a:prstGeom prst="ellipse">
+              <a:avLst/>
+            </a:prstGeom>
+            <a:solidFill>
+              <a:schemeClr val="accent6"/>
+            </a:solidFill>
+            <a:scene3d>
+              <a:camera prst="orthographicFront"/>
+              <a:lightRig rig="threePt" dir="t"/>
+            </a:scene3d>
+            <a:sp3d extrusionH="107950" contourW="12700" prstMaterial="dkEdge">
+              <a:bevelT w="107950" h="107950"/>
+              <a:bevelB w="107950" h="107950"/>
+            </a:sp3d>
+          </p:spPr>
+          <p:style>
+            <a:lnRef idx="2">
+              <a:schemeClr val="accent1">
+                <a:shade val="50000"/>
+              </a:schemeClr>
+            </a:lnRef>
+            <a:fillRef idx="1">
+              <a:schemeClr val="accent1"/>
+            </a:fillRef>
+            <a:effectRef idx="0">
+              <a:schemeClr val="accent1"/>
+            </a:effectRef>
+            <a:fontRef idx="minor">
+              <a:schemeClr val="lt1"/>
+            </a:fontRef>
+          </p:style>
+          <p:txBody>
+            <a:bodyPr rot="0" spcFirstLastPara="0" vert="horz" wrap="square" lIns="91440" tIns="45720" rIns="91440" bIns="45720" numCol="1" spcCol="0" rtlCol="1" fromWordArt="0" anchor="ctr" anchorCtr="0" forceAA="0" compatLnSpc="1">
+              <a:prstTxWarp prst="textNoShape">
+                <a:avLst/>
+              </a:prstTxWarp>
+              <a:noAutofit/>
+            </a:bodyPr>
+            <a:lstStyle/>
+            <a:p>
+              <a:endParaRPr lang="en-US"/>
+            </a:p>
+          </p:txBody>
+        </p:sp>
+        <p:sp>
+          <p:nvSpPr>
+            <p:cNvPr id="31" name="Oval 30"/>
+            <p:cNvSpPr/>
+            <p:nvPr/>
+          </p:nvSpPr>
+          <p:spPr>
+            <a:xfrm>
+              <a:off x="5685155" y="2159000"/>
+              <a:ext cx="153035" cy="168910"/>
+            </a:xfrm>
+            <a:prstGeom prst="ellipse">
+              <a:avLst/>
+            </a:prstGeom>
+            <a:solidFill>
+              <a:schemeClr val="accent6"/>
+            </a:solidFill>
+            <a:scene3d>
+              <a:camera prst="orthographicFront"/>
+              <a:lightRig rig="threePt" dir="t"/>
+            </a:scene3d>
+            <a:sp3d extrusionH="107950" contourW="12700" prstMaterial="dkEdge">
+              <a:bevelT w="107950" h="107950"/>
+              <a:bevelB w="107950" h="107950"/>
+            </a:sp3d>
+          </p:spPr>
+          <p:style>
+            <a:lnRef idx="2">
+              <a:schemeClr val="accent1">
+                <a:shade val="50000"/>
+              </a:schemeClr>
+            </a:lnRef>
+            <a:fillRef idx="1">
+              <a:schemeClr val="accent1"/>
+            </a:fillRef>
+            <a:effectRef idx="0">
+              <a:schemeClr val="accent1"/>
+            </a:effectRef>
+            <a:fontRef idx="minor">
+              <a:schemeClr val="lt1"/>
+            </a:fontRef>
+          </p:style>
+          <p:txBody>
+            <a:bodyPr rot="0" spcFirstLastPara="0" vert="horz" wrap="square" lIns="91440" tIns="45720" rIns="91440" bIns="45720" numCol="1" spcCol="0" rtlCol="1" fromWordArt="0" anchor="ctr" anchorCtr="0" forceAA="0" compatLnSpc="1">
+              <a:prstTxWarp prst="textNoShape">
+                <a:avLst/>
+              </a:prstTxWarp>
+              <a:noAutofit/>
+            </a:bodyPr>
+            <a:lstStyle/>
+            <a:p>
+              <a:endParaRPr lang="en-US"/>
+            </a:p>
+          </p:txBody>
+        </p:sp>
+        <p:sp>
+          <p:nvSpPr>
+            <p:cNvPr id="32" name="Oval 31"/>
+            <p:cNvSpPr/>
+            <p:nvPr/>
+          </p:nvSpPr>
+          <p:spPr>
+            <a:xfrm>
+              <a:off x="5770245" y="1863725"/>
+              <a:ext cx="153035" cy="168910"/>
+            </a:xfrm>
+            <a:prstGeom prst="ellipse">
+              <a:avLst/>
+            </a:prstGeom>
+            <a:solidFill>
+              <a:schemeClr val="accent6"/>
+            </a:solidFill>
+            <a:scene3d>
+              <a:camera prst="orthographicFront"/>
+              <a:lightRig rig="threePt" dir="t"/>
+            </a:scene3d>
+            <a:sp3d extrusionH="107950" contourW="12700" prstMaterial="dkEdge">
+              <a:bevelT w="107950" h="107950"/>
+              <a:bevelB w="107950" h="107950"/>
+            </a:sp3d>
+          </p:spPr>
+          <p:style>
+            <a:lnRef idx="2">
+              <a:schemeClr val="accent1">
+                <a:shade val="50000"/>
+              </a:schemeClr>
+            </a:lnRef>
+            <a:fillRef idx="1">
+              <a:schemeClr val="accent1"/>
+            </a:fillRef>
+            <a:effectRef idx="0">
+              <a:schemeClr val="accent1"/>
+            </a:effectRef>
+            <a:fontRef idx="minor">
+              <a:schemeClr val="lt1"/>
+            </a:fontRef>
+          </p:style>
+          <p:txBody>
+            <a:bodyPr rot="0" spcFirstLastPara="0" vert="horz" wrap="square" lIns="91440" tIns="45720" rIns="91440" bIns="45720" numCol="1" spcCol="0" rtlCol="1" fromWordArt="0" anchor="ctr" anchorCtr="0" forceAA="0" compatLnSpc="1">
+              <a:prstTxWarp prst="textNoShape">
+                <a:avLst/>
+              </a:prstTxWarp>
+              <a:noAutofit/>
+            </a:bodyPr>
+            <a:lstStyle/>
+            <a:p>
+              <a:endParaRPr lang="en-US"/>
+            </a:p>
+          </p:txBody>
+        </p:sp>
+        <p:sp>
+          <p:nvSpPr>
+            <p:cNvPr id="33" name="Oval 32"/>
+            <p:cNvSpPr/>
+            <p:nvPr/>
+          </p:nvSpPr>
+          <p:spPr>
+            <a:xfrm>
+              <a:off x="4575810" y="1207770"/>
+              <a:ext cx="153035" cy="168910"/>
+            </a:xfrm>
+            <a:prstGeom prst="ellipse">
+              <a:avLst/>
+            </a:prstGeom>
+            <a:solidFill>
+              <a:schemeClr val="accent6"/>
+            </a:solidFill>
+            <a:scene3d>
+              <a:camera prst="orthographicFront"/>
+              <a:lightRig rig="threePt" dir="t"/>
+            </a:scene3d>
+            <a:sp3d extrusionH="107950" contourW="12700" prstMaterial="dkEdge">
+              <a:bevelT w="107950" h="107950"/>
+              <a:bevelB w="107950" h="107950"/>
+            </a:sp3d>
+          </p:spPr>
+          <p:style>
+            <a:lnRef idx="2">
+              <a:schemeClr val="accent1">
+                <a:shade val="50000"/>
+              </a:schemeClr>
+            </a:lnRef>
+            <a:fillRef idx="1">
+              <a:schemeClr val="accent1"/>
+            </a:fillRef>
+            <a:effectRef idx="0">
+              <a:schemeClr val="accent1"/>
+            </a:effectRef>
+            <a:fontRef idx="minor">
+              <a:schemeClr val="lt1"/>
+            </a:fontRef>
+          </p:style>
+          <p:txBody>
+            <a:bodyPr rot="0" spcFirstLastPara="0" vert="horz" wrap="square" lIns="91440" tIns="45720" rIns="91440" bIns="45720" numCol="1" spcCol="0" rtlCol="1" fromWordArt="0" anchor="ctr" anchorCtr="0" forceAA="0" compatLnSpc="1">
+              <a:prstTxWarp prst="textNoShape">
+                <a:avLst/>
+              </a:prstTxWarp>
+              <a:noAutofit/>
+            </a:bodyPr>
+            <a:lstStyle/>
+            <a:p>
+              <a:endParaRPr lang="en-US"/>
+            </a:p>
+          </p:txBody>
+        </p:sp>
+        <p:sp>
+          <p:nvSpPr>
+            <p:cNvPr id="34" name="Oval 33"/>
+            <p:cNvSpPr/>
+            <p:nvPr/>
+          </p:nvSpPr>
+          <p:spPr>
+            <a:xfrm>
+              <a:off x="4924425" y="1299210"/>
+              <a:ext cx="153035" cy="168910"/>
+            </a:xfrm>
+            <a:prstGeom prst="ellipse">
+              <a:avLst/>
+            </a:prstGeom>
+            <a:solidFill>
+              <a:schemeClr val="accent6"/>
+            </a:solidFill>
+            <a:scene3d>
+              <a:camera prst="orthographicFront"/>
+              <a:lightRig rig="threePt" dir="t"/>
+            </a:scene3d>
+            <a:sp3d extrusionH="107950" contourW="12700" prstMaterial="dkEdge">
+              <a:bevelT w="107950" h="107950"/>
+              <a:bevelB w="107950" h="107950"/>
+            </a:sp3d>
+          </p:spPr>
+          <p:style>
+            <a:lnRef idx="2">
+              <a:schemeClr val="accent1">
+                <a:shade val="50000"/>
+              </a:schemeClr>
+            </a:lnRef>
+            <a:fillRef idx="1">
+              <a:schemeClr val="accent1"/>
+            </a:fillRef>
+            <a:effectRef idx="0">
+              <a:schemeClr val="accent1"/>
+            </a:effectRef>
+            <a:fontRef idx="minor">
+              <a:schemeClr val="lt1"/>
+            </a:fontRef>
+          </p:style>
+          <p:txBody>
+            <a:bodyPr rot="0" spcFirstLastPara="0" vert="horz" wrap="square" lIns="91440" tIns="45720" rIns="91440" bIns="45720" numCol="1" spcCol="0" rtlCol="1" fromWordArt="0" anchor="ctr" anchorCtr="0" forceAA="0" compatLnSpc="1">
+              <a:prstTxWarp prst="textNoShape">
+                <a:avLst/>
+              </a:prstTxWarp>
+              <a:noAutofit/>
+            </a:bodyPr>
+            <a:lstStyle/>
+            <a:p>
+              <a:endParaRPr lang="en-US"/>
+            </a:p>
+          </p:txBody>
+        </p:sp>
+        <p:sp>
+          <p:nvSpPr>
+            <p:cNvPr id="35" name="Oval 34"/>
+            <p:cNvSpPr/>
+            <p:nvPr/>
+          </p:nvSpPr>
+          <p:spPr>
+            <a:xfrm>
+              <a:off x="5283835" y="1457325"/>
+              <a:ext cx="153035" cy="168910"/>
+            </a:xfrm>
+            <a:prstGeom prst="ellipse">
+              <a:avLst/>
+            </a:prstGeom>
+            <a:solidFill>
+              <a:schemeClr val="accent6"/>
+            </a:solidFill>
+            <a:scene3d>
+              <a:camera prst="orthographicFront"/>
+              <a:lightRig rig="threePt" dir="t"/>
+            </a:scene3d>
+            <a:sp3d extrusionH="107950" contourW="12700" prstMaterial="dkEdge">
+              <a:bevelT w="107950" h="107950"/>
+              <a:bevelB w="107950" h="107950"/>
+            </a:sp3d>
+          </p:spPr>
+          <p:style>
+            <a:lnRef idx="2">
+              <a:schemeClr val="accent1">
+                <a:shade val="50000"/>
+              </a:schemeClr>
+            </a:lnRef>
+            <a:fillRef idx="1">
+              <a:schemeClr val="accent1"/>
+            </a:fillRef>
+            <a:effectRef idx="0">
+              <a:schemeClr val="accent1"/>
+            </a:effectRef>
+            <a:fontRef idx="minor">
+              <a:schemeClr val="lt1"/>
+            </a:fontRef>
+          </p:style>
+          <p:txBody>
+            <a:bodyPr rot="0" spcFirstLastPara="0" vert="horz" wrap="square" lIns="91440" tIns="45720" rIns="91440" bIns="45720" numCol="1" spcCol="0" rtlCol="1" fromWordArt="0" anchor="ctr" anchorCtr="0" forceAA="0" compatLnSpc="1">
+              <a:prstTxWarp prst="textNoShape">
+                <a:avLst/>
+              </a:prstTxWarp>
+              <a:noAutofit/>
+            </a:bodyPr>
+            <a:lstStyle/>
+            <a:p>
+              <a:endParaRPr lang="en-US"/>
+            </a:p>
+          </p:txBody>
+        </p:sp>
+        <p:sp>
+          <p:nvSpPr>
+            <p:cNvPr id="36" name="Oval 35"/>
+            <p:cNvSpPr/>
+            <p:nvPr/>
+          </p:nvSpPr>
+          <p:spPr>
+            <a:xfrm>
+              <a:off x="5563870" y="1626235"/>
+              <a:ext cx="153035" cy="168910"/>
+            </a:xfrm>
+            <a:prstGeom prst="ellipse">
+              <a:avLst/>
+            </a:prstGeom>
+            <a:solidFill>
+              <a:schemeClr val="accent6"/>
+            </a:solidFill>
+            <a:scene3d>
+              <a:camera prst="orthographicFront"/>
+              <a:lightRig rig="threePt" dir="t"/>
+            </a:scene3d>
+            <a:sp3d extrusionH="107950" contourW="12700" prstMaterial="dkEdge">
+              <a:bevelT w="107950" h="107950"/>
+              <a:bevelB w="107950" h="107950"/>
+            </a:sp3d>
+          </p:spPr>
+          <p:style>
+            <a:lnRef idx="2">
+              <a:schemeClr val="accent1">
+                <a:shade val="50000"/>
+              </a:schemeClr>
+            </a:lnRef>
+            <a:fillRef idx="1">
+              <a:schemeClr val="accent1"/>
+            </a:fillRef>
+            <a:effectRef idx="0">
+              <a:schemeClr val="accent1"/>
+            </a:effectRef>
+            <a:fontRef idx="minor">
+              <a:schemeClr val="lt1"/>
+            </a:fontRef>
+          </p:style>
+          <p:txBody>
+            <a:bodyPr rot="0" spcFirstLastPara="0" vert="horz" wrap="square" lIns="91440" tIns="45720" rIns="91440" bIns="45720" numCol="1" spcCol="0" rtlCol="1" fromWordArt="0" anchor="ctr" anchorCtr="0" forceAA="0" compatLnSpc="1">
+              <a:prstTxWarp prst="textNoShape">
+                <a:avLst/>
+              </a:prstTxWarp>
+              <a:noAutofit/>
+            </a:bodyPr>
+            <a:lstStyle/>
+            <a:p>
+              <a:endParaRPr lang="en-US"/>
+            </a:p>
+          </p:txBody>
+        </p:sp>
+        <p:sp>
+          <p:nvSpPr>
+            <p:cNvPr id="45" name="Oval 44"/>
+            <p:cNvSpPr/>
+            <p:nvPr/>
+          </p:nvSpPr>
+          <p:spPr>
+            <a:xfrm>
+              <a:off x="3840061" y="3738892"/>
+              <a:ext cx="153035" cy="168910"/>
+            </a:xfrm>
+            <a:prstGeom prst="ellipse">
+              <a:avLst/>
+            </a:prstGeom>
+            <a:solidFill>
+              <a:schemeClr val="accent6">
+                <a:lumMod val="50000"/>
+              </a:schemeClr>
+            </a:solidFill>
+            <a:scene3d>
+              <a:camera prst="orthographicFront"/>
+              <a:lightRig rig="threePt" dir="t"/>
+            </a:scene3d>
+            <a:sp3d extrusionH="107950" contourW="12700" prstMaterial="dkEdge">
+              <a:bevelT w="107950" h="107950"/>
+              <a:bevelB w="107950" h="107950"/>
+            </a:sp3d>
+          </p:spPr>
+          <p:style>
+            <a:lnRef idx="2">
+              <a:schemeClr val="accent1">
+                <a:shade val="50000"/>
+              </a:schemeClr>
+            </a:lnRef>
+            <a:fillRef idx="1">
+              <a:schemeClr val="accent1"/>
+            </a:fillRef>
+            <a:effectRef idx="0">
+              <a:schemeClr val="accent1"/>
+            </a:effectRef>
+            <a:fontRef idx="minor">
+              <a:schemeClr val="lt1"/>
+            </a:fontRef>
+          </p:style>
+          <p:txBody>
+            <a:bodyPr rot="0" spcFirstLastPara="0" vert="horz" wrap="square" lIns="91440" tIns="45720" rIns="91440" bIns="45720" numCol="1" spcCol="0" rtlCol="1" fromWordArt="0" anchor="ctr" anchorCtr="0" forceAA="0" compatLnSpc="1">
+              <a:prstTxWarp prst="textNoShape">
+                <a:avLst/>
+              </a:prstTxWarp>
+              <a:noAutofit/>
+            </a:bodyPr>
+            <a:lstStyle/>
+            <a:p>
+              <a:endParaRPr lang="en-US"/>
+            </a:p>
+          </p:txBody>
+        </p:sp>
+      </p:grpSp>
+      <p:sp>
+        <p:nvSpPr>
+          <p:cNvPr id="54" name="TextBox 53"/>
+          <p:cNvSpPr txBox="1"/>
+          <p:nvPr/>
+        </p:nvSpPr>
+        <p:spPr>
+          <a:xfrm>
+            <a:off x="1534076" y="4289928"/>
+            <a:ext cx="278451" cy="646331"/>
+          </a:xfrm>
+          <a:prstGeom prst="rect">
+            <a:avLst/>
+          </a:prstGeom>
+          <a:noFill/>
+        </p:spPr>
+        <p:txBody>
+          <a:bodyPr wrap="square" rtlCol="0">
+            <a:spAutoFit/>
+          </a:bodyPr>
+          <a:lstStyle/>
+          <a:p>
+            <a:r>
+              <a:rPr lang="en-US" sz="3600" dirty="0" smtClean="0"/>
+              <a:t>1</a:t>
+            </a:r>
+            <a:endParaRPr lang="en-US" sz="3600" dirty="0"/>
+          </a:p>
+        </p:txBody>
+      </p:sp>
+      <p:sp>
+        <p:nvSpPr>
+          <p:cNvPr id="55" name="TextBox 54"/>
+          <p:cNvSpPr txBox="1"/>
+          <p:nvPr/>
+        </p:nvSpPr>
+        <p:spPr>
+          <a:xfrm>
+            <a:off x="5476571" y="5341676"/>
+            <a:ext cx="1015779" cy="646331"/>
+          </a:xfrm>
+          <a:prstGeom prst="rect">
+            <a:avLst/>
+          </a:prstGeom>
+          <a:noFill/>
+        </p:spPr>
+        <p:txBody>
+          <a:bodyPr wrap="square" rtlCol="0">
+            <a:spAutoFit/>
+          </a:bodyPr>
+          <a:lstStyle/>
+          <a:p>
+            <a:r>
+              <a:rPr lang="en-US" sz="3600" dirty="0" err="1" smtClean="0"/>
+              <a:t>N_c</a:t>
+            </a:r>
+            <a:endParaRPr lang="en-US" sz="3600" dirty="0"/>
+          </a:p>
+        </p:txBody>
+      </p:sp>
+      <p:sp>
+        <p:nvSpPr>
+          <p:cNvPr id="58" name="TextBox 57"/>
+          <p:cNvSpPr txBox="1"/>
+          <p:nvPr/>
+        </p:nvSpPr>
+        <p:spPr>
+          <a:xfrm>
+            <a:off x="3079865" y="4380667"/>
+            <a:ext cx="2013290" cy="646331"/>
+          </a:xfrm>
+          <a:prstGeom prst="rect">
+            <a:avLst/>
+          </a:prstGeom>
+          <a:noFill/>
+        </p:spPr>
+        <p:txBody>
+          <a:bodyPr wrap="square" rtlCol="0">
+            <a:spAutoFit/>
+          </a:bodyPr>
+          <a:lstStyle/>
+          <a:p>
+            <a:r>
+              <a:rPr lang="en-US" sz="3600" dirty="0" err="1" smtClean="0"/>
+              <a:t>N_c</a:t>
+            </a:r>
+            <a:r>
+              <a:rPr lang="en-US" sz="3600" dirty="0" smtClean="0"/>
+              <a:t> + </a:t>
+            </a:r>
+            <a:r>
+              <a:rPr lang="en-US" sz="3600" dirty="0" err="1" smtClean="0"/>
+              <a:t>N_r</a:t>
+            </a:r>
+            <a:endParaRPr lang="en-US" sz="3600" dirty="0"/>
+          </a:p>
+        </p:txBody>
+      </p:sp>
+    </p:spTree>
+    <p:extLst>
+      <p:ext uri="{BB962C8B-B14F-4D97-AF65-F5344CB8AC3E}">
+        <p14:creationId xmlns:p14="http://schemas.microsoft.com/office/powerpoint/2010/main" val="3533286823"/>
+      </p:ext>
+    </p:extLst>
+  </p:cSld>
+  <p:clrMapOvr>
+    <a:masterClrMapping/>
+  </p:clrMapOvr>
+</p:sld>
+</file>
+
 <file path=ppt/theme/theme1.xml><?xml version="1.0" encoding="utf-8"?>
 <a:theme xmlns:a="http://schemas.openxmlformats.org/drawingml/2006/main" name="Office Theme">
   <a:themeElements>

</xml_diff>

<commit_message>
added models to the ppt
</commit_message>
<xml_diff>
--- a/Documents/(article) Random Loop Model to Explain the TAD in CC Experiments/polymerModelWithOneAndTwoFixedLoopsAndInternalConnections.pptx
+++ b/Documents/(article) Random Loop Model to Explain the TAD in CC Experiments/polymerModelWithOneAndTwoFixedLoopsAndInternalConnections.pptx
@@ -16,6 +16,7 @@
     <p:sldId id="264" r:id="rId10"/>
     <p:sldId id="265" r:id="rId11"/>
     <p:sldId id="266" r:id="rId12"/>
+    <p:sldId id="267" r:id="rId13"/>
   </p:sldIdLst>
   <p:sldSz cx="12192000" cy="6858000"/>
   <p:notesSz cx="6858000" cy="9144000"/>
@@ -17260,6 +17261,1935 @@
 </p:sld>
 </file>
 
+<file path=ppt/slides/slide12.xml><?xml version="1.0" encoding="utf-8"?>
+<p:sld xmlns:a="http://schemas.openxmlformats.org/drawingml/2006/main" xmlns:r="http://schemas.openxmlformats.org/officeDocument/2006/relationships" xmlns:p="http://schemas.openxmlformats.org/presentationml/2006/main">
+  <p:cSld>
+    <p:spTree>
+      <p:nvGrpSpPr>
+        <p:cNvPr id="1" name=""/>
+        <p:cNvGrpSpPr/>
+        <p:nvPr/>
+      </p:nvGrpSpPr>
+      <p:grpSpPr>
+        <a:xfrm>
+          <a:off x="0" y="0"/>
+          <a:ext cx="0" cy="0"/>
+          <a:chOff x="0" y="0"/>
+          <a:chExt cx="0" cy="0"/>
+        </a:xfrm>
+      </p:grpSpPr>
+      <p:grpSp>
+        <p:nvGrpSpPr>
+          <p:cNvPr id="23" name="Group 22"/>
+          <p:cNvGrpSpPr/>
+          <p:nvPr/>
+        </p:nvGrpSpPr>
+        <p:grpSpPr>
+          <a:xfrm>
+            <a:off x="1614311" y="293511"/>
+            <a:ext cx="9849556" cy="5565422"/>
+            <a:chOff x="1524000" y="654756"/>
+            <a:chExt cx="9849556" cy="5565422"/>
+          </a:xfrm>
+        </p:grpSpPr>
+        <p:grpSp>
+          <p:nvGrpSpPr>
+            <p:cNvPr id="8" name="Group 7"/>
+            <p:cNvGrpSpPr/>
+            <p:nvPr/>
+          </p:nvGrpSpPr>
+          <p:grpSpPr>
+            <a:xfrm>
+              <a:off x="1524000" y="654756"/>
+              <a:ext cx="9155289" cy="5554133"/>
+              <a:chOff x="1524000" y="654756"/>
+              <a:chExt cx="9155289" cy="5554133"/>
+            </a:xfrm>
+          </p:grpSpPr>
+          <p:cxnSp>
+            <p:nvCxnSpPr>
+              <p:cNvPr id="5" name="Straight Connector 4"/>
+              <p:cNvCxnSpPr/>
+              <p:nvPr/>
+            </p:nvCxnSpPr>
+            <p:spPr>
+              <a:xfrm>
+                <a:off x="1524000" y="654756"/>
+                <a:ext cx="0" cy="5554133"/>
+              </a:xfrm>
+              <a:prstGeom prst="line">
+                <a:avLst/>
+              </a:prstGeom>
+              <a:ln w="63500"/>
+            </p:spPr>
+            <p:style>
+              <a:lnRef idx="1">
+                <a:schemeClr val="accent1"/>
+              </a:lnRef>
+              <a:fillRef idx="0">
+                <a:schemeClr val="accent1"/>
+              </a:fillRef>
+              <a:effectRef idx="0">
+                <a:schemeClr val="accent1"/>
+              </a:effectRef>
+              <a:fontRef idx="minor">
+                <a:schemeClr val="tx1"/>
+              </a:fontRef>
+            </p:style>
+          </p:cxnSp>
+          <p:cxnSp>
+            <p:nvCxnSpPr>
+              <p:cNvPr id="7" name="Straight Connector 6"/>
+              <p:cNvCxnSpPr/>
+              <p:nvPr/>
+            </p:nvCxnSpPr>
+            <p:spPr>
+              <a:xfrm>
+                <a:off x="1524000" y="6208889"/>
+                <a:ext cx="9155289" cy="0"/>
+              </a:xfrm>
+              <a:prstGeom prst="line">
+                <a:avLst/>
+              </a:prstGeom>
+              <a:ln w="63500"/>
+            </p:spPr>
+            <p:style>
+              <a:lnRef idx="1">
+                <a:schemeClr val="accent1"/>
+              </a:lnRef>
+              <a:fillRef idx="0">
+                <a:schemeClr val="accent1"/>
+              </a:fillRef>
+              <a:effectRef idx="0">
+                <a:schemeClr val="accent1"/>
+              </a:effectRef>
+              <a:fontRef idx="minor">
+                <a:schemeClr val="tx1"/>
+              </a:fontRef>
+            </p:style>
+          </p:cxnSp>
+        </p:grpSp>
+        <p:sp>
+          <p:nvSpPr>
+            <p:cNvPr id="9" name="Freeform 8"/>
+            <p:cNvSpPr/>
+            <p:nvPr/>
+          </p:nvSpPr>
+          <p:spPr>
+            <a:xfrm>
+              <a:off x="1670756" y="812800"/>
+              <a:ext cx="8985955" cy="5226756"/>
+            </a:xfrm>
+            <a:custGeom>
+              <a:avLst/>
+              <a:gdLst>
+                <a:gd name="connsiteX0" fmla="*/ 0 w 8985955"/>
+                <a:gd name="connsiteY0" fmla="*/ 0 h 5226756"/>
+                <a:gd name="connsiteX1" fmla="*/ 970844 w 8985955"/>
+                <a:gd name="connsiteY1" fmla="*/ 4222044 h 5226756"/>
+                <a:gd name="connsiteX2" fmla="*/ 3872088 w 8985955"/>
+                <a:gd name="connsiteY2" fmla="*/ 3544711 h 5226756"/>
+                <a:gd name="connsiteX3" fmla="*/ 5633155 w 8985955"/>
+                <a:gd name="connsiteY3" fmla="*/ 4820356 h 5226756"/>
+                <a:gd name="connsiteX4" fmla="*/ 6987822 w 8985955"/>
+                <a:gd name="connsiteY4" fmla="*/ 3996267 h 5226756"/>
+                <a:gd name="connsiteX5" fmla="*/ 7924800 w 8985955"/>
+                <a:gd name="connsiteY5" fmla="*/ 4763911 h 5226756"/>
+                <a:gd name="connsiteX6" fmla="*/ 8985955 w 8985955"/>
+                <a:gd name="connsiteY6" fmla="*/ 5226756 h 5226756"/>
+              </a:gdLst>
+              <a:ahLst/>
+              <a:cxnLst>
+                <a:cxn ang="0">
+                  <a:pos x="connsiteX0" y="connsiteY0"/>
+                </a:cxn>
+                <a:cxn ang="0">
+                  <a:pos x="connsiteX1" y="connsiteY1"/>
+                </a:cxn>
+                <a:cxn ang="0">
+                  <a:pos x="connsiteX2" y="connsiteY2"/>
+                </a:cxn>
+                <a:cxn ang="0">
+                  <a:pos x="connsiteX3" y="connsiteY3"/>
+                </a:cxn>
+                <a:cxn ang="0">
+                  <a:pos x="connsiteX4" y="connsiteY4"/>
+                </a:cxn>
+                <a:cxn ang="0">
+                  <a:pos x="connsiteX5" y="connsiteY5"/>
+                </a:cxn>
+                <a:cxn ang="0">
+                  <a:pos x="connsiteX6" y="connsiteY6"/>
+                </a:cxn>
+              </a:cxnLst>
+              <a:rect l="l" t="t" r="r" b="b"/>
+              <a:pathLst>
+                <a:path w="8985955" h="5226756">
+                  <a:moveTo>
+                    <a:pt x="0" y="0"/>
+                  </a:moveTo>
+                  <a:cubicBezTo>
+                    <a:pt x="162748" y="1815629"/>
+                    <a:pt x="325496" y="3631259"/>
+                    <a:pt x="970844" y="4222044"/>
+                  </a:cubicBezTo>
+                  <a:cubicBezTo>
+                    <a:pt x="1616192" y="4812829"/>
+                    <a:pt x="3095036" y="3444992"/>
+                    <a:pt x="3872088" y="3544711"/>
+                  </a:cubicBezTo>
+                  <a:cubicBezTo>
+                    <a:pt x="4649140" y="3644430"/>
+                    <a:pt x="5113866" y="4745097"/>
+                    <a:pt x="5633155" y="4820356"/>
+                  </a:cubicBezTo>
+                  <a:cubicBezTo>
+                    <a:pt x="6152444" y="4895615"/>
+                    <a:pt x="6605881" y="4005674"/>
+                    <a:pt x="6987822" y="3996267"/>
+                  </a:cubicBezTo>
+                  <a:cubicBezTo>
+                    <a:pt x="7369763" y="3986860"/>
+                    <a:pt x="7591778" y="4558830"/>
+                    <a:pt x="7924800" y="4763911"/>
+                  </a:cubicBezTo>
+                  <a:cubicBezTo>
+                    <a:pt x="8257822" y="4968992"/>
+                    <a:pt x="8829792" y="5149615"/>
+                    <a:pt x="8985955" y="5226756"/>
+                  </a:cubicBezTo>
+                </a:path>
+              </a:pathLst>
+            </a:custGeom>
+            <a:noFill/>
+            <a:ln w="82550">
+              <a:solidFill>
+                <a:schemeClr val="tx1"/>
+              </a:solidFill>
+            </a:ln>
+          </p:spPr>
+          <p:style>
+            <a:lnRef idx="2">
+              <a:schemeClr val="accent1">
+                <a:shade val="50000"/>
+              </a:schemeClr>
+            </a:lnRef>
+            <a:fillRef idx="1">
+              <a:schemeClr val="accent1"/>
+            </a:fillRef>
+            <a:effectRef idx="0">
+              <a:schemeClr val="accent1"/>
+            </a:effectRef>
+            <a:fontRef idx="minor">
+              <a:schemeClr val="lt1"/>
+            </a:fontRef>
+          </p:style>
+          <p:txBody>
+            <a:bodyPr rtlCol="0" anchor="ctr"/>
+            <a:lstStyle/>
+            <a:p>
+              <a:pPr algn="ctr"/>
+              <a:endParaRPr lang="en-US"/>
+            </a:p>
+          </p:txBody>
+        </p:sp>
+        <p:cxnSp>
+          <p:nvCxnSpPr>
+            <p:cNvPr id="11" name="Straight Connector 10"/>
+            <p:cNvCxnSpPr>
+              <a:stCxn id="9" idx="2"/>
+            </p:cNvCxnSpPr>
+            <p:nvPr/>
+          </p:nvCxnSpPr>
+          <p:spPr>
+            <a:xfrm flipH="1">
+              <a:off x="2246489" y="4357511"/>
+              <a:ext cx="3296355" cy="22578"/>
+            </a:xfrm>
+            <a:prstGeom prst="line">
+              <a:avLst/>
+            </a:prstGeom>
+          </p:spPr>
+          <p:style>
+            <a:lnRef idx="1">
+              <a:schemeClr val="accent1"/>
+            </a:lnRef>
+            <a:fillRef idx="0">
+              <a:schemeClr val="accent1"/>
+            </a:fillRef>
+            <a:effectRef idx="0">
+              <a:schemeClr val="accent1"/>
+            </a:effectRef>
+            <a:fontRef idx="minor">
+              <a:schemeClr val="tx1"/>
+            </a:fontRef>
+          </p:style>
+        </p:cxnSp>
+        <p:cxnSp>
+          <p:nvCxnSpPr>
+            <p:cNvPr id="13" name="Straight Connector 12"/>
+            <p:cNvCxnSpPr>
+              <a:stCxn id="9" idx="4"/>
+            </p:cNvCxnSpPr>
+            <p:nvPr/>
+          </p:nvCxnSpPr>
+          <p:spPr>
+            <a:xfrm flipH="1">
+              <a:off x="6423378" y="4809067"/>
+              <a:ext cx="2235200" cy="45155"/>
+            </a:xfrm>
+            <a:prstGeom prst="line">
+              <a:avLst/>
+            </a:prstGeom>
+          </p:spPr>
+          <p:style>
+            <a:lnRef idx="1">
+              <a:schemeClr val="accent1"/>
+            </a:lnRef>
+            <a:fillRef idx="0">
+              <a:schemeClr val="accent1"/>
+            </a:fillRef>
+            <a:effectRef idx="0">
+              <a:schemeClr val="accent1"/>
+            </a:effectRef>
+            <a:fontRef idx="minor">
+              <a:schemeClr val="tx1"/>
+            </a:fontRef>
+          </p:style>
+        </p:cxnSp>
+        <p:sp>
+          <p:nvSpPr>
+            <p:cNvPr id="15" name="Freeform 14"/>
+            <p:cNvSpPr/>
+            <p:nvPr/>
+          </p:nvSpPr>
+          <p:spPr>
+            <a:xfrm>
+              <a:off x="2246488" y="4334933"/>
+              <a:ext cx="3296355" cy="1862667"/>
+            </a:xfrm>
+            <a:custGeom>
+              <a:avLst/>
+              <a:gdLst>
+                <a:gd name="connsiteX0" fmla="*/ 0 w 2946400"/>
+                <a:gd name="connsiteY0" fmla="*/ 0 h 1806222"/>
+                <a:gd name="connsiteX1" fmla="*/ 33867 w 2946400"/>
+                <a:gd name="connsiteY1" fmla="*/ 1806222 h 1806222"/>
+                <a:gd name="connsiteX2" fmla="*/ 2946400 w 2946400"/>
+                <a:gd name="connsiteY2" fmla="*/ 1806222 h 1806222"/>
+                <a:gd name="connsiteX3" fmla="*/ 2901244 w 2946400"/>
+                <a:gd name="connsiteY3" fmla="*/ 0 h 1806222"/>
+                <a:gd name="connsiteX4" fmla="*/ 2032000 w 2946400"/>
+                <a:gd name="connsiteY4" fmla="*/ 383822 h 1806222"/>
+                <a:gd name="connsiteX5" fmla="*/ 1095022 w 2946400"/>
+                <a:gd name="connsiteY5" fmla="*/ 756355 h 1806222"/>
+                <a:gd name="connsiteX6" fmla="*/ 677333 w 2946400"/>
+                <a:gd name="connsiteY6" fmla="*/ 767644 h 1806222"/>
+                <a:gd name="connsiteX7" fmla="*/ 270933 w 2946400"/>
+                <a:gd name="connsiteY7" fmla="*/ 519289 h 1806222"/>
+                <a:gd name="connsiteX8" fmla="*/ 0 w 2946400"/>
+                <a:gd name="connsiteY8" fmla="*/ 0 h 1806222"/>
+              </a:gdLst>
+              <a:ahLst/>
+              <a:cxnLst>
+                <a:cxn ang="0">
+                  <a:pos x="connsiteX0" y="connsiteY0"/>
+                </a:cxn>
+                <a:cxn ang="0">
+                  <a:pos x="connsiteX1" y="connsiteY1"/>
+                </a:cxn>
+                <a:cxn ang="0">
+                  <a:pos x="connsiteX2" y="connsiteY2"/>
+                </a:cxn>
+                <a:cxn ang="0">
+                  <a:pos x="connsiteX3" y="connsiteY3"/>
+                </a:cxn>
+                <a:cxn ang="0">
+                  <a:pos x="connsiteX4" y="connsiteY4"/>
+                </a:cxn>
+                <a:cxn ang="0">
+                  <a:pos x="connsiteX5" y="connsiteY5"/>
+                </a:cxn>
+                <a:cxn ang="0">
+                  <a:pos x="connsiteX6" y="connsiteY6"/>
+                </a:cxn>
+                <a:cxn ang="0">
+                  <a:pos x="connsiteX7" y="connsiteY7"/>
+                </a:cxn>
+                <a:cxn ang="0">
+                  <a:pos x="connsiteX8" y="connsiteY8"/>
+                </a:cxn>
+              </a:cxnLst>
+              <a:rect l="l" t="t" r="r" b="b"/>
+              <a:pathLst>
+                <a:path w="2946400" h="1806222">
+                  <a:moveTo>
+                    <a:pt x="0" y="0"/>
+                  </a:moveTo>
+                  <a:lnTo>
+                    <a:pt x="33867" y="1806222"/>
+                  </a:lnTo>
+                  <a:lnTo>
+                    <a:pt x="2946400" y="1806222"/>
+                  </a:lnTo>
+                  <a:lnTo>
+                    <a:pt x="2901244" y="0"/>
+                  </a:lnTo>
+                  <a:lnTo>
+                    <a:pt x="2032000" y="383822"/>
+                  </a:lnTo>
+                  <a:lnTo>
+                    <a:pt x="1095022" y="756355"/>
+                  </a:lnTo>
+                  <a:lnTo>
+                    <a:pt x="677333" y="767644"/>
+                  </a:lnTo>
+                  <a:lnTo>
+                    <a:pt x="270933" y="519289"/>
+                  </a:lnTo>
+                  <a:lnTo>
+                    <a:pt x="0" y="0"/>
+                  </a:lnTo>
+                  <a:close/>
+                </a:path>
+              </a:pathLst>
+            </a:custGeom>
+            <a:solidFill>
+              <a:schemeClr val="accent4">
+                <a:alpha val="40000"/>
+              </a:schemeClr>
+            </a:solidFill>
+            <a:ln>
+              <a:solidFill>
+                <a:schemeClr val="accent4"/>
+              </a:solidFill>
+            </a:ln>
+          </p:spPr>
+          <p:style>
+            <a:lnRef idx="2">
+              <a:schemeClr val="accent1">
+                <a:shade val="50000"/>
+              </a:schemeClr>
+            </a:lnRef>
+            <a:fillRef idx="1">
+              <a:schemeClr val="accent1"/>
+            </a:fillRef>
+            <a:effectRef idx="0">
+              <a:schemeClr val="accent1"/>
+            </a:effectRef>
+            <a:fontRef idx="minor">
+              <a:schemeClr val="lt1"/>
+            </a:fontRef>
+          </p:style>
+          <p:txBody>
+            <a:bodyPr rtlCol="0" anchor="ctr"/>
+            <a:lstStyle/>
+            <a:p>
+              <a:pPr algn="ctr"/>
+              <a:r>
+                <a:rPr lang="en-US" sz="4000" dirty="0" smtClean="0">
+                  <a:solidFill>
+                    <a:schemeClr val="tx1"/>
+                  </a:solidFill>
+                </a:rPr>
+                <a:t>D2</a:t>
+              </a:r>
+              <a:endParaRPr lang="en-US" sz="4000" dirty="0">
+                <a:solidFill>
+                  <a:schemeClr val="tx1"/>
+                </a:solidFill>
+              </a:endParaRPr>
+            </a:p>
+          </p:txBody>
+        </p:sp>
+        <p:sp>
+          <p:nvSpPr>
+            <p:cNvPr id="16" name="Freeform 15"/>
+            <p:cNvSpPr/>
+            <p:nvPr/>
+          </p:nvSpPr>
+          <p:spPr>
+            <a:xfrm>
+              <a:off x="8370712" y="2212623"/>
+              <a:ext cx="3002844" cy="2167466"/>
+            </a:xfrm>
+            <a:custGeom>
+              <a:avLst/>
+              <a:gdLst>
+                <a:gd name="connsiteX0" fmla="*/ 0 w 1873955"/>
+                <a:gd name="connsiteY0" fmla="*/ 0 h 1275644"/>
+                <a:gd name="connsiteX1" fmla="*/ 90311 w 1873955"/>
+                <a:gd name="connsiteY1" fmla="*/ 90311 h 1275644"/>
+                <a:gd name="connsiteX2" fmla="*/ 248355 w 1873955"/>
+                <a:gd name="connsiteY2" fmla="*/ 180622 h 1275644"/>
+                <a:gd name="connsiteX3" fmla="*/ 282222 w 1873955"/>
+                <a:gd name="connsiteY3" fmla="*/ 203200 h 1275644"/>
+                <a:gd name="connsiteX4" fmla="*/ 316089 w 1873955"/>
+                <a:gd name="connsiteY4" fmla="*/ 237066 h 1275644"/>
+                <a:gd name="connsiteX5" fmla="*/ 349955 w 1873955"/>
+                <a:gd name="connsiteY5" fmla="*/ 248355 h 1275644"/>
+                <a:gd name="connsiteX6" fmla="*/ 383822 w 1873955"/>
+                <a:gd name="connsiteY6" fmla="*/ 270933 h 1275644"/>
+                <a:gd name="connsiteX7" fmla="*/ 462844 w 1873955"/>
+                <a:gd name="connsiteY7" fmla="*/ 293511 h 1275644"/>
+                <a:gd name="connsiteX8" fmla="*/ 496711 w 1873955"/>
+                <a:gd name="connsiteY8" fmla="*/ 316089 h 1275644"/>
+                <a:gd name="connsiteX9" fmla="*/ 508000 w 1873955"/>
+                <a:gd name="connsiteY9" fmla="*/ 349955 h 1275644"/>
+                <a:gd name="connsiteX10" fmla="*/ 575733 w 1873955"/>
+                <a:gd name="connsiteY10" fmla="*/ 372533 h 1275644"/>
+                <a:gd name="connsiteX11" fmla="*/ 643466 w 1873955"/>
+                <a:gd name="connsiteY11" fmla="*/ 440266 h 1275644"/>
+                <a:gd name="connsiteX12" fmla="*/ 677333 w 1873955"/>
+                <a:gd name="connsiteY12" fmla="*/ 462844 h 1275644"/>
+                <a:gd name="connsiteX13" fmla="*/ 722489 w 1873955"/>
+                <a:gd name="connsiteY13" fmla="*/ 496711 h 1275644"/>
+                <a:gd name="connsiteX14" fmla="*/ 756355 w 1873955"/>
+                <a:gd name="connsiteY14" fmla="*/ 519289 h 1275644"/>
+                <a:gd name="connsiteX15" fmla="*/ 812800 w 1873955"/>
+                <a:gd name="connsiteY15" fmla="*/ 587022 h 1275644"/>
+                <a:gd name="connsiteX16" fmla="*/ 880533 w 1873955"/>
+                <a:gd name="connsiteY16" fmla="*/ 620889 h 1275644"/>
+                <a:gd name="connsiteX17" fmla="*/ 959555 w 1873955"/>
+                <a:gd name="connsiteY17" fmla="*/ 654755 h 1275644"/>
+                <a:gd name="connsiteX18" fmla="*/ 970844 w 1873955"/>
+                <a:gd name="connsiteY18" fmla="*/ 688622 h 1275644"/>
+                <a:gd name="connsiteX19" fmla="*/ 1004711 w 1873955"/>
+                <a:gd name="connsiteY19" fmla="*/ 699911 h 1275644"/>
+                <a:gd name="connsiteX20" fmla="*/ 1095022 w 1873955"/>
+                <a:gd name="connsiteY20" fmla="*/ 733777 h 1275644"/>
+                <a:gd name="connsiteX21" fmla="*/ 1140178 w 1873955"/>
+                <a:gd name="connsiteY21" fmla="*/ 756355 h 1275644"/>
+                <a:gd name="connsiteX22" fmla="*/ 1174044 w 1873955"/>
+                <a:gd name="connsiteY22" fmla="*/ 790222 h 1275644"/>
+                <a:gd name="connsiteX23" fmla="*/ 1298222 w 1873955"/>
+                <a:gd name="connsiteY23" fmla="*/ 846666 h 1275644"/>
+                <a:gd name="connsiteX24" fmla="*/ 1354666 w 1873955"/>
+                <a:gd name="connsiteY24" fmla="*/ 857955 h 1275644"/>
+                <a:gd name="connsiteX25" fmla="*/ 1444978 w 1873955"/>
+                <a:gd name="connsiteY25" fmla="*/ 880533 h 1275644"/>
+                <a:gd name="connsiteX26" fmla="*/ 1670755 w 1873955"/>
+                <a:gd name="connsiteY26" fmla="*/ 869244 h 1275644"/>
+                <a:gd name="connsiteX27" fmla="*/ 1704622 w 1873955"/>
+                <a:gd name="connsiteY27" fmla="*/ 857955 h 1275644"/>
+                <a:gd name="connsiteX28" fmla="*/ 1772355 w 1873955"/>
+                <a:gd name="connsiteY28" fmla="*/ 812800 h 1275644"/>
+                <a:gd name="connsiteX29" fmla="*/ 1806222 w 1873955"/>
+                <a:gd name="connsiteY29" fmla="*/ 790222 h 1275644"/>
+                <a:gd name="connsiteX30" fmla="*/ 1862666 w 1873955"/>
+                <a:gd name="connsiteY30" fmla="*/ 688622 h 1275644"/>
+                <a:gd name="connsiteX31" fmla="*/ 1873955 w 1873955"/>
+                <a:gd name="connsiteY31" fmla="*/ 632177 h 1275644"/>
+                <a:gd name="connsiteX32" fmla="*/ 1862666 w 1873955"/>
+                <a:gd name="connsiteY32" fmla="*/ 383822 h 1275644"/>
+                <a:gd name="connsiteX33" fmla="*/ 1806222 w 1873955"/>
+                <a:gd name="connsiteY33" fmla="*/ 282222 h 1275644"/>
+                <a:gd name="connsiteX34" fmla="*/ 1772355 w 1873955"/>
+                <a:gd name="connsiteY34" fmla="*/ 270933 h 1275644"/>
+                <a:gd name="connsiteX35" fmla="*/ 1738489 w 1873955"/>
+                <a:gd name="connsiteY35" fmla="*/ 248355 h 1275644"/>
+                <a:gd name="connsiteX36" fmla="*/ 1580444 w 1873955"/>
+                <a:gd name="connsiteY36" fmla="*/ 225777 h 1275644"/>
+                <a:gd name="connsiteX37" fmla="*/ 1377244 w 1873955"/>
+                <a:gd name="connsiteY37" fmla="*/ 248355 h 1275644"/>
+                <a:gd name="connsiteX38" fmla="*/ 1207911 w 1873955"/>
+                <a:gd name="connsiteY38" fmla="*/ 282222 h 1275644"/>
+                <a:gd name="connsiteX39" fmla="*/ 1174044 w 1873955"/>
+                <a:gd name="connsiteY39" fmla="*/ 304800 h 1275644"/>
+                <a:gd name="connsiteX40" fmla="*/ 1151466 w 1873955"/>
+                <a:gd name="connsiteY40" fmla="*/ 338666 h 1275644"/>
+                <a:gd name="connsiteX41" fmla="*/ 1117600 w 1873955"/>
+                <a:gd name="connsiteY41" fmla="*/ 349955 h 1275644"/>
+                <a:gd name="connsiteX42" fmla="*/ 1049866 w 1873955"/>
+                <a:gd name="connsiteY42" fmla="*/ 395111 h 1275644"/>
+                <a:gd name="connsiteX43" fmla="*/ 1004711 w 1873955"/>
+                <a:gd name="connsiteY43" fmla="*/ 462844 h 1275644"/>
+                <a:gd name="connsiteX44" fmla="*/ 982133 w 1873955"/>
+                <a:gd name="connsiteY44" fmla="*/ 530577 h 1275644"/>
+                <a:gd name="connsiteX45" fmla="*/ 970844 w 1873955"/>
+                <a:gd name="connsiteY45" fmla="*/ 970844 h 1275644"/>
+                <a:gd name="connsiteX46" fmla="*/ 993422 w 1873955"/>
+                <a:gd name="connsiteY46" fmla="*/ 1004711 h 1275644"/>
+                <a:gd name="connsiteX47" fmla="*/ 1061155 w 1873955"/>
+                <a:gd name="connsiteY47" fmla="*/ 1027289 h 1275644"/>
+                <a:gd name="connsiteX48" fmla="*/ 1083733 w 1873955"/>
+                <a:gd name="connsiteY48" fmla="*/ 1061155 h 1275644"/>
+                <a:gd name="connsiteX49" fmla="*/ 1117600 w 1873955"/>
+                <a:gd name="connsiteY49" fmla="*/ 1072444 h 1275644"/>
+                <a:gd name="connsiteX50" fmla="*/ 1128889 w 1873955"/>
+                <a:gd name="connsiteY50" fmla="*/ 1106311 h 1275644"/>
+                <a:gd name="connsiteX51" fmla="*/ 1151466 w 1873955"/>
+                <a:gd name="connsiteY51" fmla="*/ 1151466 h 1275644"/>
+                <a:gd name="connsiteX52" fmla="*/ 1140178 w 1873955"/>
+                <a:gd name="connsiteY52" fmla="*/ 1253066 h 1275644"/>
+                <a:gd name="connsiteX53" fmla="*/ 1072444 w 1873955"/>
+                <a:gd name="connsiteY53" fmla="*/ 1275644 h 1275644"/>
+                <a:gd name="connsiteX54" fmla="*/ 993422 w 1873955"/>
+                <a:gd name="connsiteY54" fmla="*/ 1264355 h 1275644"/>
+                <a:gd name="connsiteX55" fmla="*/ 959555 w 1873955"/>
+                <a:gd name="connsiteY55" fmla="*/ 1253066 h 1275644"/>
+                <a:gd name="connsiteX56" fmla="*/ 936978 w 1873955"/>
+                <a:gd name="connsiteY56" fmla="*/ 1219200 h 1275644"/>
+                <a:gd name="connsiteX57" fmla="*/ 925689 w 1873955"/>
+                <a:gd name="connsiteY57" fmla="*/ 1185333 h 1275644"/>
+                <a:gd name="connsiteX58" fmla="*/ 925689 w 1873955"/>
+                <a:gd name="connsiteY58" fmla="*/ 1004711 h 1275644"/>
+                <a:gd name="connsiteX59" fmla="*/ 959555 w 1873955"/>
+                <a:gd name="connsiteY59" fmla="*/ 993422 h 1275644"/>
+                <a:gd name="connsiteX60" fmla="*/ 1286933 w 1873955"/>
+                <a:gd name="connsiteY60" fmla="*/ 1004711 h 1275644"/>
+                <a:gd name="connsiteX61" fmla="*/ 1354666 w 1873955"/>
+                <a:gd name="connsiteY61" fmla="*/ 1038577 h 1275644"/>
+                <a:gd name="connsiteX62" fmla="*/ 1388533 w 1873955"/>
+                <a:gd name="connsiteY62" fmla="*/ 1049866 h 1275644"/>
+                <a:gd name="connsiteX63" fmla="*/ 1399822 w 1873955"/>
+                <a:gd name="connsiteY63" fmla="*/ 1083733 h 1275644"/>
+                <a:gd name="connsiteX64" fmla="*/ 1467555 w 1873955"/>
+                <a:gd name="connsiteY64" fmla="*/ 1106311 h 1275644"/>
+                <a:gd name="connsiteX65" fmla="*/ 1524000 w 1873955"/>
+                <a:gd name="connsiteY65" fmla="*/ 1162755 h 1275644"/>
+                <a:gd name="connsiteX66" fmla="*/ 1591733 w 1873955"/>
+                <a:gd name="connsiteY66" fmla="*/ 1185333 h 1275644"/>
+                <a:gd name="connsiteX67" fmla="*/ 1659466 w 1873955"/>
+                <a:gd name="connsiteY67" fmla="*/ 1174044 h 1275644"/>
+                <a:gd name="connsiteX68" fmla="*/ 1693333 w 1873955"/>
+                <a:gd name="connsiteY68" fmla="*/ 1151466 h 1275644"/>
+              </a:gdLst>
+              <a:ahLst/>
+              <a:cxnLst>
+                <a:cxn ang="0">
+                  <a:pos x="connsiteX0" y="connsiteY0"/>
+                </a:cxn>
+                <a:cxn ang="0">
+                  <a:pos x="connsiteX1" y="connsiteY1"/>
+                </a:cxn>
+                <a:cxn ang="0">
+                  <a:pos x="connsiteX2" y="connsiteY2"/>
+                </a:cxn>
+                <a:cxn ang="0">
+                  <a:pos x="connsiteX3" y="connsiteY3"/>
+                </a:cxn>
+                <a:cxn ang="0">
+                  <a:pos x="connsiteX4" y="connsiteY4"/>
+                </a:cxn>
+                <a:cxn ang="0">
+                  <a:pos x="connsiteX5" y="connsiteY5"/>
+                </a:cxn>
+                <a:cxn ang="0">
+                  <a:pos x="connsiteX6" y="connsiteY6"/>
+                </a:cxn>
+                <a:cxn ang="0">
+                  <a:pos x="connsiteX7" y="connsiteY7"/>
+                </a:cxn>
+                <a:cxn ang="0">
+                  <a:pos x="connsiteX8" y="connsiteY8"/>
+                </a:cxn>
+                <a:cxn ang="0">
+                  <a:pos x="connsiteX9" y="connsiteY9"/>
+                </a:cxn>
+                <a:cxn ang="0">
+                  <a:pos x="connsiteX10" y="connsiteY10"/>
+                </a:cxn>
+                <a:cxn ang="0">
+                  <a:pos x="connsiteX11" y="connsiteY11"/>
+                </a:cxn>
+                <a:cxn ang="0">
+                  <a:pos x="connsiteX12" y="connsiteY12"/>
+                </a:cxn>
+                <a:cxn ang="0">
+                  <a:pos x="connsiteX13" y="connsiteY13"/>
+                </a:cxn>
+                <a:cxn ang="0">
+                  <a:pos x="connsiteX14" y="connsiteY14"/>
+                </a:cxn>
+                <a:cxn ang="0">
+                  <a:pos x="connsiteX15" y="connsiteY15"/>
+                </a:cxn>
+                <a:cxn ang="0">
+                  <a:pos x="connsiteX16" y="connsiteY16"/>
+                </a:cxn>
+                <a:cxn ang="0">
+                  <a:pos x="connsiteX17" y="connsiteY17"/>
+                </a:cxn>
+                <a:cxn ang="0">
+                  <a:pos x="connsiteX18" y="connsiteY18"/>
+                </a:cxn>
+                <a:cxn ang="0">
+                  <a:pos x="connsiteX19" y="connsiteY19"/>
+                </a:cxn>
+                <a:cxn ang="0">
+                  <a:pos x="connsiteX20" y="connsiteY20"/>
+                </a:cxn>
+                <a:cxn ang="0">
+                  <a:pos x="connsiteX21" y="connsiteY21"/>
+                </a:cxn>
+                <a:cxn ang="0">
+                  <a:pos x="connsiteX22" y="connsiteY22"/>
+                </a:cxn>
+                <a:cxn ang="0">
+                  <a:pos x="connsiteX23" y="connsiteY23"/>
+                </a:cxn>
+                <a:cxn ang="0">
+                  <a:pos x="connsiteX24" y="connsiteY24"/>
+                </a:cxn>
+                <a:cxn ang="0">
+                  <a:pos x="connsiteX25" y="connsiteY25"/>
+                </a:cxn>
+                <a:cxn ang="0">
+                  <a:pos x="connsiteX26" y="connsiteY26"/>
+                </a:cxn>
+                <a:cxn ang="0">
+                  <a:pos x="connsiteX27" y="connsiteY27"/>
+                </a:cxn>
+                <a:cxn ang="0">
+                  <a:pos x="connsiteX28" y="connsiteY28"/>
+                </a:cxn>
+                <a:cxn ang="0">
+                  <a:pos x="connsiteX29" y="connsiteY29"/>
+                </a:cxn>
+                <a:cxn ang="0">
+                  <a:pos x="connsiteX30" y="connsiteY30"/>
+                </a:cxn>
+                <a:cxn ang="0">
+                  <a:pos x="connsiteX31" y="connsiteY31"/>
+                </a:cxn>
+                <a:cxn ang="0">
+                  <a:pos x="connsiteX32" y="connsiteY32"/>
+                </a:cxn>
+                <a:cxn ang="0">
+                  <a:pos x="connsiteX33" y="connsiteY33"/>
+                </a:cxn>
+                <a:cxn ang="0">
+                  <a:pos x="connsiteX34" y="connsiteY34"/>
+                </a:cxn>
+                <a:cxn ang="0">
+                  <a:pos x="connsiteX35" y="connsiteY35"/>
+                </a:cxn>
+                <a:cxn ang="0">
+                  <a:pos x="connsiteX36" y="connsiteY36"/>
+                </a:cxn>
+                <a:cxn ang="0">
+                  <a:pos x="connsiteX37" y="connsiteY37"/>
+                </a:cxn>
+                <a:cxn ang="0">
+                  <a:pos x="connsiteX38" y="connsiteY38"/>
+                </a:cxn>
+                <a:cxn ang="0">
+                  <a:pos x="connsiteX39" y="connsiteY39"/>
+                </a:cxn>
+                <a:cxn ang="0">
+                  <a:pos x="connsiteX40" y="connsiteY40"/>
+                </a:cxn>
+                <a:cxn ang="0">
+                  <a:pos x="connsiteX41" y="connsiteY41"/>
+                </a:cxn>
+                <a:cxn ang="0">
+                  <a:pos x="connsiteX42" y="connsiteY42"/>
+                </a:cxn>
+                <a:cxn ang="0">
+                  <a:pos x="connsiteX43" y="connsiteY43"/>
+                </a:cxn>
+                <a:cxn ang="0">
+                  <a:pos x="connsiteX44" y="connsiteY44"/>
+                </a:cxn>
+                <a:cxn ang="0">
+                  <a:pos x="connsiteX45" y="connsiteY45"/>
+                </a:cxn>
+                <a:cxn ang="0">
+                  <a:pos x="connsiteX46" y="connsiteY46"/>
+                </a:cxn>
+                <a:cxn ang="0">
+                  <a:pos x="connsiteX47" y="connsiteY47"/>
+                </a:cxn>
+                <a:cxn ang="0">
+                  <a:pos x="connsiteX48" y="connsiteY48"/>
+                </a:cxn>
+                <a:cxn ang="0">
+                  <a:pos x="connsiteX49" y="connsiteY49"/>
+                </a:cxn>
+                <a:cxn ang="0">
+                  <a:pos x="connsiteX50" y="connsiteY50"/>
+                </a:cxn>
+                <a:cxn ang="0">
+                  <a:pos x="connsiteX51" y="connsiteY51"/>
+                </a:cxn>
+                <a:cxn ang="0">
+                  <a:pos x="connsiteX52" y="connsiteY52"/>
+                </a:cxn>
+                <a:cxn ang="0">
+                  <a:pos x="connsiteX53" y="connsiteY53"/>
+                </a:cxn>
+                <a:cxn ang="0">
+                  <a:pos x="connsiteX54" y="connsiteY54"/>
+                </a:cxn>
+                <a:cxn ang="0">
+                  <a:pos x="connsiteX55" y="connsiteY55"/>
+                </a:cxn>
+                <a:cxn ang="0">
+                  <a:pos x="connsiteX56" y="connsiteY56"/>
+                </a:cxn>
+                <a:cxn ang="0">
+                  <a:pos x="connsiteX57" y="connsiteY57"/>
+                </a:cxn>
+                <a:cxn ang="0">
+                  <a:pos x="connsiteX58" y="connsiteY58"/>
+                </a:cxn>
+                <a:cxn ang="0">
+                  <a:pos x="connsiteX59" y="connsiteY59"/>
+                </a:cxn>
+                <a:cxn ang="0">
+                  <a:pos x="connsiteX60" y="connsiteY60"/>
+                </a:cxn>
+                <a:cxn ang="0">
+                  <a:pos x="connsiteX61" y="connsiteY61"/>
+                </a:cxn>
+                <a:cxn ang="0">
+                  <a:pos x="connsiteX62" y="connsiteY62"/>
+                </a:cxn>
+                <a:cxn ang="0">
+                  <a:pos x="connsiteX63" y="connsiteY63"/>
+                </a:cxn>
+                <a:cxn ang="0">
+                  <a:pos x="connsiteX64" y="connsiteY64"/>
+                </a:cxn>
+                <a:cxn ang="0">
+                  <a:pos x="connsiteX65" y="connsiteY65"/>
+                </a:cxn>
+                <a:cxn ang="0">
+                  <a:pos x="connsiteX66" y="connsiteY66"/>
+                </a:cxn>
+                <a:cxn ang="0">
+                  <a:pos x="connsiteX67" y="connsiteY67"/>
+                </a:cxn>
+                <a:cxn ang="0">
+                  <a:pos x="connsiteX68" y="connsiteY68"/>
+                </a:cxn>
+              </a:cxnLst>
+              <a:rect l="l" t="t" r="r" b="b"/>
+              <a:pathLst>
+                <a:path w="1873955" h="1275644">
+                  <a:moveTo>
+                    <a:pt x="0" y="0"/>
+                  </a:moveTo>
+                  <a:cubicBezTo>
+                    <a:pt x="30104" y="30104"/>
+                    <a:pt x="52233" y="71271"/>
+                    <a:pt x="90311" y="90311"/>
+                  </a:cubicBezTo>
+                  <a:cubicBezTo>
+                    <a:pt x="155184" y="122748"/>
+                    <a:pt x="171970" y="129698"/>
+                    <a:pt x="248355" y="180622"/>
+                  </a:cubicBezTo>
+                  <a:cubicBezTo>
+                    <a:pt x="259644" y="188148"/>
+                    <a:pt x="271799" y="194514"/>
+                    <a:pt x="282222" y="203200"/>
+                  </a:cubicBezTo>
+                  <a:cubicBezTo>
+                    <a:pt x="294487" y="213420"/>
+                    <a:pt x="302805" y="228210"/>
+                    <a:pt x="316089" y="237066"/>
+                  </a:cubicBezTo>
+                  <a:cubicBezTo>
+                    <a:pt x="325990" y="243667"/>
+                    <a:pt x="339312" y="243033"/>
+                    <a:pt x="349955" y="248355"/>
+                  </a:cubicBezTo>
+                  <a:cubicBezTo>
+                    <a:pt x="362090" y="254423"/>
+                    <a:pt x="371351" y="265588"/>
+                    <a:pt x="383822" y="270933"/>
+                  </a:cubicBezTo>
+                  <a:cubicBezTo>
+                    <a:pt x="434461" y="292635"/>
+                    <a:pt x="418907" y="271542"/>
+                    <a:pt x="462844" y="293511"/>
+                  </a:cubicBezTo>
+                  <a:cubicBezTo>
+                    <a:pt x="474979" y="299579"/>
+                    <a:pt x="485422" y="308563"/>
+                    <a:pt x="496711" y="316089"/>
+                  </a:cubicBezTo>
+                  <a:cubicBezTo>
+                    <a:pt x="500474" y="327378"/>
+                    <a:pt x="498317" y="343039"/>
+                    <a:pt x="508000" y="349955"/>
+                  </a:cubicBezTo>
+                  <a:cubicBezTo>
+                    <a:pt x="527366" y="363788"/>
+                    <a:pt x="575733" y="372533"/>
+                    <a:pt x="575733" y="372533"/>
+                  </a:cubicBezTo>
+                  <a:cubicBezTo>
+                    <a:pt x="723313" y="483218"/>
+                    <a:pt x="544422" y="341222"/>
+                    <a:pt x="643466" y="440266"/>
+                  </a:cubicBezTo>
+                  <a:cubicBezTo>
+                    <a:pt x="653060" y="449860"/>
+                    <a:pt x="666293" y="454958"/>
+                    <a:pt x="677333" y="462844"/>
+                  </a:cubicBezTo>
+                  <a:cubicBezTo>
+                    <a:pt x="692643" y="473780"/>
+                    <a:pt x="707179" y="485775"/>
+                    <a:pt x="722489" y="496711"/>
+                  </a:cubicBezTo>
+                  <a:cubicBezTo>
+                    <a:pt x="733529" y="504597"/>
+                    <a:pt x="745932" y="510603"/>
+                    <a:pt x="756355" y="519289"/>
+                  </a:cubicBezTo>
+                  <a:cubicBezTo>
+                    <a:pt x="867312" y="611753"/>
+                    <a:pt x="724005" y="498225"/>
+                    <a:pt x="812800" y="587022"/>
+                  </a:cubicBezTo>
+                  <a:cubicBezTo>
+                    <a:pt x="839918" y="614140"/>
+                    <a:pt x="848398" y="607117"/>
+                    <a:pt x="880533" y="620889"/>
+                  </a:cubicBezTo>
+                  <a:cubicBezTo>
+                    <a:pt x="978186" y="662739"/>
+                    <a:pt x="880130" y="628279"/>
+                    <a:pt x="959555" y="654755"/>
+                  </a:cubicBezTo>
+                  <a:cubicBezTo>
+                    <a:pt x="963318" y="666044"/>
+                    <a:pt x="962430" y="680208"/>
+                    <a:pt x="970844" y="688622"/>
+                  </a:cubicBezTo>
+                  <a:cubicBezTo>
+                    <a:pt x="979258" y="697036"/>
+                    <a:pt x="994068" y="694589"/>
+                    <a:pt x="1004711" y="699911"/>
+                  </a:cubicBezTo>
+                  <a:cubicBezTo>
+                    <a:pt x="1082226" y="738668"/>
+                    <a:pt x="986125" y="711999"/>
+                    <a:pt x="1095022" y="733777"/>
+                  </a:cubicBezTo>
+                  <a:cubicBezTo>
+                    <a:pt x="1110074" y="741303"/>
+                    <a:pt x="1126484" y="746573"/>
+                    <a:pt x="1140178" y="756355"/>
+                  </a:cubicBezTo>
+                  <a:cubicBezTo>
+                    <a:pt x="1153169" y="765634"/>
+                    <a:pt x="1160575" y="781651"/>
+                    <a:pt x="1174044" y="790222"/>
+                  </a:cubicBezTo>
+                  <a:cubicBezTo>
+                    <a:pt x="1199228" y="806248"/>
+                    <a:pt x="1259215" y="836914"/>
+                    <a:pt x="1298222" y="846666"/>
+                  </a:cubicBezTo>
+                  <a:cubicBezTo>
+                    <a:pt x="1316836" y="851320"/>
+                    <a:pt x="1335970" y="853641"/>
+                    <a:pt x="1354666" y="857955"/>
+                  </a:cubicBezTo>
+                  <a:cubicBezTo>
+                    <a:pt x="1384902" y="864933"/>
+                    <a:pt x="1444978" y="880533"/>
+                    <a:pt x="1444978" y="880533"/>
+                  </a:cubicBezTo>
+                  <a:cubicBezTo>
+                    <a:pt x="1520237" y="876770"/>
+                    <a:pt x="1595685" y="875772"/>
+                    <a:pt x="1670755" y="869244"/>
+                  </a:cubicBezTo>
+                  <a:cubicBezTo>
+                    <a:pt x="1682610" y="868213"/>
+                    <a:pt x="1694220" y="863734"/>
+                    <a:pt x="1704622" y="857955"/>
+                  </a:cubicBezTo>
+                  <a:cubicBezTo>
+                    <a:pt x="1728342" y="844777"/>
+                    <a:pt x="1749777" y="827852"/>
+                    <a:pt x="1772355" y="812800"/>
+                  </a:cubicBezTo>
+                  <a:lnTo>
+                    <a:pt x="1806222" y="790222"/>
+                  </a:lnTo>
+                  <a:cubicBezTo>
+                    <a:pt x="1839859" y="739767"/>
+                    <a:pt x="1850744" y="736313"/>
+                    <a:pt x="1862666" y="688622"/>
+                  </a:cubicBezTo>
+                  <a:cubicBezTo>
+                    <a:pt x="1867319" y="670007"/>
+                    <a:pt x="1870192" y="650992"/>
+                    <a:pt x="1873955" y="632177"/>
+                  </a:cubicBezTo>
+                  <a:cubicBezTo>
+                    <a:pt x="1870192" y="549392"/>
+                    <a:pt x="1869274" y="466429"/>
+                    <a:pt x="1862666" y="383822"/>
+                  </a:cubicBezTo>
+                  <a:cubicBezTo>
+                    <a:pt x="1860487" y="356588"/>
+                    <a:pt x="1817640" y="286028"/>
+                    <a:pt x="1806222" y="282222"/>
+                  </a:cubicBezTo>
+                  <a:lnTo>
+                    <a:pt x="1772355" y="270933"/>
+                  </a:lnTo>
+                  <a:cubicBezTo>
+                    <a:pt x="1761066" y="263407"/>
+                    <a:pt x="1750624" y="254423"/>
+                    <a:pt x="1738489" y="248355"/>
+                  </a:cubicBezTo>
+                  <a:cubicBezTo>
+                    <a:pt x="1695054" y="226637"/>
+                    <a:pt x="1612167" y="228661"/>
+                    <a:pt x="1580444" y="225777"/>
+                  </a:cubicBezTo>
+                  <a:cubicBezTo>
+                    <a:pt x="1512711" y="233303"/>
+                    <a:pt x="1443359" y="231826"/>
+                    <a:pt x="1377244" y="248355"/>
+                  </a:cubicBezTo>
+                  <a:cubicBezTo>
+                    <a:pt x="1261119" y="277386"/>
+                    <a:pt x="1317651" y="266545"/>
+                    <a:pt x="1207911" y="282222"/>
+                  </a:cubicBezTo>
+                  <a:cubicBezTo>
+                    <a:pt x="1196622" y="289748"/>
+                    <a:pt x="1183638" y="295206"/>
+                    <a:pt x="1174044" y="304800"/>
+                  </a:cubicBezTo>
+                  <a:cubicBezTo>
+                    <a:pt x="1164450" y="314394"/>
+                    <a:pt x="1162060" y="330191"/>
+                    <a:pt x="1151466" y="338666"/>
+                  </a:cubicBezTo>
+                  <a:cubicBezTo>
+                    <a:pt x="1142174" y="346099"/>
+                    <a:pt x="1128002" y="344176"/>
+                    <a:pt x="1117600" y="349955"/>
+                  </a:cubicBezTo>
+                  <a:cubicBezTo>
+                    <a:pt x="1093879" y="363133"/>
+                    <a:pt x="1049866" y="395111"/>
+                    <a:pt x="1049866" y="395111"/>
+                  </a:cubicBezTo>
+                  <a:cubicBezTo>
+                    <a:pt x="1012525" y="507142"/>
+                    <a:pt x="1075174" y="336012"/>
+                    <a:pt x="1004711" y="462844"/>
+                  </a:cubicBezTo>
+                  <a:cubicBezTo>
+                    <a:pt x="993153" y="483648"/>
+                    <a:pt x="982133" y="530577"/>
+                    <a:pt x="982133" y="530577"/>
+                  </a:cubicBezTo>
+                  <a:cubicBezTo>
+                    <a:pt x="960390" y="726258"/>
+                    <a:pt x="945202" y="765708"/>
+                    <a:pt x="970844" y="970844"/>
+                  </a:cubicBezTo>
+                  <a:cubicBezTo>
+                    <a:pt x="972527" y="984307"/>
+                    <a:pt x="981917" y="997520"/>
+                    <a:pt x="993422" y="1004711"/>
+                  </a:cubicBezTo>
+                  <a:cubicBezTo>
+                    <a:pt x="1013603" y="1017325"/>
+                    <a:pt x="1061155" y="1027289"/>
+                    <a:pt x="1061155" y="1027289"/>
+                  </a:cubicBezTo>
+                  <a:cubicBezTo>
+                    <a:pt x="1068681" y="1038578"/>
+                    <a:pt x="1073139" y="1052680"/>
+                    <a:pt x="1083733" y="1061155"/>
+                  </a:cubicBezTo>
+                  <a:cubicBezTo>
+                    <a:pt x="1093025" y="1068589"/>
+                    <a:pt x="1109186" y="1064030"/>
+                    <a:pt x="1117600" y="1072444"/>
+                  </a:cubicBezTo>
+                  <a:cubicBezTo>
+                    <a:pt x="1126014" y="1080858"/>
+                    <a:pt x="1124202" y="1095373"/>
+                    <a:pt x="1128889" y="1106311"/>
+                  </a:cubicBezTo>
+                  <a:cubicBezTo>
+                    <a:pt x="1135518" y="1121779"/>
+                    <a:pt x="1143940" y="1136414"/>
+                    <a:pt x="1151466" y="1151466"/>
+                  </a:cubicBezTo>
+                  <a:cubicBezTo>
+                    <a:pt x="1147703" y="1185333"/>
+                    <a:pt x="1158472" y="1224318"/>
+                    <a:pt x="1140178" y="1253066"/>
+                  </a:cubicBezTo>
+                  <a:cubicBezTo>
+                    <a:pt x="1127401" y="1273145"/>
+                    <a:pt x="1072444" y="1275644"/>
+                    <a:pt x="1072444" y="1275644"/>
+                  </a:cubicBezTo>
+                  <a:cubicBezTo>
+                    <a:pt x="1046103" y="1271881"/>
+                    <a:pt x="1019513" y="1269573"/>
+                    <a:pt x="993422" y="1264355"/>
+                  </a:cubicBezTo>
+                  <a:cubicBezTo>
+                    <a:pt x="981753" y="1262021"/>
+                    <a:pt x="968847" y="1260500"/>
+                    <a:pt x="959555" y="1253066"/>
+                  </a:cubicBezTo>
+                  <a:cubicBezTo>
+                    <a:pt x="948961" y="1244591"/>
+                    <a:pt x="943045" y="1231335"/>
+                    <a:pt x="936978" y="1219200"/>
+                  </a:cubicBezTo>
+                  <a:cubicBezTo>
+                    <a:pt x="931656" y="1208557"/>
+                    <a:pt x="929452" y="1196622"/>
+                    <a:pt x="925689" y="1185333"/>
+                  </a:cubicBezTo>
+                  <a:cubicBezTo>
+                    <a:pt x="917182" y="1125787"/>
+                    <a:pt x="901727" y="1064616"/>
+                    <a:pt x="925689" y="1004711"/>
+                  </a:cubicBezTo>
+                  <a:cubicBezTo>
+                    <a:pt x="930108" y="993663"/>
+                    <a:pt x="948266" y="997185"/>
+                    <a:pt x="959555" y="993422"/>
+                  </a:cubicBezTo>
+                  <a:cubicBezTo>
+                    <a:pt x="1068681" y="997185"/>
+                    <a:pt x="1177955" y="997900"/>
+                    <a:pt x="1286933" y="1004711"/>
+                  </a:cubicBezTo>
+                  <a:cubicBezTo>
+                    <a:pt x="1319361" y="1006738"/>
+                    <a:pt x="1327214" y="1024851"/>
+                    <a:pt x="1354666" y="1038577"/>
+                  </a:cubicBezTo>
+                  <a:cubicBezTo>
+                    <a:pt x="1365309" y="1043899"/>
+                    <a:pt x="1377244" y="1046103"/>
+                    <a:pt x="1388533" y="1049866"/>
+                  </a:cubicBezTo>
+                  <a:cubicBezTo>
+                    <a:pt x="1392296" y="1061155"/>
+                    <a:pt x="1390139" y="1076816"/>
+                    <a:pt x="1399822" y="1083733"/>
+                  </a:cubicBezTo>
+                  <a:cubicBezTo>
+                    <a:pt x="1419188" y="1097566"/>
+                    <a:pt x="1467555" y="1106311"/>
+                    <a:pt x="1467555" y="1106311"/>
+                  </a:cubicBezTo>
+                  <a:cubicBezTo>
+                    <a:pt x="1488153" y="1137207"/>
+                    <a:pt x="1488351" y="1146911"/>
+                    <a:pt x="1524000" y="1162755"/>
+                  </a:cubicBezTo>
+                  <a:cubicBezTo>
+                    <a:pt x="1545748" y="1172421"/>
+                    <a:pt x="1591733" y="1185333"/>
+                    <a:pt x="1591733" y="1185333"/>
+                  </a:cubicBezTo>
+                  <a:cubicBezTo>
+                    <a:pt x="1614311" y="1181570"/>
+                    <a:pt x="1637752" y="1181282"/>
+                    <a:pt x="1659466" y="1174044"/>
+                  </a:cubicBezTo>
+                  <a:cubicBezTo>
+                    <a:pt x="1672337" y="1169753"/>
+                    <a:pt x="1693333" y="1151466"/>
+                    <a:pt x="1693333" y="1151466"/>
+                  </a:cubicBezTo>
+                </a:path>
+              </a:pathLst>
+            </a:custGeom>
+            <a:noFill/>
+            <a:ln w="47625"/>
+          </p:spPr>
+          <p:style>
+            <a:lnRef idx="2">
+              <a:schemeClr val="accent1">
+                <a:shade val="50000"/>
+              </a:schemeClr>
+            </a:lnRef>
+            <a:fillRef idx="1">
+              <a:schemeClr val="accent1"/>
+            </a:fillRef>
+            <a:effectRef idx="0">
+              <a:schemeClr val="accent1"/>
+            </a:effectRef>
+            <a:fontRef idx="minor">
+              <a:schemeClr val="lt1"/>
+            </a:fontRef>
+          </p:style>
+          <p:txBody>
+            <a:bodyPr rtlCol="0" anchor="ctr"/>
+            <a:lstStyle/>
+            <a:p>
+              <a:pPr algn="ctr"/>
+              <a:endParaRPr lang="en-US"/>
+            </a:p>
+          </p:txBody>
+        </p:sp>
+        <p:sp>
+          <p:nvSpPr>
+            <p:cNvPr id="17" name="Freeform 16"/>
+            <p:cNvSpPr/>
+            <p:nvPr/>
+          </p:nvSpPr>
+          <p:spPr>
+            <a:xfrm>
+              <a:off x="5508978" y="4334933"/>
+              <a:ext cx="891822" cy="1885245"/>
+            </a:xfrm>
+            <a:custGeom>
+              <a:avLst/>
+              <a:gdLst>
+                <a:gd name="connsiteX0" fmla="*/ 0 w 891822"/>
+                <a:gd name="connsiteY0" fmla="*/ 0 h 1885245"/>
+                <a:gd name="connsiteX1" fmla="*/ 293511 w 891822"/>
+                <a:gd name="connsiteY1" fmla="*/ 90311 h 1885245"/>
+                <a:gd name="connsiteX2" fmla="*/ 846666 w 891822"/>
+                <a:gd name="connsiteY2" fmla="*/ 519289 h 1885245"/>
+                <a:gd name="connsiteX3" fmla="*/ 891822 w 891822"/>
+                <a:gd name="connsiteY3" fmla="*/ 1885245 h 1885245"/>
+                <a:gd name="connsiteX4" fmla="*/ 45155 w 891822"/>
+                <a:gd name="connsiteY4" fmla="*/ 1851378 h 1885245"/>
+                <a:gd name="connsiteX5" fmla="*/ 0 w 891822"/>
+                <a:gd name="connsiteY5" fmla="*/ 0 h 1885245"/>
+              </a:gdLst>
+              <a:ahLst/>
+              <a:cxnLst>
+                <a:cxn ang="0">
+                  <a:pos x="connsiteX0" y="connsiteY0"/>
+                </a:cxn>
+                <a:cxn ang="0">
+                  <a:pos x="connsiteX1" y="connsiteY1"/>
+                </a:cxn>
+                <a:cxn ang="0">
+                  <a:pos x="connsiteX2" y="connsiteY2"/>
+                </a:cxn>
+                <a:cxn ang="0">
+                  <a:pos x="connsiteX3" y="connsiteY3"/>
+                </a:cxn>
+                <a:cxn ang="0">
+                  <a:pos x="connsiteX4" y="connsiteY4"/>
+                </a:cxn>
+                <a:cxn ang="0">
+                  <a:pos x="connsiteX5" y="connsiteY5"/>
+                </a:cxn>
+              </a:cxnLst>
+              <a:rect l="l" t="t" r="r" b="b"/>
+              <a:pathLst>
+                <a:path w="891822" h="1885245">
+                  <a:moveTo>
+                    <a:pt x="0" y="0"/>
+                  </a:moveTo>
+                  <a:lnTo>
+                    <a:pt x="293511" y="90311"/>
+                  </a:lnTo>
+                  <a:lnTo>
+                    <a:pt x="846666" y="519289"/>
+                  </a:lnTo>
+                  <a:lnTo>
+                    <a:pt x="891822" y="1885245"/>
+                  </a:lnTo>
+                  <a:lnTo>
+                    <a:pt x="45155" y="1851378"/>
+                  </a:lnTo>
+                  <a:lnTo>
+                    <a:pt x="0" y="0"/>
+                  </a:lnTo>
+                  <a:close/>
+                </a:path>
+              </a:pathLst>
+            </a:custGeom>
+            <a:solidFill>
+              <a:schemeClr val="accent2">
+                <a:alpha val="65000"/>
+              </a:schemeClr>
+            </a:solidFill>
+          </p:spPr>
+          <p:style>
+            <a:lnRef idx="2">
+              <a:schemeClr val="accent1">
+                <a:shade val="50000"/>
+              </a:schemeClr>
+            </a:lnRef>
+            <a:fillRef idx="1">
+              <a:schemeClr val="accent1"/>
+            </a:fillRef>
+            <a:effectRef idx="0">
+              <a:schemeClr val="accent1"/>
+            </a:effectRef>
+            <a:fontRef idx="minor">
+              <a:schemeClr val="lt1"/>
+            </a:fontRef>
+          </p:style>
+          <p:txBody>
+            <a:bodyPr rtlCol="0" anchor="ctr"/>
+            <a:lstStyle/>
+            <a:p>
+              <a:pPr algn="ctr"/>
+              <a:r>
+                <a:rPr lang="en-US" sz="4000" dirty="0" smtClean="0">
+                  <a:solidFill>
+                    <a:schemeClr val="tx1"/>
+                  </a:solidFill>
+                </a:rPr>
+                <a:t>D1</a:t>
+              </a:r>
+              <a:endParaRPr lang="en-US" sz="4000" dirty="0">
+                <a:solidFill>
+                  <a:schemeClr val="tx1"/>
+                </a:solidFill>
+              </a:endParaRPr>
+            </a:p>
+          </p:txBody>
+        </p:sp>
+        <p:sp>
+          <p:nvSpPr>
+            <p:cNvPr id="18" name="Freeform 17"/>
+            <p:cNvSpPr/>
+            <p:nvPr/>
+          </p:nvSpPr>
+          <p:spPr>
+            <a:xfrm>
+              <a:off x="6389511" y="4809067"/>
+              <a:ext cx="2404532" cy="1399822"/>
+            </a:xfrm>
+            <a:custGeom>
+              <a:avLst/>
+              <a:gdLst>
+                <a:gd name="connsiteX0" fmla="*/ 0 w 2336800"/>
+                <a:gd name="connsiteY0" fmla="*/ 56444 h 1399822"/>
+                <a:gd name="connsiteX1" fmla="*/ 22578 w 2336800"/>
+                <a:gd name="connsiteY1" fmla="*/ 1388533 h 1399822"/>
+                <a:gd name="connsiteX2" fmla="*/ 2336800 w 2336800"/>
+                <a:gd name="connsiteY2" fmla="*/ 1399822 h 1399822"/>
+                <a:gd name="connsiteX3" fmla="*/ 2291645 w 2336800"/>
+                <a:gd name="connsiteY3" fmla="*/ 0 h 1399822"/>
+                <a:gd name="connsiteX4" fmla="*/ 2167467 w 2336800"/>
+                <a:gd name="connsiteY4" fmla="*/ 22577 h 1399822"/>
+                <a:gd name="connsiteX5" fmla="*/ 1704622 w 2336800"/>
+                <a:gd name="connsiteY5" fmla="*/ 383822 h 1399822"/>
+                <a:gd name="connsiteX6" fmla="*/ 1298222 w 2336800"/>
+                <a:gd name="connsiteY6" fmla="*/ 711200 h 1399822"/>
+                <a:gd name="connsiteX7" fmla="*/ 1016000 w 2336800"/>
+                <a:gd name="connsiteY7" fmla="*/ 835377 h 1399822"/>
+                <a:gd name="connsiteX8" fmla="*/ 643467 w 2336800"/>
+                <a:gd name="connsiteY8" fmla="*/ 699911 h 1399822"/>
+                <a:gd name="connsiteX9" fmla="*/ 0 w 2336800"/>
+                <a:gd name="connsiteY9" fmla="*/ 56444 h 1399822"/>
+              </a:gdLst>
+              <a:ahLst/>
+              <a:cxnLst>
+                <a:cxn ang="0">
+                  <a:pos x="connsiteX0" y="connsiteY0"/>
+                </a:cxn>
+                <a:cxn ang="0">
+                  <a:pos x="connsiteX1" y="connsiteY1"/>
+                </a:cxn>
+                <a:cxn ang="0">
+                  <a:pos x="connsiteX2" y="connsiteY2"/>
+                </a:cxn>
+                <a:cxn ang="0">
+                  <a:pos x="connsiteX3" y="connsiteY3"/>
+                </a:cxn>
+                <a:cxn ang="0">
+                  <a:pos x="connsiteX4" y="connsiteY4"/>
+                </a:cxn>
+                <a:cxn ang="0">
+                  <a:pos x="connsiteX5" y="connsiteY5"/>
+                </a:cxn>
+                <a:cxn ang="0">
+                  <a:pos x="connsiteX6" y="connsiteY6"/>
+                </a:cxn>
+                <a:cxn ang="0">
+                  <a:pos x="connsiteX7" y="connsiteY7"/>
+                </a:cxn>
+                <a:cxn ang="0">
+                  <a:pos x="connsiteX8" y="connsiteY8"/>
+                </a:cxn>
+                <a:cxn ang="0">
+                  <a:pos x="connsiteX9" y="connsiteY9"/>
+                </a:cxn>
+              </a:cxnLst>
+              <a:rect l="l" t="t" r="r" b="b"/>
+              <a:pathLst>
+                <a:path w="2336800" h="1399822">
+                  <a:moveTo>
+                    <a:pt x="0" y="56444"/>
+                  </a:moveTo>
+                  <a:lnTo>
+                    <a:pt x="22578" y="1388533"/>
+                  </a:lnTo>
+                  <a:lnTo>
+                    <a:pt x="2336800" y="1399822"/>
+                  </a:lnTo>
+                  <a:lnTo>
+                    <a:pt x="2291645" y="0"/>
+                  </a:lnTo>
+                  <a:lnTo>
+                    <a:pt x="2167467" y="22577"/>
+                  </a:lnTo>
+                  <a:lnTo>
+                    <a:pt x="1704622" y="383822"/>
+                  </a:lnTo>
+                  <a:lnTo>
+                    <a:pt x="1298222" y="711200"/>
+                  </a:lnTo>
+                  <a:lnTo>
+                    <a:pt x="1016000" y="835377"/>
+                  </a:lnTo>
+                  <a:lnTo>
+                    <a:pt x="643467" y="699911"/>
+                  </a:lnTo>
+                  <a:lnTo>
+                    <a:pt x="0" y="56444"/>
+                  </a:lnTo>
+                  <a:close/>
+                </a:path>
+              </a:pathLst>
+            </a:custGeom>
+            <a:solidFill>
+              <a:schemeClr val="accent4">
+                <a:alpha val="40000"/>
+              </a:schemeClr>
+            </a:solidFill>
+          </p:spPr>
+          <p:style>
+            <a:lnRef idx="2">
+              <a:schemeClr val="accent1">
+                <a:shade val="50000"/>
+              </a:schemeClr>
+            </a:lnRef>
+            <a:fillRef idx="1">
+              <a:schemeClr val="accent1"/>
+            </a:fillRef>
+            <a:effectRef idx="0">
+              <a:schemeClr val="accent1"/>
+            </a:effectRef>
+            <a:fontRef idx="minor">
+              <a:schemeClr val="lt1"/>
+            </a:fontRef>
+          </p:style>
+          <p:txBody>
+            <a:bodyPr rtlCol="0" anchor="ctr"/>
+            <a:lstStyle/>
+            <a:p>
+              <a:pPr algn="ctr"/>
+              <a:r>
+                <a:rPr lang="en-US" dirty="0" smtClean="0"/>
+                <a:t/>
+              </a:r>
+              <a:br>
+                <a:rPr lang="en-US" dirty="0" smtClean="0"/>
+              </a:br>
+              <a:r>
+                <a:rPr lang="en-US" dirty="0" smtClean="0"/>
+                <a:t/>
+              </a:r>
+              <a:br>
+                <a:rPr lang="en-US" dirty="0" smtClean="0"/>
+              </a:br>
+              <a:r>
+                <a:rPr lang="en-US" dirty="0" smtClean="0"/>
+                <a:t/>
+              </a:r>
+              <a:br>
+                <a:rPr lang="en-US" dirty="0" smtClean="0"/>
+              </a:br>
+              <a:r>
+                <a:rPr lang="en-US" sz="4000" dirty="0" smtClean="0">
+                  <a:solidFill>
+                    <a:schemeClr val="tx1"/>
+                  </a:solidFill>
+                </a:rPr>
+                <a:t>D2</a:t>
+              </a:r>
+              <a:endParaRPr lang="en-US" sz="4000" dirty="0">
+                <a:solidFill>
+                  <a:schemeClr val="tx1"/>
+                </a:solidFill>
+              </a:endParaRPr>
+            </a:p>
+          </p:txBody>
+        </p:sp>
+        <p:sp>
+          <p:nvSpPr>
+            <p:cNvPr id="19" name="Freeform 18"/>
+            <p:cNvSpPr/>
+            <p:nvPr/>
+          </p:nvSpPr>
+          <p:spPr>
+            <a:xfrm>
+              <a:off x="8737600" y="4809067"/>
+              <a:ext cx="1907822" cy="1399822"/>
+            </a:xfrm>
+            <a:custGeom>
+              <a:avLst/>
+              <a:gdLst>
+                <a:gd name="connsiteX0" fmla="*/ 0 w 1907822"/>
+                <a:gd name="connsiteY0" fmla="*/ 0 h 1399822"/>
+                <a:gd name="connsiteX1" fmla="*/ 11289 w 1907822"/>
+                <a:gd name="connsiteY1" fmla="*/ 1399822 h 1399822"/>
+                <a:gd name="connsiteX2" fmla="*/ 1907822 w 1907822"/>
+                <a:gd name="connsiteY2" fmla="*/ 1399822 h 1399822"/>
+                <a:gd name="connsiteX3" fmla="*/ 1907822 w 1907822"/>
+                <a:gd name="connsiteY3" fmla="*/ 1196622 h 1399822"/>
+                <a:gd name="connsiteX4" fmla="*/ 936978 w 1907822"/>
+                <a:gd name="connsiteY4" fmla="*/ 824089 h 1399822"/>
+                <a:gd name="connsiteX5" fmla="*/ 711200 w 1907822"/>
+                <a:gd name="connsiteY5" fmla="*/ 677333 h 1399822"/>
+                <a:gd name="connsiteX6" fmla="*/ 293511 w 1907822"/>
+                <a:gd name="connsiteY6" fmla="*/ 191911 h 1399822"/>
+                <a:gd name="connsiteX7" fmla="*/ 0 w 1907822"/>
+                <a:gd name="connsiteY7" fmla="*/ 0 h 1399822"/>
+              </a:gdLst>
+              <a:ahLst/>
+              <a:cxnLst>
+                <a:cxn ang="0">
+                  <a:pos x="connsiteX0" y="connsiteY0"/>
+                </a:cxn>
+                <a:cxn ang="0">
+                  <a:pos x="connsiteX1" y="connsiteY1"/>
+                </a:cxn>
+                <a:cxn ang="0">
+                  <a:pos x="connsiteX2" y="connsiteY2"/>
+                </a:cxn>
+                <a:cxn ang="0">
+                  <a:pos x="connsiteX3" y="connsiteY3"/>
+                </a:cxn>
+                <a:cxn ang="0">
+                  <a:pos x="connsiteX4" y="connsiteY4"/>
+                </a:cxn>
+                <a:cxn ang="0">
+                  <a:pos x="connsiteX5" y="connsiteY5"/>
+                </a:cxn>
+                <a:cxn ang="0">
+                  <a:pos x="connsiteX6" y="connsiteY6"/>
+                </a:cxn>
+                <a:cxn ang="0">
+                  <a:pos x="connsiteX7" y="connsiteY7"/>
+                </a:cxn>
+              </a:cxnLst>
+              <a:rect l="l" t="t" r="r" b="b"/>
+              <a:pathLst>
+                <a:path w="1907822" h="1399822">
+                  <a:moveTo>
+                    <a:pt x="0" y="0"/>
+                  </a:moveTo>
+                  <a:lnTo>
+                    <a:pt x="11289" y="1399822"/>
+                  </a:lnTo>
+                  <a:lnTo>
+                    <a:pt x="1907822" y="1399822"/>
+                  </a:lnTo>
+                  <a:lnTo>
+                    <a:pt x="1907822" y="1196622"/>
+                  </a:lnTo>
+                  <a:lnTo>
+                    <a:pt x="936978" y="824089"/>
+                  </a:lnTo>
+                  <a:lnTo>
+                    <a:pt x="711200" y="677333"/>
+                  </a:lnTo>
+                  <a:lnTo>
+                    <a:pt x="293511" y="191911"/>
+                  </a:lnTo>
+                  <a:lnTo>
+                    <a:pt x="0" y="0"/>
+                  </a:lnTo>
+                  <a:close/>
+                </a:path>
+              </a:pathLst>
+            </a:custGeom>
+            <a:solidFill>
+              <a:schemeClr val="accent2">
+                <a:alpha val="63000"/>
+              </a:schemeClr>
+            </a:solidFill>
+          </p:spPr>
+          <p:style>
+            <a:lnRef idx="2">
+              <a:schemeClr val="accent1">
+                <a:shade val="50000"/>
+              </a:schemeClr>
+            </a:lnRef>
+            <a:fillRef idx="1">
+              <a:schemeClr val="accent1"/>
+            </a:fillRef>
+            <a:effectRef idx="0">
+              <a:schemeClr val="accent1"/>
+            </a:effectRef>
+            <a:fontRef idx="minor">
+              <a:schemeClr val="lt1"/>
+            </a:fontRef>
+          </p:style>
+          <p:txBody>
+            <a:bodyPr rtlCol="0" anchor="ctr"/>
+            <a:lstStyle/>
+            <a:p>
+              <a:pPr algn="ctr"/>
+              <a:r>
+                <a:rPr lang="en-US" dirty="0" smtClean="0"/>
+                <a:t/>
+              </a:r>
+              <a:br>
+                <a:rPr lang="en-US" dirty="0" smtClean="0"/>
+              </a:br>
+              <a:r>
+                <a:rPr lang="en-US" dirty="0" smtClean="0"/>
+                <a:t/>
+              </a:r>
+              <a:br>
+                <a:rPr lang="en-US" dirty="0" smtClean="0"/>
+              </a:br>
+              <a:r>
+                <a:rPr lang="en-US" dirty="0" smtClean="0"/>
+                <a:t/>
+              </a:r>
+              <a:br>
+                <a:rPr lang="en-US" dirty="0" smtClean="0"/>
+              </a:br>
+              <a:r>
+                <a:rPr lang="en-US" sz="4000" dirty="0" smtClean="0">
+                  <a:solidFill>
+                    <a:schemeClr val="tx1"/>
+                  </a:solidFill>
+                </a:rPr>
+                <a:t>D1</a:t>
+              </a:r>
+              <a:endParaRPr lang="en-US" sz="4000" dirty="0">
+                <a:solidFill>
+                  <a:schemeClr val="tx1"/>
+                </a:solidFill>
+              </a:endParaRPr>
+            </a:p>
+          </p:txBody>
+        </p:sp>
+        <p:sp>
+          <p:nvSpPr>
+            <p:cNvPr id="20" name="Freeform 19"/>
+            <p:cNvSpPr/>
+            <p:nvPr/>
+          </p:nvSpPr>
+          <p:spPr>
+            <a:xfrm>
+              <a:off x="1625598" y="824089"/>
+              <a:ext cx="620889" cy="5396089"/>
+            </a:xfrm>
+            <a:custGeom>
+              <a:avLst/>
+              <a:gdLst>
+                <a:gd name="connsiteX0" fmla="*/ 33867 w 620889"/>
+                <a:gd name="connsiteY0" fmla="*/ 0 h 5396089"/>
+                <a:gd name="connsiteX1" fmla="*/ 270933 w 620889"/>
+                <a:gd name="connsiteY1" fmla="*/ 2167466 h 5396089"/>
+                <a:gd name="connsiteX2" fmla="*/ 587022 w 620889"/>
+                <a:gd name="connsiteY2" fmla="*/ 3544711 h 5396089"/>
+                <a:gd name="connsiteX3" fmla="*/ 620889 w 620889"/>
+                <a:gd name="connsiteY3" fmla="*/ 5396089 h 5396089"/>
+                <a:gd name="connsiteX4" fmla="*/ 0 w 620889"/>
+                <a:gd name="connsiteY4" fmla="*/ 5362222 h 5396089"/>
+                <a:gd name="connsiteX5" fmla="*/ 33867 w 620889"/>
+                <a:gd name="connsiteY5" fmla="*/ 0 h 5396089"/>
+              </a:gdLst>
+              <a:ahLst/>
+              <a:cxnLst>
+                <a:cxn ang="0">
+                  <a:pos x="connsiteX0" y="connsiteY0"/>
+                </a:cxn>
+                <a:cxn ang="0">
+                  <a:pos x="connsiteX1" y="connsiteY1"/>
+                </a:cxn>
+                <a:cxn ang="0">
+                  <a:pos x="connsiteX2" y="connsiteY2"/>
+                </a:cxn>
+                <a:cxn ang="0">
+                  <a:pos x="connsiteX3" y="connsiteY3"/>
+                </a:cxn>
+                <a:cxn ang="0">
+                  <a:pos x="connsiteX4" y="connsiteY4"/>
+                </a:cxn>
+                <a:cxn ang="0">
+                  <a:pos x="connsiteX5" y="connsiteY5"/>
+                </a:cxn>
+              </a:cxnLst>
+              <a:rect l="l" t="t" r="r" b="b"/>
+              <a:pathLst>
+                <a:path w="620889" h="5396089">
+                  <a:moveTo>
+                    <a:pt x="33867" y="0"/>
+                  </a:moveTo>
+                  <a:lnTo>
+                    <a:pt x="270933" y="2167466"/>
+                  </a:lnTo>
+                  <a:lnTo>
+                    <a:pt x="587022" y="3544711"/>
+                  </a:lnTo>
+                  <a:lnTo>
+                    <a:pt x="620889" y="5396089"/>
+                  </a:lnTo>
+                  <a:lnTo>
+                    <a:pt x="0" y="5362222"/>
+                  </a:lnTo>
+                  <a:lnTo>
+                    <a:pt x="33867" y="0"/>
+                  </a:lnTo>
+                  <a:close/>
+                </a:path>
+              </a:pathLst>
+            </a:custGeom>
+            <a:solidFill>
+              <a:schemeClr val="accent2">
+                <a:alpha val="52000"/>
+              </a:schemeClr>
+            </a:solidFill>
+          </p:spPr>
+          <p:style>
+            <a:lnRef idx="2">
+              <a:schemeClr val="accent1">
+                <a:shade val="50000"/>
+              </a:schemeClr>
+            </a:lnRef>
+            <a:fillRef idx="1">
+              <a:schemeClr val="accent1"/>
+            </a:fillRef>
+            <a:effectRef idx="0">
+              <a:schemeClr val="accent1"/>
+            </a:effectRef>
+            <a:fontRef idx="minor">
+              <a:schemeClr val="lt1"/>
+            </a:fontRef>
+          </p:style>
+          <p:txBody>
+            <a:bodyPr rtlCol="0" anchor="ctr"/>
+            <a:lstStyle/>
+            <a:p>
+              <a:pPr algn="ctr"/>
+              <a:r>
+                <a:rPr lang="en-US" dirty="0" smtClean="0"/>
+                <a:t/>
+              </a:r>
+              <a:br>
+                <a:rPr lang="en-US" dirty="0" smtClean="0"/>
+              </a:br>
+              <a:r>
+                <a:rPr lang="en-US" dirty="0" smtClean="0"/>
+                <a:t/>
+              </a:r>
+              <a:br>
+                <a:rPr lang="en-US" dirty="0" smtClean="0"/>
+              </a:br>
+              <a:r>
+                <a:rPr lang="en-US" dirty="0" smtClean="0"/>
+                <a:t/>
+              </a:r>
+              <a:br>
+                <a:rPr lang="en-US" dirty="0" smtClean="0"/>
+              </a:br>
+              <a:r>
+                <a:rPr lang="en-US" dirty="0" smtClean="0"/>
+                <a:t/>
+              </a:r>
+              <a:br>
+                <a:rPr lang="en-US" dirty="0" smtClean="0"/>
+              </a:br>
+              <a:r>
+                <a:rPr lang="en-US" dirty="0" smtClean="0"/>
+                <a:t/>
+              </a:r>
+              <a:br>
+                <a:rPr lang="en-US" dirty="0" smtClean="0"/>
+              </a:br>
+              <a:r>
+                <a:rPr lang="en-US" dirty="0" smtClean="0"/>
+                <a:t/>
+              </a:r>
+              <a:br>
+                <a:rPr lang="en-US" dirty="0" smtClean="0"/>
+              </a:br>
+              <a:r>
+                <a:rPr lang="en-US" dirty="0" smtClean="0"/>
+                <a:t/>
+              </a:r>
+              <a:br>
+                <a:rPr lang="en-US" dirty="0" smtClean="0"/>
+              </a:br>
+              <a:r>
+                <a:rPr lang="en-US" dirty="0" smtClean="0"/>
+                <a:t/>
+              </a:r>
+              <a:br>
+                <a:rPr lang="en-US" dirty="0" smtClean="0"/>
+              </a:br>
+              <a:r>
+                <a:rPr lang="en-US" dirty="0" smtClean="0"/>
+                <a:t/>
+              </a:r>
+              <a:br>
+                <a:rPr lang="en-US" dirty="0" smtClean="0"/>
+              </a:br>
+              <a:r>
+                <a:rPr lang="en-US" dirty="0" smtClean="0"/>
+                <a:t/>
+              </a:r>
+              <a:br>
+                <a:rPr lang="en-US" dirty="0" smtClean="0"/>
+              </a:br>
+              <a:r>
+                <a:rPr lang="en-US" dirty="0" smtClean="0"/>
+                <a:t/>
+              </a:r>
+              <a:br>
+                <a:rPr lang="en-US" dirty="0" smtClean="0"/>
+              </a:br>
+              <a:r>
+                <a:rPr lang="en-US" dirty="0" smtClean="0"/>
+                <a:t/>
+              </a:r>
+              <a:br>
+                <a:rPr lang="en-US" dirty="0" smtClean="0"/>
+              </a:br>
+              <a:r>
+                <a:rPr lang="en-US" sz="2800" dirty="0" smtClean="0">
+                  <a:solidFill>
+                    <a:schemeClr val="tx1"/>
+                  </a:solidFill>
+                </a:rPr>
+                <a:t>D1</a:t>
+              </a:r>
+              <a:endParaRPr lang="en-US" sz="2800" dirty="0">
+                <a:solidFill>
+                  <a:schemeClr val="tx1"/>
+                </a:solidFill>
+              </a:endParaRPr>
+            </a:p>
+          </p:txBody>
+        </p:sp>
+      </p:grpSp>
+      <p:sp>
+        <p:nvSpPr>
+          <p:cNvPr id="21" name="TextBox 20"/>
+          <p:cNvSpPr txBox="1"/>
+          <p:nvPr/>
+        </p:nvSpPr>
+        <p:spPr>
+          <a:xfrm rot="16200000">
+            <a:off x="-1080532" y="2462635"/>
+            <a:ext cx="4323647" cy="707886"/>
+          </a:xfrm>
+          <a:prstGeom prst="rect">
+            <a:avLst/>
+          </a:prstGeom>
+          <a:noFill/>
+        </p:spPr>
+        <p:txBody>
+          <a:bodyPr wrap="square" rtlCol="0">
+            <a:spAutoFit/>
+          </a:bodyPr>
+          <a:lstStyle/>
+          <a:p>
+            <a:r>
+              <a:rPr lang="en-US" sz="4000" dirty="0" smtClean="0"/>
+              <a:t>Encounter Prob.</a:t>
+            </a:r>
+            <a:endParaRPr lang="en-US" sz="4000" dirty="0"/>
+          </a:p>
+        </p:txBody>
+      </p:sp>
+      <p:sp>
+        <p:nvSpPr>
+          <p:cNvPr id="22" name="TextBox 21"/>
+          <p:cNvSpPr txBox="1"/>
+          <p:nvPr/>
+        </p:nvSpPr>
+        <p:spPr>
+          <a:xfrm>
+            <a:off x="3273778" y="5990946"/>
+            <a:ext cx="6479822" cy="830997"/>
+          </a:xfrm>
+          <a:prstGeom prst="rect">
+            <a:avLst/>
+          </a:prstGeom>
+          <a:noFill/>
+        </p:spPr>
+        <p:txBody>
+          <a:bodyPr wrap="square" rtlCol="0">
+            <a:spAutoFit/>
+          </a:bodyPr>
+          <a:lstStyle/>
+          <a:p>
+            <a:r>
+              <a:rPr lang="en-US" sz="4800" dirty="0" smtClean="0"/>
+              <a:t>Distance [bead]</a:t>
+            </a:r>
+            <a:endParaRPr lang="en-US" sz="4800" dirty="0"/>
+          </a:p>
+        </p:txBody>
+      </p:sp>
+      <p:sp>
+        <p:nvSpPr>
+          <p:cNvPr id="24" name="TextBox 23"/>
+          <p:cNvSpPr txBox="1"/>
+          <p:nvPr/>
+        </p:nvSpPr>
+        <p:spPr>
+          <a:xfrm>
+            <a:off x="6355645" y="347316"/>
+            <a:ext cx="6626578" cy="1323439"/>
+          </a:xfrm>
+          <a:prstGeom prst="rect">
+            <a:avLst/>
+          </a:prstGeom>
+          <a:noFill/>
+        </p:spPr>
+        <p:txBody>
+          <a:bodyPr wrap="square" rtlCol="0">
+            <a:spAutoFit/>
+          </a:bodyPr>
+          <a:lstStyle/>
+          <a:p>
+            <a:r>
+              <a:rPr lang="en-US" sz="4000" dirty="0" smtClean="0"/>
+              <a:t>D1- chain encounter prob.</a:t>
+            </a:r>
+            <a:br>
+              <a:rPr lang="en-US" sz="4000" dirty="0" smtClean="0"/>
+            </a:br>
+            <a:r>
+              <a:rPr lang="en-US" sz="4000" dirty="0" smtClean="0"/>
+              <a:t>D2- ring encounter Prob</a:t>
+            </a:r>
+            <a:r>
+              <a:rPr lang="en-US" sz="4000" dirty="0"/>
+              <a:t>.</a:t>
+            </a:r>
+          </a:p>
+        </p:txBody>
+      </p:sp>
+    </p:spTree>
+    <p:extLst>
+      <p:ext uri="{BB962C8B-B14F-4D97-AF65-F5344CB8AC3E}">
+        <p14:creationId xmlns:p14="http://schemas.microsoft.com/office/powerpoint/2010/main" val="1576815365"/>
+      </p:ext>
+    </p:extLst>
+  </p:cSld>
+  <p:clrMapOvr>
+    <a:masterClrMapping/>
+  </p:clrMapOvr>
+</p:sld>
+</file>
+
 <file path=ppt/slides/slide2.xml><?xml version="1.0" encoding="utf-8"?>
 <p:sld xmlns:a="http://schemas.openxmlformats.org/drawingml/2006/main" xmlns:r="http://schemas.openxmlformats.org/officeDocument/2006/relationships" xmlns:p="http://schemas.openxmlformats.org/presentationml/2006/main">
   <p:cSld>

</xml_diff>

<commit_message>
added slide with nn  higher prob
</commit_message>
<xml_diff>
--- a/Documents/(article) Random Loop Model to Explain the TAD in CC Experiments/polymerModelWithOneAndTwoFixedLoopsAndInternalConnections.pptx
+++ b/Documents/(article) Random Loop Model to Explain the TAD in CC Experiments/polymerModelWithOneAndTwoFixedLoopsAndInternalConnections.pptx
@@ -18,6 +18,7 @@
     <p:sldId id="266" r:id="rId12"/>
     <p:sldId id="267" r:id="rId13"/>
     <p:sldId id="268" r:id="rId14"/>
+    <p:sldId id="269" r:id="rId15"/>
   </p:sldIdLst>
   <p:sldSz cx="12192000" cy="6858000"/>
   <p:notesSz cx="6858000" cy="9144000"/>
@@ -21816,6 +21817,591 @@
     <p:extLst>
       <p:ext uri="{BB962C8B-B14F-4D97-AF65-F5344CB8AC3E}">
         <p14:creationId xmlns:p14="http://schemas.microsoft.com/office/powerpoint/2010/main" val="1304246405"/>
+      </p:ext>
+    </p:extLst>
+  </p:cSld>
+  <p:clrMapOvr>
+    <a:masterClrMapping/>
+  </p:clrMapOvr>
+</p:sld>
+</file>
+
+<file path=ppt/slides/slide14.xml><?xml version="1.0" encoding="utf-8"?>
+<p:sld xmlns:a="http://schemas.openxmlformats.org/drawingml/2006/main" xmlns:r="http://schemas.openxmlformats.org/officeDocument/2006/relationships" xmlns:p="http://schemas.openxmlformats.org/presentationml/2006/main">
+  <p:cSld>
+    <p:spTree>
+      <p:nvGrpSpPr>
+        <p:cNvPr id="1" name=""/>
+        <p:cNvGrpSpPr/>
+        <p:nvPr/>
+      </p:nvGrpSpPr>
+      <p:grpSpPr>
+        <a:xfrm>
+          <a:off x="0" y="0"/>
+          <a:ext cx="0" cy="0"/>
+          <a:chOff x="0" y="0"/>
+          <a:chExt cx="0" cy="0"/>
+        </a:xfrm>
+      </p:grpSpPr>
+      <p:cxnSp>
+        <p:nvCxnSpPr>
+          <p:cNvPr id="5" name="Straight Connector 4"/>
+          <p:cNvCxnSpPr/>
+          <p:nvPr/>
+        </p:nvCxnSpPr>
+        <p:spPr>
+          <a:xfrm>
+            <a:off x="1122218" y="498763"/>
+            <a:ext cx="0" cy="5434446"/>
+          </a:xfrm>
+          <a:prstGeom prst="line">
+            <a:avLst/>
+          </a:prstGeom>
+          <a:ln w="57150"/>
+        </p:spPr>
+        <p:style>
+          <a:lnRef idx="1">
+            <a:schemeClr val="accent1"/>
+          </a:lnRef>
+          <a:fillRef idx="0">
+            <a:schemeClr val="accent1"/>
+          </a:fillRef>
+          <a:effectRef idx="0">
+            <a:schemeClr val="accent1"/>
+          </a:effectRef>
+          <a:fontRef idx="minor">
+            <a:schemeClr val="tx1"/>
+          </a:fontRef>
+        </p:style>
+      </p:cxnSp>
+      <p:cxnSp>
+        <p:nvCxnSpPr>
+          <p:cNvPr id="7" name="Straight Connector 6"/>
+          <p:cNvCxnSpPr/>
+          <p:nvPr/>
+        </p:nvCxnSpPr>
+        <p:spPr>
+          <a:xfrm>
+            <a:off x="1132609" y="5933209"/>
+            <a:ext cx="8468591" cy="0"/>
+          </a:xfrm>
+          <a:prstGeom prst="line">
+            <a:avLst/>
+          </a:prstGeom>
+          <a:ln w="57150"/>
+        </p:spPr>
+        <p:style>
+          <a:lnRef idx="1">
+            <a:schemeClr val="accent1"/>
+          </a:lnRef>
+          <a:fillRef idx="0">
+            <a:schemeClr val="accent1"/>
+          </a:fillRef>
+          <a:effectRef idx="0">
+            <a:schemeClr val="accent1"/>
+          </a:effectRef>
+          <a:fontRef idx="minor">
+            <a:schemeClr val="tx1"/>
+          </a:fontRef>
+        </p:style>
+      </p:cxnSp>
+      <p:sp>
+        <p:nvSpPr>
+          <p:cNvPr id="9" name="Freeform 8"/>
+          <p:cNvSpPr/>
+          <p:nvPr/>
+        </p:nvSpPr>
+        <p:spPr>
+          <a:xfrm>
+            <a:off x="1215736" y="1220752"/>
+            <a:ext cx="8551719" cy="4504639"/>
+          </a:xfrm>
+          <a:custGeom>
+            <a:avLst/>
+            <a:gdLst>
+              <a:gd name="connsiteX0" fmla="*/ 0 w 8551719"/>
+              <a:gd name="connsiteY0" fmla="*/ 1013293 h 4504639"/>
+              <a:gd name="connsiteX1" fmla="*/ 519546 w 8551719"/>
+              <a:gd name="connsiteY1" fmla="*/ 2436848 h 4504639"/>
+              <a:gd name="connsiteX2" fmla="*/ 1662546 w 8551719"/>
+              <a:gd name="connsiteY2" fmla="*/ 3309684 h 4504639"/>
+              <a:gd name="connsiteX3" fmla="*/ 2514600 w 8551719"/>
+              <a:gd name="connsiteY3" fmla="*/ 3060303 h 4504639"/>
+              <a:gd name="connsiteX4" fmla="*/ 2930237 w 8551719"/>
+              <a:gd name="connsiteY4" fmla="*/ 3247339 h 4504639"/>
+              <a:gd name="connsiteX5" fmla="*/ 3709555 w 8551719"/>
+              <a:gd name="connsiteY5" fmla="*/ 2956393 h 4504639"/>
+              <a:gd name="connsiteX6" fmla="*/ 4540828 w 8551719"/>
+              <a:gd name="connsiteY6" fmla="*/ 2021212 h 4504639"/>
+              <a:gd name="connsiteX7" fmla="*/ 5538355 w 8551719"/>
+              <a:gd name="connsiteY7" fmla="*/ 15766 h 4504639"/>
+              <a:gd name="connsiteX8" fmla="*/ 6431973 w 8551719"/>
+              <a:gd name="connsiteY8" fmla="*/ 3205775 h 4504639"/>
+              <a:gd name="connsiteX9" fmla="*/ 8551719 w 8551719"/>
+              <a:gd name="connsiteY9" fmla="*/ 4504639 h 4504639"/>
+            </a:gdLst>
+            <a:ahLst/>
+            <a:cxnLst>
+              <a:cxn ang="0">
+                <a:pos x="connsiteX0" y="connsiteY0"/>
+              </a:cxn>
+              <a:cxn ang="0">
+                <a:pos x="connsiteX1" y="connsiteY1"/>
+              </a:cxn>
+              <a:cxn ang="0">
+                <a:pos x="connsiteX2" y="connsiteY2"/>
+              </a:cxn>
+              <a:cxn ang="0">
+                <a:pos x="connsiteX3" y="connsiteY3"/>
+              </a:cxn>
+              <a:cxn ang="0">
+                <a:pos x="connsiteX4" y="connsiteY4"/>
+              </a:cxn>
+              <a:cxn ang="0">
+                <a:pos x="connsiteX5" y="connsiteY5"/>
+              </a:cxn>
+              <a:cxn ang="0">
+                <a:pos x="connsiteX6" y="connsiteY6"/>
+              </a:cxn>
+              <a:cxn ang="0">
+                <a:pos x="connsiteX7" y="connsiteY7"/>
+              </a:cxn>
+              <a:cxn ang="0">
+                <a:pos x="connsiteX8" y="connsiteY8"/>
+              </a:cxn>
+              <a:cxn ang="0">
+                <a:pos x="connsiteX9" y="connsiteY9"/>
+              </a:cxn>
+            </a:cxnLst>
+            <a:rect l="l" t="t" r="r" b="b"/>
+            <a:pathLst>
+              <a:path w="8551719" h="4504639">
+                <a:moveTo>
+                  <a:pt x="0" y="1013293"/>
+                </a:moveTo>
+                <a:cubicBezTo>
+                  <a:pt x="121227" y="1533704"/>
+                  <a:pt x="242455" y="2054116"/>
+                  <a:pt x="519546" y="2436848"/>
+                </a:cubicBezTo>
+                <a:cubicBezTo>
+                  <a:pt x="796637" y="2819580"/>
+                  <a:pt x="1330037" y="3205775"/>
+                  <a:pt x="1662546" y="3309684"/>
+                </a:cubicBezTo>
+                <a:cubicBezTo>
+                  <a:pt x="1995055" y="3413593"/>
+                  <a:pt x="2303318" y="3070694"/>
+                  <a:pt x="2514600" y="3060303"/>
+                </a:cubicBezTo>
+                <a:cubicBezTo>
+                  <a:pt x="2725882" y="3049912"/>
+                  <a:pt x="2731078" y="3264657"/>
+                  <a:pt x="2930237" y="3247339"/>
+                </a:cubicBezTo>
+                <a:cubicBezTo>
+                  <a:pt x="3129396" y="3230021"/>
+                  <a:pt x="3441123" y="3160747"/>
+                  <a:pt x="3709555" y="2956393"/>
+                </a:cubicBezTo>
+                <a:cubicBezTo>
+                  <a:pt x="3977987" y="2752039"/>
+                  <a:pt x="4236028" y="2511316"/>
+                  <a:pt x="4540828" y="2021212"/>
+                </a:cubicBezTo>
+                <a:cubicBezTo>
+                  <a:pt x="4845628" y="1531108"/>
+                  <a:pt x="5223164" y="-181661"/>
+                  <a:pt x="5538355" y="15766"/>
+                </a:cubicBezTo>
+                <a:cubicBezTo>
+                  <a:pt x="5853546" y="213193"/>
+                  <a:pt x="5929746" y="2457630"/>
+                  <a:pt x="6431973" y="3205775"/>
+                </a:cubicBezTo>
+                <a:cubicBezTo>
+                  <a:pt x="6934200" y="3953921"/>
+                  <a:pt x="7742959" y="4229280"/>
+                  <a:pt x="8551719" y="4504639"/>
+                </a:cubicBezTo>
+              </a:path>
+            </a:pathLst>
+          </a:custGeom>
+          <a:ln w="57150"/>
+        </p:spPr>
+        <p:style>
+          <a:lnRef idx="1">
+            <a:schemeClr val="dk1"/>
+          </a:lnRef>
+          <a:fillRef idx="0">
+            <a:schemeClr val="dk1"/>
+          </a:fillRef>
+          <a:effectRef idx="0">
+            <a:schemeClr val="dk1"/>
+          </a:effectRef>
+          <a:fontRef idx="minor">
+            <a:schemeClr val="tx1"/>
+          </a:fontRef>
+        </p:style>
+        <p:txBody>
+          <a:bodyPr rtlCol="1" anchor="ctr"/>
+          <a:lstStyle/>
+          <a:p>
+            <a:pPr algn="ctr"/>
+            <a:endParaRPr lang="he-IL"/>
+          </a:p>
+        </p:txBody>
+      </p:sp>
+      <p:sp>
+        <p:nvSpPr>
+          <p:cNvPr id="10" name="TextBox 9"/>
+          <p:cNvSpPr txBox="1"/>
+          <p:nvPr/>
+        </p:nvSpPr>
+        <p:spPr>
+          <a:xfrm>
+            <a:off x="0" y="3449781"/>
+            <a:ext cx="1558636" cy="646331"/>
+          </a:xfrm>
+          <a:prstGeom prst="rect">
+            <a:avLst/>
+          </a:prstGeom>
+          <a:noFill/>
+        </p:spPr>
+        <p:txBody>
+          <a:bodyPr wrap="square" rtlCol="1">
+            <a:spAutoFit/>
+          </a:bodyPr>
+          <a:lstStyle/>
+          <a:p>
+            <a:r>
+              <a:rPr lang="en-US" sz="3600" dirty="0" smtClean="0"/>
+              <a:t>Prob.</a:t>
+            </a:r>
+            <a:endParaRPr lang="he-IL" sz="3600" dirty="0"/>
+          </a:p>
+        </p:txBody>
+      </p:sp>
+      <p:sp>
+        <p:nvSpPr>
+          <p:cNvPr id="11" name="TextBox 10"/>
+          <p:cNvSpPr txBox="1"/>
+          <p:nvPr/>
+        </p:nvSpPr>
+        <p:spPr>
+          <a:xfrm>
+            <a:off x="2826327" y="6211669"/>
+            <a:ext cx="3927764" cy="646331"/>
+          </a:xfrm>
+          <a:prstGeom prst="rect">
+            <a:avLst/>
+          </a:prstGeom>
+          <a:noFill/>
+        </p:spPr>
+        <p:txBody>
+          <a:bodyPr wrap="square" rtlCol="1">
+            <a:spAutoFit/>
+          </a:bodyPr>
+          <a:lstStyle/>
+          <a:p>
+            <a:r>
+              <a:rPr lang="en-US" sz="3600" dirty="0" smtClean="0"/>
+              <a:t>Distance [beads]</a:t>
+            </a:r>
+            <a:endParaRPr lang="he-IL" sz="3600" dirty="0"/>
+          </a:p>
+        </p:txBody>
+      </p:sp>
+      <p:cxnSp>
+        <p:nvCxnSpPr>
+          <p:cNvPr id="13" name="Straight Connector 12"/>
+          <p:cNvCxnSpPr>
+            <a:stCxn id="9" idx="7"/>
+          </p:cNvCxnSpPr>
+          <p:nvPr/>
+        </p:nvCxnSpPr>
+        <p:spPr>
+          <a:xfrm flipH="1" flipV="1">
+            <a:off x="1132609" y="1220752"/>
+            <a:ext cx="5621482" cy="15766"/>
+          </a:xfrm>
+          <a:prstGeom prst="line">
+            <a:avLst/>
+          </a:prstGeom>
+          <a:ln w="57150">
+            <a:prstDash val="lgDash"/>
+          </a:ln>
+        </p:spPr>
+        <p:style>
+          <a:lnRef idx="1">
+            <a:schemeClr val="accent6"/>
+          </a:lnRef>
+          <a:fillRef idx="0">
+            <a:schemeClr val="accent6"/>
+          </a:fillRef>
+          <a:effectRef idx="0">
+            <a:schemeClr val="accent6"/>
+          </a:effectRef>
+          <a:fontRef idx="minor">
+            <a:schemeClr val="tx1"/>
+          </a:fontRef>
+        </p:style>
+      </p:cxnSp>
+      <p:cxnSp>
+        <p:nvCxnSpPr>
+          <p:cNvPr id="15" name="Straight Connector 14"/>
+          <p:cNvCxnSpPr/>
+          <p:nvPr/>
+        </p:nvCxnSpPr>
+        <p:spPr>
+          <a:xfrm>
+            <a:off x="1293668" y="2389909"/>
+            <a:ext cx="25977" cy="3543300"/>
+          </a:xfrm>
+          <a:prstGeom prst="line">
+            <a:avLst/>
+          </a:prstGeom>
+          <a:ln w="38100">
+            <a:solidFill>
+              <a:schemeClr val="accent2">
+                <a:lumMod val="75000"/>
+              </a:schemeClr>
+            </a:solidFill>
+            <a:prstDash val="lgDash"/>
+          </a:ln>
+        </p:spPr>
+        <p:style>
+          <a:lnRef idx="1">
+            <a:schemeClr val="accent1"/>
+          </a:lnRef>
+          <a:fillRef idx="0">
+            <a:schemeClr val="accent1"/>
+          </a:fillRef>
+          <a:effectRef idx="0">
+            <a:schemeClr val="accent1"/>
+          </a:effectRef>
+          <a:fontRef idx="minor">
+            <a:schemeClr val="tx1"/>
+          </a:fontRef>
+        </p:style>
+      </p:cxnSp>
+      <p:sp>
+        <p:nvSpPr>
+          <p:cNvPr id="17" name="TextBox 16"/>
+          <p:cNvSpPr txBox="1"/>
+          <p:nvPr/>
+        </p:nvSpPr>
+        <p:spPr>
+          <a:xfrm>
+            <a:off x="1132609" y="6009699"/>
+            <a:ext cx="498764" cy="584775"/>
+          </a:xfrm>
+          <a:prstGeom prst="rect">
+            <a:avLst/>
+          </a:prstGeom>
+          <a:noFill/>
+        </p:spPr>
+        <p:txBody>
+          <a:bodyPr wrap="square" rtlCol="1">
+            <a:spAutoFit/>
+          </a:bodyPr>
+          <a:lstStyle/>
+          <a:p>
+            <a:r>
+              <a:rPr lang="en-US" sz="3200" dirty="0" smtClean="0"/>
+              <a:t>1</a:t>
+            </a:r>
+            <a:endParaRPr lang="he-IL" sz="3200" dirty="0"/>
+          </a:p>
+        </p:txBody>
+      </p:sp>
+      <p:sp>
+        <p:nvSpPr>
+          <p:cNvPr id="18" name="TextBox 17"/>
+          <p:cNvSpPr txBox="1"/>
+          <p:nvPr/>
+        </p:nvSpPr>
+        <p:spPr>
+          <a:xfrm>
+            <a:off x="213015" y="2014393"/>
+            <a:ext cx="987136" cy="584775"/>
+          </a:xfrm>
+          <a:prstGeom prst="rect">
+            <a:avLst/>
+          </a:prstGeom>
+          <a:noFill/>
+        </p:spPr>
+        <p:txBody>
+          <a:bodyPr wrap="square" rtlCol="1">
+            <a:spAutoFit/>
+          </a:bodyPr>
+          <a:lstStyle/>
+          <a:p>
+            <a:r>
+              <a:rPr lang="en-US" sz="3200" dirty="0" smtClean="0">
+                <a:solidFill>
+                  <a:schemeClr val="accent2">
+                    <a:lumMod val="75000"/>
+                  </a:schemeClr>
+                </a:solidFill>
+              </a:rPr>
+              <a:t>P(1)</a:t>
+            </a:r>
+            <a:endParaRPr lang="he-IL" sz="3200" dirty="0">
+              <a:solidFill>
+                <a:schemeClr val="accent2">
+                  <a:lumMod val="75000"/>
+                </a:schemeClr>
+              </a:solidFill>
+            </a:endParaRPr>
+          </a:p>
+        </p:txBody>
+      </p:sp>
+      <p:sp>
+        <p:nvSpPr>
+          <p:cNvPr id="20" name="TextBox 19"/>
+          <p:cNvSpPr txBox="1"/>
+          <p:nvPr/>
+        </p:nvSpPr>
+        <p:spPr>
+          <a:xfrm>
+            <a:off x="197430" y="979114"/>
+            <a:ext cx="971547" cy="584775"/>
+          </a:xfrm>
+          <a:prstGeom prst="rect">
+            <a:avLst/>
+          </a:prstGeom>
+          <a:noFill/>
+        </p:spPr>
+        <p:txBody>
+          <a:bodyPr wrap="square" rtlCol="1">
+            <a:spAutoFit/>
+          </a:bodyPr>
+          <a:lstStyle/>
+          <a:p>
+            <a:r>
+              <a:rPr lang="en-US" sz="3200" dirty="0" smtClean="0">
+                <a:solidFill>
+                  <a:schemeClr val="accent6"/>
+                </a:solidFill>
+              </a:rPr>
+              <a:t>P(n)</a:t>
+            </a:r>
+            <a:endParaRPr lang="he-IL" sz="3200" dirty="0">
+              <a:solidFill>
+                <a:schemeClr val="accent6"/>
+              </a:solidFill>
+            </a:endParaRPr>
+          </a:p>
+        </p:txBody>
+      </p:sp>
+      <p:sp>
+        <p:nvSpPr>
+          <p:cNvPr id="21" name="TextBox 20"/>
+          <p:cNvSpPr txBox="1"/>
+          <p:nvPr/>
+        </p:nvSpPr>
+        <p:spPr>
+          <a:xfrm>
+            <a:off x="6619009" y="6141027"/>
+            <a:ext cx="457200" cy="584775"/>
+          </a:xfrm>
+          <a:prstGeom prst="rect">
+            <a:avLst/>
+          </a:prstGeom>
+          <a:noFill/>
+        </p:spPr>
+        <p:txBody>
+          <a:bodyPr wrap="square" rtlCol="1">
+            <a:spAutoFit/>
+          </a:bodyPr>
+          <a:lstStyle/>
+          <a:p>
+            <a:r>
+              <a:rPr lang="en-US" sz="3200" dirty="0" smtClean="0"/>
+              <a:t>n</a:t>
+            </a:r>
+            <a:endParaRPr lang="he-IL" sz="3200" dirty="0"/>
+          </a:p>
+        </p:txBody>
+      </p:sp>
+      <p:cxnSp>
+        <p:nvCxnSpPr>
+          <p:cNvPr id="22" name="Straight Connector 21"/>
+          <p:cNvCxnSpPr>
+            <a:stCxn id="9" idx="7"/>
+          </p:cNvCxnSpPr>
+          <p:nvPr/>
+        </p:nvCxnSpPr>
+        <p:spPr>
+          <a:xfrm>
+            <a:off x="6754091" y="1236518"/>
+            <a:ext cx="0" cy="4696691"/>
+          </a:xfrm>
+          <a:prstGeom prst="line">
+            <a:avLst/>
+          </a:prstGeom>
+          <a:ln w="57150">
+            <a:prstDash val="lgDash"/>
+          </a:ln>
+        </p:spPr>
+        <p:style>
+          <a:lnRef idx="1">
+            <a:schemeClr val="accent6"/>
+          </a:lnRef>
+          <a:fillRef idx="0">
+            <a:schemeClr val="accent6"/>
+          </a:fillRef>
+          <a:effectRef idx="0">
+            <a:schemeClr val="accent6"/>
+          </a:effectRef>
+          <a:fontRef idx="minor">
+            <a:schemeClr val="tx1"/>
+          </a:fontRef>
+        </p:style>
+      </p:cxnSp>
+      <p:cxnSp>
+        <p:nvCxnSpPr>
+          <p:cNvPr id="25" name="Straight Connector 24"/>
+          <p:cNvCxnSpPr/>
+          <p:nvPr/>
+        </p:nvCxnSpPr>
+        <p:spPr>
+          <a:xfrm flipH="1">
+            <a:off x="1070262" y="2389909"/>
+            <a:ext cx="223406" cy="0"/>
+          </a:xfrm>
+          <a:prstGeom prst="line">
+            <a:avLst/>
+          </a:prstGeom>
+          <a:ln w="38100">
+            <a:solidFill>
+              <a:schemeClr val="accent2">
+                <a:lumMod val="75000"/>
+              </a:schemeClr>
+            </a:solidFill>
+            <a:prstDash val="lgDash"/>
+          </a:ln>
+        </p:spPr>
+        <p:style>
+          <a:lnRef idx="1">
+            <a:schemeClr val="accent1"/>
+          </a:lnRef>
+          <a:fillRef idx="0">
+            <a:schemeClr val="accent1"/>
+          </a:fillRef>
+          <a:effectRef idx="0">
+            <a:schemeClr val="accent1"/>
+          </a:effectRef>
+          <a:fontRef idx="minor">
+            <a:schemeClr val="tx1"/>
+          </a:fontRef>
+        </p:style>
+      </p:cxnSp>
+    </p:spTree>
+    <p:extLst>
+      <p:ext uri="{BB962C8B-B14F-4D97-AF65-F5344CB8AC3E}">
+        <p14:creationId xmlns:p14="http://schemas.microsoft.com/office/powerpoint/2010/main" val="340101426"/>
       </p:ext>
     </p:extLst>
   </p:cSld>

</xml_diff>

<commit_message>
added figures for the lab meeting, fixed presentation, changed the encounter probabilities to give nan at places where before were zeros
</commit_message>
<xml_diff>
--- a/Documents/(article) Random Loop Model to Explain the TAD in CC Experiments/polymerModelWithOneAndTwoFixedLoopsAndInternalConnections.pptx
+++ b/Documents/(article) Random Loop Model to Explain the TAD in CC Experiments/polymerModelWithOneAndTwoFixedLoopsAndInternalConnections.pptx
@@ -256,7 +256,7 @@
           <a:p>
             <a:fld id="{11E755D3-E711-4D0A-850C-1C48A3BA9F8A}" type="datetimeFigureOut">
               <a:rPr lang="en-US" smtClean="0"/>
-              <a:t>3/11/2015</a:t>
+              <a:t>3/23/2015</a:t>
             </a:fld>
             <a:endParaRPr lang="en-US"/>
           </a:p>
@@ -426,7 +426,7 @@
           <a:p>
             <a:fld id="{11E755D3-E711-4D0A-850C-1C48A3BA9F8A}" type="datetimeFigureOut">
               <a:rPr lang="en-US" smtClean="0"/>
-              <a:t>3/11/2015</a:t>
+              <a:t>3/23/2015</a:t>
             </a:fld>
             <a:endParaRPr lang="en-US"/>
           </a:p>
@@ -606,7 +606,7 @@
           <a:p>
             <a:fld id="{11E755D3-E711-4D0A-850C-1C48A3BA9F8A}" type="datetimeFigureOut">
               <a:rPr lang="en-US" smtClean="0"/>
-              <a:t>3/11/2015</a:t>
+              <a:t>3/23/2015</a:t>
             </a:fld>
             <a:endParaRPr lang="en-US"/>
           </a:p>
@@ -776,7 +776,7 @@
           <a:p>
             <a:fld id="{11E755D3-E711-4D0A-850C-1C48A3BA9F8A}" type="datetimeFigureOut">
               <a:rPr lang="en-US" smtClean="0"/>
-              <a:t>3/11/2015</a:t>
+              <a:t>3/23/2015</a:t>
             </a:fld>
             <a:endParaRPr lang="en-US"/>
           </a:p>
@@ -1022,7 +1022,7 @@
           <a:p>
             <a:fld id="{11E755D3-E711-4D0A-850C-1C48A3BA9F8A}" type="datetimeFigureOut">
               <a:rPr lang="en-US" smtClean="0"/>
-              <a:t>3/11/2015</a:t>
+              <a:t>3/23/2015</a:t>
             </a:fld>
             <a:endParaRPr lang="en-US"/>
           </a:p>
@@ -1254,7 +1254,7 @@
           <a:p>
             <a:fld id="{11E755D3-E711-4D0A-850C-1C48A3BA9F8A}" type="datetimeFigureOut">
               <a:rPr lang="en-US" smtClean="0"/>
-              <a:t>3/11/2015</a:t>
+              <a:t>3/23/2015</a:t>
             </a:fld>
             <a:endParaRPr lang="en-US"/>
           </a:p>
@@ -1621,7 +1621,7 @@
           <a:p>
             <a:fld id="{11E755D3-E711-4D0A-850C-1C48A3BA9F8A}" type="datetimeFigureOut">
               <a:rPr lang="en-US" smtClean="0"/>
-              <a:t>3/11/2015</a:t>
+              <a:t>3/23/2015</a:t>
             </a:fld>
             <a:endParaRPr lang="en-US"/>
           </a:p>
@@ -1739,7 +1739,7 @@
           <a:p>
             <a:fld id="{11E755D3-E711-4D0A-850C-1C48A3BA9F8A}" type="datetimeFigureOut">
               <a:rPr lang="en-US" smtClean="0"/>
-              <a:t>3/11/2015</a:t>
+              <a:t>3/23/2015</a:t>
             </a:fld>
             <a:endParaRPr lang="en-US"/>
           </a:p>
@@ -1834,7 +1834,7 @@
           <a:p>
             <a:fld id="{11E755D3-E711-4D0A-850C-1C48A3BA9F8A}" type="datetimeFigureOut">
               <a:rPr lang="en-US" smtClean="0"/>
-              <a:t>3/11/2015</a:t>
+              <a:t>3/23/2015</a:t>
             </a:fld>
             <a:endParaRPr lang="en-US"/>
           </a:p>
@@ -2111,7 +2111,7 @@
           <a:p>
             <a:fld id="{11E755D3-E711-4D0A-850C-1C48A3BA9F8A}" type="datetimeFigureOut">
               <a:rPr lang="en-US" smtClean="0"/>
-              <a:t>3/11/2015</a:t>
+              <a:t>3/23/2015</a:t>
             </a:fld>
             <a:endParaRPr lang="en-US"/>
           </a:p>
@@ -2364,7 +2364,7 @@
           <a:p>
             <a:fld id="{11E755D3-E711-4D0A-850C-1C48A3BA9F8A}" type="datetimeFigureOut">
               <a:rPr lang="en-US" smtClean="0"/>
-              <a:t>3/11/2015</a:t>
+              <a:t>3/23/2015</a:t>
             </a:fld>
             <a:endParaRPr lang="en-US"/>
           </a:p>
@@ -2577,7 +2577,7 @@
           <a:p>
             <a:fld id="{11E755D3-E711-4D0A-850C-1C48A3BA9F8A}" type="datetimeFigureOut">
               <a:rPr lang="en-US" smtClean="0"/>
-              <a:t>3/11/2015</a:t>
+              <a:t>3/23/2015</a:t>
             </a:fld>
             <a:endParaRPr lang="en-US"/>
           </a:p>
@@ -9487,36 +9487,89 @@
               </a:p>
             </p:txBody>
           </p:sp>
-          <p:sp>
-            <p:nvSpPr>
-              <p:cNvPr id="26" name="TextBox 25"/>
-              <p:cNvSpPr txBox="1"/>
-              <p:nvPr/>
-            </p:nvSpPr>
-            <p:spPr>
-              <a:xfrm>
-                <a:off x="8695265" y="4229072"/>
-                <a:ext cx="606780" cy="923329"/>
-              </a:xfrm>
-              <a:prstGeom prst="rect">
-                <a:avLst/>
-              </a:prstGeom>
-              <a:noFill/>
-            </p:spPr>
-            <p:txBody>
-              <a:bodyPr wrap="square" rtlCol="0">
-                <a:spAutoFit/>
-              </a:bodyPr>
-              <a:lstStyle/>
-              <a:p>
-                <a:r>
-                  <a:rPr lang="en-US" sz="5400" dirty="0" smtClean="0"/>
-                  <a:t>n</a:t>
-                </a:r>
-                <a:endParaRPr lang="en-US" sz="5400" dirty="0"/>
-              </a:p>
-            </p:txBody>
-          </p:sp>
+          <mc:AlternateContent xmlns:mc="http://schemas.openxmlformats.org/markup-compatibility/2006">
+            <mc:Choice xmlns:a14="http://schemas.microsoft.com/office/drawing/2010/main" Requires="a14">
+              <p:sp>
+                <p:nvSpPr>
+                  <p:cNvPr id="26" name="TextBox 25"/>
+                  <p:cNvSpPr txBox="1"/>
+                  <p:nvPr/>
+                </p:nvSpPr>
+                <p:spPr>
+                  <a:xfrm>
+                    <a:off x="8695264" y="4229072"/>
+                    <a:ext cx="606780" cy="1024018"/>
+                  </a:xfrm>
+                  <a:prstGeom prst="rect">
+                    <a:avLst/>
+                  </a:prstGeom>
+                  <a:noFill/>
+                </p:spPr>
+                <p:txBody>
+                  <a:bodyPr wrap="square" rtlCol="0">
+                    <a:spAutoFit/>
+                  </a:bodyPr>
+                  <a:lstStyle/>
+                  <a:p>
+                    <a14:m>
+                      <m:oMathPara xmlns:m="http://schemas.openxmlformats.org/officeDocument/2006/math">
+                        <m:oMathParaPr>
+                          <m:jc m:val="centerGroup"/>
+                        </m:oMathParaPr>
+                        <m:oMath xmlns:m="http://schemas.openxmlformats.org/officeDocument/2006/math">
+                          <m:r>
+                            <a:rPr lang="en-US" sz="5400" i="1" dirty="0" smtClean="0">
+                              <a:latin typeface="Cambria Math" panose="02040503050406030204" pitchFamily="18" charset="0"/>
+                            </a:rPr>
+                            <m:t>𝑛</m:t>
+                          </m:r>
+                        </m:oMath>
+                      </m:oMathPara>
+                    </a14:m>
+                    <a:endParaRPr lang="en-US" sz="5400" dirty="0"/>
+                  </a:p>
+                </p:txBody>
+              </p:sp>
+            </mc:Choice>
+            <mc:Fallback>
+              <p:sp>
+                <p:nvSpPr>
+                  <p:cNvPr id="26" name="TextBox 25"/>
+                  <p:cNvSpPr txBox="1">
+                    <a:spLocks noRot="1" noChangeAspect="1" noMove="1" noResize="1" noEditPoints="1" noAdjustHandles="1" noChangeArrowheads="1" noChangeShapeType="1" noTextEdit="1"/>
+                  </p:cNvSpPr>
+                  <p:nvPr/>
+                </p:nvSpPr>
+                <p:spPr>
+                  <a:xfrm>
+                    <a:off x="8695264" y="4229072"/>
+                    <a:ext cx="606780" cy="1024018"/>
+                  </a:xfrm>
+                  <a:prstGeom prst="rect">
+                    <a:avLst/>
+                  </a:prstGeom>
+                  <a:blipFill rotWithShape="0">
+                    <a:blip r:embed="rId2"/>
+                    <a:stretch>
+                      <a:fillRect r="-25397"/>
+                    </a:stretch>
+                  </a:blipFill>
+                </p:spPr>
+                <p:txBody>
+                  <a:bodyPr/>
+                  <a:lstStyle/>
+                  <a:p>
+                    <a:r>
+                      <a:rPr lang="en-US">
+                        <a:noFill/>
+                      </a:rPr>
+                      <a:t> </a:t>
+                    </a:r>
+                  </a:p>
+                </p:txBody>
+              </p:sp>
+            </mc:Fallback>
+          </mc:AlternateContent>
           <p:cxnSp>
             <p:nvCxnSpPr>
               <p:cNvPr id="27" name="Straight Arrow Connector 26"/>
@@ -9558,77 +9611,145 @@
               </a:fontRef>
             </p:style>
           </p:cxnSp>
-          <p:sp>
-            <p:nvSpPr>
-              <p:cNvPr id="28" name="TextBox 27"/>
-              <p:cNvSpPr txBox="1"/>
-              <p:nvPr/>
-            </p:nvSpPr>
-            <p:spPr>
-              <a:xfrm>
-                <a:off x="6814413" y="2944450"/>
-                <a:ext cx="2321727" cy="1126420"/>
-              </a:xfrm>
-              <a:prstGeom prst="rect">
-                <a:avLst/>
-              </a:prstGeom>
-              <a:noFill/>
-            </p:spPr>
-            <p:txBody>
-              <a:bodyPr wrap="square" rtlCol="0">
-                <a:spAutoFit/>
-              </a:bodyPr>
-              <a:lstStyle/>
-              <a:p>
-                <a:r>
-                  <a:rPr lang="en-US" sz="6000" dirty="0" err="1"/>
-                  <a:t>r</a:t>
-                </a:r>
-                <a:r>
-                  <a:rPr lang="en-US" sz="3200" dirty="0" err="1" smtClean="0"/>
-                  <a:t>nN</a:t>
-                </a:r>
-                <a:r>
-                  <a:rPr lang="en-US" sz="2400" dirty="0" err="1" smtClean="0"/>
-                  <a:t>c</a:t>
-                </a:r>
-                <a:endParaRPr lang="en-US" sz="2400" dirty="0"/>
-              </a:p>
-            </p:txBody>
-          </p:sp>
-          <p:cxnSp>
-            <p:nvCxnSpPr>
-              <p:cNvPr id="29" name="Straight Arrow Connector 28"/>
-              <p:cNvCxnSpPr/>
-              <p:nvPr/>
-            </p:nvCxnSpPr>
-            <p:spPr>
-              <a:xfrm>
-                <a:off x="7033769" y="3206854"/>
-                <a:ext cx="324956" cy="0"/>
-              </a:xfrm>
-              <a:prstGeom prst="straightConnector1">
-                <a:avLst/>
-              </a:prstGeom>
-              <a:ln w="31750">
-                <a:tailEnd type="triangle"/>
-              </a:ln>
-            </p:spPr>
-            <p:style>
-              <a:lnRef idx="1">
-                <a:schemeClr val="accent1"/>
-              </a:lnRef>
-              <a:fillRef idx="0">
-                <a:schemeClr val="accent1"/>
-              </a:fillRef>
-              <a:effectRef idx="0">
-                <a:schemeClr val="accent1"/>
-              </a:effectRef>
-              <a:fontRef idx="minor">
-                <a:schemeClr val="tx1"/>
-              </a:fontRef>
-            </p:style>
-          </p:cxnSp>
+          <mc:AlternateContent xmlns:mc="http://schemas.openxmlformats.org/markup-compatibility/2006">
+            <mc:Choice xmlns:a14="http://schemas.microsoft.com/office/drawing/2010/main" Requires="a14">
+              <p:sp>
+                <p:nvSpPr>
+                  <p:cNvPr id="28" name="TextBox 27"/>
+                  <p:cNvSpPr txBox="1"/>
+                  <p:nvPr/>
+                </p:nvSpPr>
+                <p:spPr>
+                  <a:xfrm>
+                    <a:off x="6821560" y="2767658"/>
+                    <a:ext cx="2321727" cy="1219790"/>
+                  </a:xfrm>
+                  <a:prstGeom prst="rect">
+                    <a:avLst/>
+                  </a:prstGeom>
+                  <a:noFill/>
+                </p:spPr>
+                <p:txBody>
+                  <a:bodyPr wrap="square" rtlCol="0">
+                    <a:spAutoFit/>
+                  </a:bodyPr>
+                  <a:lstStyle/>
+                  <a:p>
+                    <a14:m>
+                      <m:oMathPara xmlns:m="http://schemas.openxmlformats.org/officeDocument/2006/math">
+                        <m:oMathParaPr>
+                          <m:jc m:val="centerGroup"/>
+                        </m:oMathParaPr>
+                        <m:oMath xmlns:m="http://schemas.openxmlformats.org/officeDocument/2006/math">
+                          <m:sSub>
+                            <m:sSubPr>
+                              <m:ctrlPr>
+                                <a:rPr lang="en-US" sz="6000" b="0" i="1" smtClean="0">
+                                  <a:latin typeface="Cambria Math" panose="02040503050406030204" pitchFamily="18" charset="0"/>
+                                </a:rPr>
+                              </m:ctrlPr>
+                            </m:sSubPr>
+                            <m:e>
+                              <m:acc>
+                                <m:accPr>
+                                  <m:chr m:val="⃗"/>
+                                  <m:ctrlPr>
+                                    <a:rPr lang="en-US" sz="6000" i="1" smtClean="0">
+                                      <a:latin typeface="Cambria Math" panose="02040503050406030204" pitchFamily="18" charset="0"/>
+                                    </a:rPr>
+                                  </m:ctrlPr>
+                                </m:accPr>
+                                <m:e>
+                                  <m:r>
+                                    <a:rPr lang="en-US" sz="6000" b="0" i="1" smtClean="0">
+                                      <a:latin typeface="Cambria Math" panose="02040503050406030204" pitchFamily="18" charset="0"/>
+                                    </a:rPr>
+                                    <m:t>𝑟</m:t>
+                                  </m:r>
+                                </m:e>
+                              </m:acc>
+                            </m:e>
+                            <m:sub>
+                              <m:r>
+                                <a:rPr lang="en-US" sz="6000" b="0" i="1" smtClean="0">
+                                  <a:latin typeface="Cambria Math" panose="02040503050406030204" pitchFamily="18" charset="0"/>
+                                </a:rPr>
+                                <m:t>𝑛</m:t>
+                              </m:r>
+                              <m:sSub>
+                                <m:sSubPr>
+                                  <m:ctrlPr>
+                                    <a:rPr lang="en-US" sz="6000" b="0" i="1" smtClean="0">
+                                      <a:latin typeface="Cambria Math" panose="02040503050406030204" pitchFamily="18" charset="0"/>
+                                    </a:rPr>
+                                  </m:ctrlPr>
+                                </m:sSubPr>
+                                <m:e>
+                                  <m:r>
+                                    <a:rPr lang="en-US" sz="6000" b="0" i="1" smtClean="0">
+                                      <a:latin typeface="Cambria Math" panose="02040503050406030204" pitchFamily="18" charset="0"/>
+                                    </a:rPr>
+                                    <m:t>𝑁</m:t>
+                                  </m:r>
+                                </m:e>
+                                <m:sub>
+                                  <m:r>
+                                    <a:rPr lang="en-US" sz="6000" b="0" i="1" smtClean="0">
+                                      <a:latin typeface="Cambria Math" panose="02040503050406030204" pitchFamily="18" charset="0"/>
+                                    </a:rPr>
+                                    <m:t>𝑐</m:t>
+                                  </m:r>
+                                </m:sub>
+                              </m:sSub>
+                            </m:sub>
+                          </m:sSub>
+                        </m:oMath>
+                      </m:oMathPara>
+                    </a14:m>
+                    <a:endParaRPr lang="en-US" sz="2400" dirty="0"/>
+                  </a:p>
+                </p:txBody>
+              </p:sp>
+            </mc:Choice>
+            <mc:Fallback>
+              <p:sp>
+                <p:nvSpPr>
+                  <p:cNvPr id="28" name="TextBox 27"/>
+                  <p:cNvSpPr txBox="1">
+                    <a:spLocks noRot="1" noChangeAspect="1" noMove="1" noResize="1" noEditPoints="1" noAdjustHandles="1" noChangeArrowheads="1" noChangeShapeType="1" noTextEdit="1"/>
+                  </p:cNvSpPr>
+                  <p:nvPr/>
+                </p:nvSpPr>
+                <p:spPr>
+                  <a:xfrm>
+                    <a:off x="6821560" y="2767658"/>
+                    <a:ext cx="2321727" cy="1219790"/>
+                  </a:xfrm>
+                  <a:prstGeom prst="rect">
+                    <a:avLst/>
+                  </a:prstGeom>
+                  <a:blipFill rotWithShape="0">
+                    <a:blip r:embed="rId3"/>
+                    <a:stretch>
+                      <a:fillRect/>
+                    </a:stretch>
+                  </a:blipFill>
+                </p:spPr>
+                <p:txBody>
+                  <a:bodyPr/>
+                  <a:lstStyle/>
+                  <a:p>
+                    <a:r>
+                      <a:rPr lang="en-US">
+                        <a:noFill/>
+                      </a:rPr>
+                      <a:t> </a:t>
+                    </a:r>
+                  </a:p>
+                </p:txBody>
+              </p:sp>
+            </mc:Fallback>
+          </mc:AlternateContent>
         </p:grpSp>
         <p:grpSp>
           <p:nvGrpSpPr>
@@ -10939,78 +11060,228 @@
               </a:fontRef>
             </p:style>
           </p:cxnSp>
-          <p:sp>
-            <p:nvSpPr>
-              <p:cNvPr id="56" name="TextBox 55"/>
-              <p:cNvSpPr txBox="1"/>
-              <p:nvPr/>
-            </p:nvSpPr>
-            <p:spPr>
-              <a:xfrm>
-                <a:off x="5700800" y="2544807"/>
-                <a:ext cx="2387602" cy="1313564"/>
-              </a:xfrm>
-              <a:prstGeom prst="rect">
-                <a:avLst/>
-              </a:prstGeom>
-              <a:noFill/>
-            </p:spPr>
-            <p:txBody>
-              <a:bodyPr wrap="square" rtlCol="0">
-                <a:spAutoFit/>
-              </a:bodyPr>
-              <a:lstStyle/>
-              <a:p>
-                <a:r>
-                  <a:rPr lang="en-US" sz="7200" dirty="0" err="1" smtClean="0"/>
-                  <a:t>r</a:t>
-                </a:r>
-                <a:r>
-                  <a:rPr lang="en-US" sz="4400" dirty="0" err="1" smtClean="0"/>
-                  <a:t>N</a:t>
-                </a:r>
-                <a:r>
-                  <a:rPr lang="en-US" sz="2800" dirty="0" err="1" smtClean="0"/>
-                  <a:t>c</a:t>
-                </a:r>
-                <a:r>
-                  <a:rPr lang="en-US" sz="3600" dirty="0" err="1" smtClean="0"/>
-                  <a:t>m</a:t>
-                </a:r>
-                <a:endParaRPr lang="en-US" sz="3600" dirty="0"/>
-              </a:p>
-            </p:txBody>
-          </p:sp>
-          <p:sp>
-            <p:nvSpPr>
-              <p:cNvPr id="57" name="TextBox 56"/>
-              <p:cNvSpPr txBox="1"/>
-              <p:nvPr/>
-            </p:nvSpPr>
-            <p:spPr>
-              <a:xfrm>
-                <a:off x="3261502" y="3928515"/>
-                <a:ext cx="447121" cy="830998"/>
-              </a:xfrm>
-              <a:prstGeom prst="rect">
-                <a:avLst/>
-              </a:prstGeom>
-              <a:noFill/>
-            </p:spPr>
-            <p:txBody>
-              <a:bodyPr wrap="square" rtlCol="0">
-                <a:spAutoFit/>
-              </a:bodyPr>
-              <a:lstStyle/>
-              <a:p>
-                <a:r>
-                  <a:rPr lang="en-US" sz="4800" dirty="0" smtClean="0"/>
-                  <a:t>m</a:t>
-                </a:r>
-                <a:endParaRPr lang="en-US" sz="4800" dirty="0"/>
-              </a:p>
-            </p:txBody>
-          </p:sp>
+          <mc:AlternateContent xmlns:mc="http://schemas.openxmlformats.org/markup-compatibility/2006">
+            <mc:Choice xmlns:a14="http://schemas.microsoft.com/office/drawing/2010/main" Requires="a14">
+              <p:sp>
+                <p:nvSpPr>
+                  <p:cNvPr id="56" name="TextBox 55"/>
+                  <p:cNvSpPr txBox="1"/>
+                  <p:nvPr/>
+                </p:nvSpPr>
+                <p:spPr>
+                  <a:xfrm>
+                    <a:off x="5349401" y="2332136"/>
+                    <a:ext cx="2387602" cy="1424150"/>
+                  </a:xfrm>
+                  <a:prstGeom prst="rect">
+                    <a:avLst/>
+                  </a:prstGeom>
+                  <a:noFill/>
+                </p:spPr>
+                <p:txBody>
+                  <a:bodyPr wrap="square" rtlCol="0">
+                    <a:spAutoFit/>
+                  </a:bodyPr>
+                  <a:lstStyle/>
+                  <a:p>
+                    <a14:m>
+                      <m:oMathPara xmlns:m="http://schemas.openxmlformats.org/officeDocument/2006/math">
+                        <m:oMathParaPr>
+                          <m:jc m:val="centerGroup"/>
+                        </m:oMathParaPr>
+                        <m:oMath xmlns:m="http://schemas.openxmlformats.org/officeDocument/2006/math">
+                          <m:sSub>
+                            <m:sSubPr>
+                              <m:ctrlPr>
+                                <a:rPr lang="en-US" sz="7200" b="0" i="1" smtClean="0">
+                                  <a:latin typeface="Cambria Math" panose="02040503050406030204" pitchFamily="18" charset="0"/>
+                                </a:rPr>
+                              </m:ctrlPr>
+                            </m:sSubPr>
+                            <m:e>
+                              <m:acc>
+                                <m:accPr>
+                                  <m:chr m:val="⃗"/>
+                                  <m:ctrlPr>
+                                    <a:rPr lang="en-US" sz="7200" i="1" smtClean="0">
+                                      <a:latin typeface="Cambria Math" panose="02040503050406030204" pitchFamily="18" charset="0"/>
+                                    </a:rPr>
+                                  </m:ctrlPr>
+                                </m:accPr>
+                                <m:e>
+                                  <m:r>
+                                    <a:rPr lang="en-US" sz="7200" b="0" i="1" smtClean="0">
+                                      <a:latin typeface="Cambria Math" panose="02040503050406030204" pitchFamily="18" charset="0"/>
+                                    </a:rPr>
+                                    <m:t>𝑟</m:t>
+                                  </m:r>
+                                </m:e>
+                              </m:acc>
+                            </m:e>
+                            <m:sub>
+                              <m:sSub>
+                                <m:sSubPr>
+                                  <m:ctrlPr>
+                                    <a:rPr lang="en-US" sz="7200" b="0" i="1" smtClean="0">
+                                      <a:latin typeface="Cambria Math" panose="02040503050406030204" pitchFamily="18" charset="0"/>
+                                    </a:rPr>
+                                  </m:ctrlPr>
+                                </m:sSubPr>
+                                <m:e>
+                                  <m:r>
+                                    <a:rPr lang="en-US" sz="7200" b="0" i="1" smtClean="0">
+                                      <a:latin typeface="Cambria Math" panose="02040503050406030204" pitchFamily="18" charset="0"/>
+                                    </a:rPr>
+                                    <m:t>𝑁</m:t>
+                                  </m:r>
+                                </m:e>
+                                <m:sub>
+                                  <m:r>
+                                    <a:rPr lang="en-US" sz="7200" b="0" i="1" smtClean="0">
+                                      <a:latin typeface="Cambria Math" panose="02040503050406030204" pitchFamily="18" charset="0"/>
+                                    </a:rPr>
+                                    <m:t>𝑐</m:t>
+                                  </m:r>
+                                </m:sub>
+                              </m:sSub>
+                              <m:r>
+                                <a:rPr lang="en-US" sz="7200" b="0" i="1" smtClean="0">
+                                  <a:latin typeface="Cambria Math" panose="02040503050406030204" pitchFamily="18" charset="0"/>
+                                </a:rPr>
+                                <m:t>𝑚</m:t>
+                              </m:r>
+                            </m:sub>
+                          </m:sSub>
+                        </m:oMath>
+                      </m:oMathPara>
+                    </a14:m>
+                    <a:endParaRPr lang="en-US" sz="3600" dirty="0"/>
+                  </a:p>
+                </p:txBody>
+              </p:sp>
+            </mc:Choice>
+            <mc:Fallback>
+              <p:sp>
+                <p:nvSpPr>
+                  <p:cNvPr id="56" name="TextBox 55"/>
+                  <p:cNvSpPr txBox="1">
+                    <a:spLocks noRot="1" noChangeAspect="1" noMove="1" noResize="1" noEditPoints="1" noAdjustHandles="1" noChangeArrowheads="1" noChangeShapeType="1" noTextEdit="1"/>
+                  </p:cNvSpPr>
+                  <p:nvPr/>
+                </p:nvSpPr>
+                <p:spPr>
+                  <a:xfrm>
+                    <a:off x="5349401" y="2332136"/>
+                    <a:ext cx="2387602" cy="1424150"/>
+                  </a:xfrm>
+                  <a:prstGeom prst="rect">
+                    <a:avLst/>
+                  </a:prstGeom>
+                  <a:blipFill rotWithShape="0">
+                    <a:blip r:embed="rId4"/>
+                    <a:stretch>
+                      <a:fillRect/>
+                    </a:stretch>
+                  </a:blipFill>
+                </p:spPr>
+                <p:txBody>
+                  <a:bodyPr/>
+                  <a:lstStyle/>
+                  <a:p>
+                    <a:r>
+                      <a:rPr lang="en-US">
+                        <a:noFill/>
+                      </a:rPr>
+                      <a:t> </a:t>
+                    </a:r>
+                  </a:p>
+                </p:txBody>
+              </p:sp>
+            </mc:Fallback>
+          </mc:AlternateContent>
+          <mc:AlternateContent xmlns:mc="http://schemas.openxmlformats.org/markup-compatibility/2006">
+            <mc:Choice xmlns:a14="http://schemas.microsoft.com/office/drawing/2010/main" Requires="a14">
+              <p:sp>
+                <p:nvSpPr>
+                  <p:cNvPr id="57" name="TextBox 56"/>
+                  <p:cNvSpPr txBox="1"/>
+                  <p:nvPr/>
+                </p:nvSpPr>
+                <p:spPr>
+                  <a:xfrm>
+                    <a:off x="3261502" y="3928515"/>
+                    <a:ext cx="447121" cy="909390"/>
+                  </a:xfrm>
+                  <a:prstGeom prst="rect">
+                    <a:avLst/>
+                  </a:prstGeom>
+                  <a:noFill/>
+                </p:spPr>
+                <p:txBody>
+                  <a:bodyPr wrap="square" rtlCol="0">
+                    <a:spAutoFit/>
+                  </a:bodyPr>
+                  <a:lstStyle/>
+                  <a:p>
+                    <a14:m>
+                      <m:oMathPara xmlns:m="http://schemas.openxmlformats.org/officeDocument/2006/math">
+                        <m:oMathParaPr>
+                          <m:jc m:val="centerGroup"/>
+                        </m:oMathParaPr>
+                        <m:oMath xmlns:m="http://schemas.openxmlformats.org/officeDocument/2006/math">
+                          <m:r>
+                            <a:rPr lang="en-US" sz="4800" i="1" dirty="0" smtClean="0">
+                              <a:latin typeface="Cambria Math" panose="02040503050406030204" pitchFamily="18" charset="0"/>
+                            </a:rPr>
+                            <m:t>𝑚</m:t>
+                          </m:r>
+                        </m:oMath>
+                      </m:oMathPara>
+                    </a14:m>
+                    <a:endParaRPr lang="en-US" sz="4800" dirty="0"/>
+                  </a:p>
+                </p:txBody>
+              </p:sp>
+            </mc:Choice>
+            <mc:Fallback>
+              <p:sp>
+                <p:nvSpPr>
+                  <p:cNvPr id="57" name="TextBox 56"/>
+                  <p:cNvSpPr txBox="1">
+                    <a:spLocks noRot="1" noChangeAspect="1" noMove="1" noResize="1" noEditPoints="1" noAdjustHandles="1" noChangeArrowheads="1" noChangeShapeType="1" noTextEdit="1"/>
+                  </p:cNvSpPr>
+                  <p:nvPr/>
+                </p:nvSpPr>
+                <p:spPr>
+                  <a:xfrm>
+                    <a:off x="3261502" y="3928515"/>
+                    <a:ext cx="447121" cy="909390"/>
+                  </a:xfrm>
+                  <a:prstGeom prst="rect">
+                    <a:avLst/>
+                  </a:prstGeom>
+                  <a:blipFill rotWithShape="0">
+                    <a:blip r:embed="rId5"/>
+                    <a:stretch>
+                      <a:fillRect r="-63333"/>
+                    </a:stretch>
+                  </a:blipFill>
+                </p:spPr>
+                <p:txBody>
+                  <a:bodyPr/>
+                  <a:lstStyle/>
+                  <a:p>
+                    <a:r>
+                      <a:rPr lang="en-US">
+                        <a:noFill/>
+                      </a:rPr>
+                      <a:t> </a:t>
+                    </a:r>
+                  </a:p>
+                </p:txBody>
+              </p:sp>
+            </mc:Fallback>
+          </mc:AlternateContent>
         </p:grpSp>
         <p:sp>
           <p:nvSpPr>
@@ -12099,76 +12370,98 @@
           </p:style>
         </p:cxnSp>
       </p:grpSp>
-      <p:sp>
-        <p:nvSpPr>
-          <p:cNvPr id="2" name="TextBox 1"/>
-          <p:cNvSpPr txBox="1"/>
-          <p:nvPr/>
-        </p:nvSpPr>
-        <p:spPr>
-          <a:xfrm>
-            <a:off x="5973511" y="2659550"/>
-            <a:ext cx="801824" cy="984885"/>
-          </a:xfrm>
-          <a:prstGeom prst="rect">
-            <a:avLst/>
-          </a:prstGeom>
-          <a:noFill/>
-        </p:spPr>
-        <p:txBody>
-          <a:bodyPr wrap="square" rtlCol="1">
-            <a:spAutoFit/>
-          </a:bodyPr>
-          <a:lstStyle/>
-          <a:p>
-            <a:r>
-              <a:rPr lang="en-US" sz="4000" dirty="0" err="1"/>
-              <a:t>N</a:t>
-            </a:r>
-            <a:r>
-              <a:rPr lang="en-US" sz="3200" dirty="0" err="1"/>
-              <a:t>c</a:t>
-            </a:r>
-            <a:endParaRPr lang="en-US" sz="3200" dirty="0"/>
-          </a:p>
-          <a:p>
-            <a:endParaRPr lang="he-IL" dirty="0"/>
-          </a:p>
-        </p:txBody>
-      </p:sp>
-      <p:cxnSp>
-        <p:nvCxnSpPr>
-          <p:cNvPr id="58" name="Straight Arrow Connector 57"/>
-          <p:cNvCxnSpPr/>
-          <p:nvPr/>
-        </p:nvCxnSpPr>
-        <p:spPr>
-          <a:xfrm>
-            <a:off x="3103068" y="2950470"/>
-            <a:ext cx="206573" cy="0"/>
-          </a:xfrm>
-          <a:prstGeom prst="straightConnector1">
-            <a:avLst/>
-          </a:prstGeom>
-          <a:ln w="31750">
-            <a:tailEnd type="triangle"/>
-          </a:ln>
-        </p:spPr>
-        <p:style>
-          <a:lnRef idx="1">
-            <a:schemeClr val="accent1"/>
-          </a:lnRef>
-          <a:fillRef idx="0">
-            <a:schemeClr val="accent1"/>
-          </a:fillRef>
-          <a:effectRef idx="0">
-            <a:schemeClr val="accent1"/>
-          </a:effectRef>
-          <a:fontRef idx="minor">
-            <a:schemeClr val="tx1"/>
-          </a:fontRef>
-        </p:style>
-      </p:cxnSp>
+      <mc:AlternateContent xmlns:mc="http://schemas.openxmlformats.org/markup-compatibility/2006">
+        <mc:Choice xmlns:a14="http://schemas.microsoft.com/office/drawing/2010/main" Requires="a14">
+          <p:sp>
+            <p:nvSpPr>
+              <p:cNvPr id="2" name="TextBox 1"/>
+              <p:cNvSpPr txBox="1"/>
+              <p:nvPr/>
+            </p:nvSpPr>
+            <p:spPr>
+              <a:xfrm>
+                <a:off x="6257899" y="2581076"/>
+                <a:ext cx="801824" cy="984885"/>
+              </a:xfrm>
+              <a:prstGeom prst="rect">
+                <a:avLst/>
+              </a:prstGeom>
+              <a:noFill/>
+            </p:spPr>
+            <p:txBody>
+              <a:bodyPr wrap="square" rtlCol="1">
+                <a:spAutoFit/>
+              </a:bodyPr>
+              <a:lstStyle/>
+              <a:p>
+                <a14:m>
+                  <m:oMathPara xmlns:m="http://schemas.openxmlformats.org/officeDocument/2006/math">
+                    <m:oMathParaPr>
+                      <m:jc m:val="centerGroup"/>
+                    </m:oMathParaPr>
+                    <m:oMath xmlns:m="http://schemas.openxmlformats.org/officeDocument/2006/math">
+                      <m:r>
+                        <a:rPr lang="en-US" sz="4000" i="1" dirty="0" smtClean="0">
+                          <a:latin typeface="Cambria Math" panose="02040503050406030204" pitchFamily="18" charset="0"/>
+                        </a:rPr>
+                        <m:t>𝑁</m:t>
+                      </m:r>
+                      <m:r>
+                        <a:rPr lang="en-US" sz="3200" i="1" dirty="0" err="1">
+                          <a:latin typeface="Cambria Math" panose="02040503050406030204" pitchFamily="18" charset="0"/>
+                        </a:rPr>
+                        <m:t>𝑐</m:t>
+                      </m:r>
+                    </m:oMath>
+                  </m:oMathPara>
+                </a14:m>
+                <a:endParaRPr lang="en-US" sz="3200" dirty="0"/>
+              </a:p>
+              <a:p>
+                <a:endParaRPr lang="he-IL" dirty="0"/>
+              </a:p>
+            </p:txBody>
+          </p:sp>
+        </mc:Choice>
+        <mc:Fallback>
+          <p:sp>
+            <p:nvSpPr>
+              <p:cNvPr id="2" name="TextBox 1"/>
+              <p:cNvSpPr txBox="1">
+                <a:spLocks noRot="1" noChangeAspect="1" noMove="1" noResize="1" noEditPoints="1" noAdjustHandles="1" noChangeArrowheads="1" noChangeShapeType="1" noTextEdit="1"/>
+              </p:cNvSpPr>
+              <p:nvPr/>
+            </p:nvSpPr>
+            <p:spPr>
+              <a:xfrm>
+                <a:off x="6257899" y="2581076"/>
+                <a:ext cx="801824" cy="984885"/>
+              </a:xfrm>
+              <a:prstGeom prst="rect">
+                <a:avLst/>
+              </a:prstGeom>
+              <a:blipFill rotWithShape="0">
+                <a:blip r:embed="rId6"/>
+                <a:stretch>
+                  <a:fillRect/>
+                </a:stretch>
+              </a:blipFill>
+            </p:spPr>
+            <p:txBody>
+              <a:bodyPr/>
+              <a:lstStyle/>
+              <a:p>
+                <a:r>
+                  <a:rPr lang="en-US">
+                    <a:noFill/>
+                  </a:rPr>
+                  <a:t> </a:t>
+                </a:r>
+              </a:p>
+            </p:txBody>
+          </p:sp>
+        </mc:Fallback>
+      </mc:AlternateContent>
     </p:spTree>
     <p:extLst>
       <p:ext uri="{BB962C8B-B14F-4D97-AF65-F5344CB8AC3E}">
@@ -20671,40 +20964,126 @@
                 </a:fontRef>
               </p:style>
             </p:cxnSp>
-            <p:sp>
-              <p:nvSpPr>
-                <p:cNvPr id="27" name="TextBox 26"/>
-                <p:cNvSpPr txBox="1"/>
-                <p:nvPr/>
-              </p:nvSpPr>
-              <p:spPr>
-                <a:xfrm>
-                  <a:off x="5255978" y="2842918"/>
-                  <a:ext cx="1419400" cy="1313564"/>
-                </a:xfrm>
-                <a:prstGeom prst="rect">
-                  <a:avLst/>
-                </a:prstGeom>
-                <a:noFill/>
-              </p:spPr>
-              <p:txBody>
-                <a:bodyPr wrap="square" rtlCol="0">
-                  <a:spAutoFit/>
-                </a:bodyPr>
-                <a:lstStyle/>
-                <a:p>
-                  <a:r>
-                    <a:rPr lang="en-US" sz="7200" dirty="0" smtClean="0"/>
-                    <a:t>r</a:t>
-                  </a:r>
-                  <a:r>
-                    <a:rPr lang="en-US" sz="3600" dirty="0" smtClean="0"/>
-                    <a:t>1m</a:t>
-                  </a:r>
-                  <a:endParaRPr lang="en-US" sz="3600" dirty="0"/>
-                </a:p>
-              </p:txBody>
-            </p:sp>
+            <mc:AlternateContent xmlns:mc="http://schemas.openxmlformats.org/markup-compatibility/2006">
+              <mc:Choice xmlns:a14="http://schemas.microsoft.com/office/drawing/2010/main" Requires="a14">
+                <p:sp>
+                  <p:nvSpPr>
+                    <p:cNvPr id="27" name="TextBox 26"/>
+                    <p:cNvSpPr txBox="1"/>
+                    <p:nvPr/>
+                  </p:nvSpPr>
+                  <p:spPr>
+                    <a:xfrm>
+                      <a:off x="5251838" y="2317066"/>
+                      <a:ext cx="1419400" cy="1159708"/>
+                    </a:xfrm>
+                    <a:prstGeom prst="rect">
+                      <a:avLst/>
+                    </a:prstGeom>
+                    <a:noFill/>
+                  </p:spPr>
+                  <p:txBody>
+                    <a:bodyPr wrap="square" rtlCol="0">
+                      <a:spAutoFit/>
+                    </a:bodyPr>
+                    <a:lstStyle/>
+                    <a:p>
+                      <a14:m>
+                        <m:oMathPara xmlns:m="http://schemas.openxmlformats.org/officeDocument/2006/math">
+                          <m:oMathParaPr>
+                            <m:jc m:val="centerGroup"/>
+                          </m:oMathParaPr>
+                          <m:oMath xmlns:m="http://schemas.openxmlformats.org/officeDocument/2006/math">
+                            <m:acc>
+                              <m:accPr>
+                                <m:chr m:val="⃗"/>
+                                <m:ctrlPr>
+                                  <a:rPr lang="en-US" sz="7200" i="1" dirty="0" smtClean="0">
+                                    <a:latin typeface="Cambria Math" panose="02040503050406030204" pitchFamily="18" charset="0"/>
+                                  </a:rPr>
+                                </m:ctrlPr>
+                              </m:accPr>
+                              <m:e>
+                                <m:sSub>
+                                  <m:sSubPr>
+                                    <m:ctrlPr>
+                                      <a:rPr lang="en-US" sz="7200" i="1" dirty="0">
+                                        <a:latin typeface="Cambria Math" panose="02040503050406030204" pitchFamily="18" charset="0"/>
+                                      </a:rPr>
+                                    </m:ctrlPr>
+                                  </m:sSubPr>
+                                  <m:e>
+                                    <m:r>
+                                      <a:rPr lang="en-US" sz="7200" i="1" dirty="0">
+                                        <a:latin typeface="Cambria Math" panose="02040503050406030204" pitchFamily="18" charset="0"/>
+                                      </a:rPr>
+                                      <m:t>𝑟</m:t>
+                                    </m:r>
+                                  </m:e>
+                                  <m:sub>
+                                    <m:r>
+                                      <a:rPr lang="en-US" sz="7200" i="1" dirty="0">
+                                        <a:latin typeface="Cambria Math" panose="02040503050406030204" pitchFamily="18" charset="0"/>
+                                      </a:rPr>
+                                      <m:t>1</m:t>
+                                    </m:r>
+                                    <m:r>
+                                      <a:rPr lang="en-US" sz="7200" i="1" dirty="0">
+                                        <a:latin typeface="Cambria Math" panose="02040503050406030204" pitchFamily="18" charset="0"/>
+                                      </a:rPr>
+                                      <m:t>𝑚</m:t>
+                                    </m:r>
+                                  </m:sub>
+                                </m:sSub>
+                              </m:e>
+                            </m:acc>
+                          </m:oMath>
+                        </m:oMathPara>
+                      </a14:m>
+                      <a:endParaRPr lang="en-US" sz="3600" dirty="0"/>
+                    </a:p>
+                  </p:txBody>
+                </p:sp>
+              </mc:Choice>
+              <mc:Fallback>
+                <p:sp>
+                  <p:nvSpPr>
+                    <p:cNvPr id="27" name="TextBox 26"/>
+                    <p:cNvSpPr txBox="1">
+                      <a:spLocks noRot="1" noChangeAspect="1" noMove="1" noResize="1" noEditPoints="1" noAdjustHandles="1" noChangeArrowheads="1" noChangeShapeType="1" noTextEdit="1"/>
+                    </p:cNvSpPr>
+                    <p:nvPr/>
+                  </p:nvSpPr>
+                  <p:spPr>
+                    <a:xfrm>
+                      <a:off x="5251838" y="2317066"/>
+                      <a:ext cx="1419400" cy="1159708"/>
+                    </a:xfrm>
+                    <a:prstGeom prst="rect">
+                      <a:avLst/>
+                    </a:prstGeom>
+                    <a:blipFill rotWithShape="0">
+                      <a:blip r:embed="rId2"/>
+                      <a:stretch>
+                        <a:fillRect/>
+                      </a:stretch>
+                    </a:blipFill>
+                  </p:spPr>
+                  <p:txBody>
+                    <a:bodyPr/>
+                    <a:lstStyle/>
+                    <a:p>
+                      <a:r>
+                        <a:rPr lang="en-US">
+                          <a:noFill/>
+                        </a:rPr>
+                        <a:t> </a:t>
+                      </a:r>
+                    </a:p>
+                  </p:txBody>
+                </p:sp>
+              </mc:Fallback>
+            </mc:AlternateContent>
             <p:sp>
               <p:nvSpPr>
                 <p:cNvPr id="28" name="TextBox 27"/>
@@ -40125,73 +40504,120 @@
             </a:fontRef>
           </p:style>
         </p:cxnSp>
-        <p:sp>
-          <p:nvSpPr>
-            <p:cNvPr id="31" name="TextBox 30"/>
-            <p:cNvSpPr txBox="1"/>
-            <p:nvPr/>
-          </p:nvSpPr>
-          <p:spPr>
-            <a:xfrm>
-              <a:off x="6858390" y="2825312"/>
-              <a:ext cx="1263557" cy="1015663"/>
-            </a:xfrm>
-            <a:prstGeom prst="rect">
-              <a:avLst/>
-            </a:prstGeom>
-            <a:noFill/>
-          </p:spPr>
-          <p:txBody>
-            <a:bodyPr wrap="square" rtlCol="0">
-              <a:spAutoFit/>
-            </a:bodyPr>
-            <a:lstStyle/>
-            <a:p>
-              <a:r>
-                <a:rPr lang="en-US" sz="6000" dirty="0" err="1" smtClean="0"/>
-                <a:t>r</a:t>
-              </a:r>
-              <a:r>
-                <a:rPr lang="en-US" sz="3200" dirty="0" err="1" smtClean="0"/>
-                <a:t>mn</a:t>
-              </a:r>
-              <a:endParaRPr lang="en-US" sz="3200" dirty="0"/>
-            </a:p>
-          </p:txBody>
-        </p:sp>
-        <p:cxnSp>
-          <p:nvCxnSpPr>
-            <p:cNvPr id="33" name="Straight Arrow Connector 32"/>
-            <p:cNvCxnSpPr/>
-            <p:nvPr/>
-          </p:nvCxnSpPr>
-          <p:spPr>
-            <a:xfrm>
-              <a:off x="6935405" y="2974622"/>
-              <a:ext cx="324956" cy="0"/>
-            </a:xfrm>
-            <a:prstGeom prst="straightConnector1">
-              <a:avLst/>
-            </a:prstGeom>
-            <a:ln w="31750">
-              <a:tailEnd type="triangle"/>
-            </a:ln>
-          </p:spPr>
-          <p:style>
-            <a:lnRef idx="1">
-              <a:schemeClr val="accent1"/>
-            </a:lnRef>
-            <a:fillRef idx="0">
-              <a:schemeClr val="accent1"/>
-            </a:fillRef>
-            <a:effectRef idx="0">
-              <a:schemeClr val="accent1"/>
-            </a:effectRef>
-            <a:fontRef idx="minor">
-              <a:schemeClr val="tx1"/>
-            </a:fontRef>
-          </p:style>
-        </p:cxnSp>
+        <mc:AlternateContent xmlns:mc="http://schemas.openxmlformats.org/markup-compatibility/2006">
+          <mc:Choice xmlns:a14="http://schemas.microsoft.com/office/drawing/2010/main" Requires="a14">
+            <p:sp>
+              <p:nvSpPr>
+                <p:cNvPr id="31" name="TextBox 30"/>
+                <p:cNvSpPr txBox="1"/>
+                <p:nvPr/>
+              </p:nvSpPr>
+              <p:spPr>
+                <a:xfrm>
+                  <a:off x="6858390" y="2825312"/>
+                  <a:ext cx="1263557" cy="1015663"/>
+                </a:xfrm>
+                <a:prstGeom prst="rect">
+                  <a:avLst/>
+                </a:prstGeom>
+                <a:noFill/>
+              </p:spPr>
+              <p:txBody>
+                <a:bodyPr wrap="square" rtlCol="0">
+                  <a:spAutoFit/>
+                </a:bodyPr>
+                <a:lstStyle/>
+                <a:p>
+                  <a14:m>
+                    <m:oMathPara xmlns:m="http://schemas.openxmlformats.org/officeDocument/2006/math">
+                      <m:oMathParaPr>
+                        <m:jc m:val="centerGroup"/>
+                      </m:oMathParaPr>
+                      <m:oMath xmlns:m="http://schemas.openxmlformats.org/officeDocument/2006/math">
+                        <m:acc>
+                          <m:accPr>
+                            <m:chr m:val="⃗"/>
+                            <m:ctrlPr>
+                              <a:rPr lang="en-US" sz="6000" i="1" dirty="0" smtClean="0">
+                                <a:latin typeface="Cambria Math" panose="02040503050406030204" pitchFamily="18" charset="0"/>
+                              </a:rPr>
+                            </m:ctrlPr>
+                          </m:accPr>
+                          <m:e>
+                            <m:sSub>
+                              <m:sSubPr>
+                                <m:ctrlPr>
+                                  <a:rPr lang="en-US" sz="6000" b="0" i="1" dirty="0" smtClean="0">
+                                    <a:latin typeface="Cambria Math" panose="02040503050406030204" pitchFamily="18" charset="0"/>
+                                  </a:rPr>
+                                </m:ctrlPr>
+                              </m:sSubPr>
+                              <m:e>
+                                <m:r>
+                                  <a:rPr lang="en-US" sz="6000" b="0" i="1" dirty="0" smtClean="0">
+                                    <a:latin typeface="Cambria Math" panose="02040503050406030204" pitchFamily="18" charset="0"/>
+                                  </a:rPr>
+                                  <m:t>𝑟</m:t>
+                                </m:r>
+                              </m:e>
+                              <m:sub>
+                                <m:r>
+                                  <a:rPr lang="en-US" sz="6000" b="0" i="1" dirty="0" smtClean="0">
+                                    <a:latin typeface="Cambria Math" panose="02040503050406030204" pitchFamily="18" charset="0"/>
+                                  </a:rPr>
+                                  <m:t>𝑚𝑛</m:t>
+                                </m:r>
+                              </m:sub>
+                            </m:sSub>
+                          </m:e>
+                        </m:acc>
+                      </m:oMath>
+                    </m:oMathPara>
+                  </a14:m>
+                  <a:endParaRPr lang="en-US" sz="3200" dirty="0"/>
+                </a:p>
+              </p:txBody>
+            </p:sp>
+          </mc:Choice>
+          <mc:Fallback>
+            <p:sp>
+              <p:nvSpPr>
+                <p:cNvPr id="31" name="TextBox 30"/>
+                <p:cNvSpPr txBox="1">
+                  <a:spLocks noRot="1" noChangeAspect="1" noMove="1" noResize="1" noEditPoints="1" noAdjustHandles="1" noChangeArrowheads="1" noChangeShapeType="1" noTextEdit="1"/>
+                </p:cNvSpPr>
+                <p:nvPr/>
+              </p:nvSpPr>
+              <p:spPr>
+                <a:xfrm>
+                  <a:off x="6858390" y="2825312"/>
+                  <a:ext cx="1263557" cy="1015663"/>
+                </a:xfrm>
+                <a:prstGeom prst="rect">
+                  <a:avLst/>
+                </a:prstGeom>
+                <a:blipFill rotWithShape="0">
+                  <a:blip r:embed="rId2"/>
+                  <a:stretch>
+                    <a:fillRect/>
+                  </a:stretch>
+                </a:blipFill>
+              </p:spPr>
+              <p:txBody>
+                <a:bodyPr/>
+                <a:lstStyle/>
+                <a:p>
+                  <a:r>
+                    <a:rPr lang="en-US">
+                      <a:noFill/>
+                    </a:rPr>
+                    <a:t> </a:t>
+                  </a:r>
+                </a:p>
+              </p:txBody>
+            </p:sp>
+          </mc:Fallback>
+        </mc:AlternateContent>
       </p:grpSp>
     </p:spTree>
     <p:extLst>

</xml_diff>